<commit_message>
DeveloperGuide: Rework UML diagrams
</commit_message>
<xml_diff>
--- a/docs/diagrams/HighLevelSequenceDiagrams.pptx
+++ b/docs/diagrams/HighLevelSequenceDiagrams.pptx
@@ -192,7 +192,7 @@
           <a:p>
             <a:fld id="{F5CC4B3F-88C1-4FFA-B1B6-F41C21DC6924}" type="datetimeFigureOut">
               <a:rPr lang="en-US" smtClean="0"/>
-              <a:t>10/16/2016</a:t>
+              <a:t>3/5/2018</a:t>
             </a:fld>
             <a:endParaRPr lang="en-US"/>
           </a:p>
@@ -641,7 +641,7 @@
           <a:p>
             <a:fld id="{78C97017-6FC3-485B-9764-EAC9E56C1D49}" type="datetimeFigureOut">
               <a:rPr lang="en-US" smtClean="0"/>
-              <a:t>10/16/2016</a:t>
+              <a:t>3/5/2018</a:t>
             </a:fld>
             <a:endParaRPr lang="en-US"/>
           </a:p>
@@ -811,7 +811,7 @@
           <a:p>
             <a:fld id="{78C97017-6FC3-485B-9764-EAC9E56C1D49}" type="datetimeFigureOut">
               <a:rPr lang="en-US" smtClean="0"/>
-              <a:t>10/16/2016</a:t>
+              <a:t>3/5/2018</a:t>
             </a:fld>
             <a:endParaRPr lang="en-US"/>
           </a:p>
@@ -991,7 +991,7 @@
           <a:p>
             <a:fld id="{78C97017-6FC3-485B-9764-EAC9E56C1D49}" type="datetimeFigureOut">
               <a:rPr lang="en-US" smtClean="0"/>
-              <a:t>10/16/2016</a:t>
+              <a:t>3/5/2018</a:t>
             </a:fld>
             <a:endParaRPr lang="en-US"/>
           </a:p>
@@ -1161,7 +1161,7 @@
           <a:p>
             <a:fld id="{78C97017-6FC3-485B-9764-EAC9E56C1D49}" type="datetimeFigureOut">
               <a:rPr lang="en-US" smtClean="0"/>
-              <a:t>10/16/2016</a:t>
+              <a:t>3/5/2018</a:t>
             </a:fld>
             <a:endParaRPr lang="en-US"/>
           </a:p>
@@ -1407,7 +1407,7 @@
           <a:p>
             <a:fld id="{78C97017-6FC3-485B-9764-EAC9E56C1D49}" type="datetimeFigureOut">
               <a:rPr lang="en-US" smtClean="0"/>
-              <a:t>10/16/2016</a:t>
+              <a:t>3/5/2018</a:t>
             </a:fld>
             <a:endParaRPr lang="en-US"/>
           </a:p>
@@ -1695,7 +1695,7 @@
           <a:p>
             <a:fld id="{78C97017-6FC3-485B-9764-EAC9E56C1D49}" type="datetimeFigureOut">
               <a:rPr lang="en-US" smtClean="0"/>
-              <a:t>10/16/2016</a:t>
+              <a:t>3/5/2018</a:t>
             </a:fld>
             <a:endParaRPr lang="en-US"/>
           </a:p>
@@ -2117,7 +2117,7 @@
           <a:p>
             <a:fld id="{78C97017-6FC3-485B-9764-EAC9E56C1D49}" type="datetimeFigureOut">
               <a:rPr lang="en-US" smtClean="0"/>
-              <a:t>10/16/2016</a:t>
+              <a:t>3/5/2018</a:t>
             </a:fld>
             <a:endParaRPr lang="en-US"/>
           </a:p>
@@ -2235,7 +2235,7 @@
           <a:p>
             <a:fld id="{78C97017-6FC3-485B-9764-EAC9E56C1D49}" type="datetimeFigureOut">
               <a:rPr lang="en-US" smtClean="0"/>
-              <a:t>10/16/2016</a:t>
+              <a:t>3/5/2018</a:t>
             </a:fld>
             <a:endParaRPr lang="en-US"/>
           </a:p>
@@ -2330,7 +2330,7 @@
           <a:p>
             <a:fld id="{78C97017-6FC3-485B-9764-EAC9E56C1D49}" type="datetimeFigureOut">
               <a:rPr lang="en-US" smtClean="0"/>
-              <a:t>10/16/2016</a:t>
+              <a:t>3/5/2018</a:t>
             </a:fld>
             <a:endParaRPr lang="en-US"/>
           </a:p>
@@ -2607,7 +2607,7 @@
           <a:p>
             <a:fld id="{78C97017-6FC3-485B-9764-EAC9E56C1D49}" type="datetimeFigureOut">
               <a:rPr lang="en-US" smtClean="0"/>
-              <a:t>10/16/2016</a:t>
+              <a:t>3/5/2018</a:t>
             </a:fld>
             <a:endParaRPr lang="en-US"/>
           </a:p>
@@ -2860,7 +2860,7 @@
           <a:p>
             <a:fld id="{78C97017-6FC3-485B-9764-EAC9E56C1D49}" type="datetimeFigureOut">
               <a:rPr lang="en-US" smtClean="0"/>
-              <a:t>10/16/2016</a:t>
+              <a:t>3/5/2018</a:t>
             </a:fld>
             <a:endParaRPr lang="en-US"/>
           </a:p>
@@ -3073,7 +3073,7 @@
           <a:p>
             <a:fld id="{78C97017-6FC3-485B-9764-EAC9E56C1D49}" type="datetimeFigureOut">
               <a:rPr lang="en-US" smtClean="0"/>
-              <a:t>10/16/2016</a:t>
+              <a:t>3/5/2018</a:t>
             </a:fld>
             <a:endParaRPr lang="en-US"/>
           </a:p>
@@ -4230,6 +4230,7 @@
           </a:bodyPr>
           <a:lstStyle/>
           <a:p>
+            <a:pPr algn="r"/>
             <a:r>
               <a:rPr lang="en-US" sz="1400" dirty="0" smtClean="0">
                 <a:solidFill>
@@ -4291,7 +4292,7 @@
         <p:spPr>
           <a:xfrm>
             <a:off x="4299772" y="1542583"/>
-            <a:ext cx="1424846" cy="215444"/>
+            <a:ext cx="1262828" cy="215444"/>
           </a:xfrm>
           <a:prstGeom prst="rect">
             <a:avLst/>
@@ -4304,13 +4305,14 @@
           </a:bodyPr>
           <a:lstStyle/>
           <a:p>
+            <a:pPr algn="r"/>
             <a:r>
               <a:rPr lang="en-US" sz="1400" dirty="0" err="1" smtClean="0">
                 <a:solidFill>
                   <a:srgbClr val="7030A0"/>
                 </a:solidFill>
               </a:rPr>
-              <a:t>deletePerson</a:t>
+              <a:t>deleteTask</a:t>
             </a:r>
             <a:r>
               <a:rPr lang="en-US" sz="1400" dirty="0" smtClean="0">
@@ -4318,7 +4320,7 @@
                   <a:srgbClr val="7030A0"/>
                 </a:solidFill>
               </a:rPr>
-              <a:t>(p)</a:t>
+              <a:t>(t)</a:t>
             </a:r>
             <a:endParaRPr lang="en-US" sz="1400" dirty="0">
               <a:solidFill>
@@ -4337,7 +4339,7 @@
         <p:spPr>
           <a:xfrm>
             <a:off x="6074030" y="1687656"/>
-            <a:ext cx="2438400" cy="215444"/>
+            <a:ext cx="2231770" cy="215444"/>
           </a:xfrm>
           <a:prstGeom prst="rect">
             <a:avLst/>
@@ -4350,6 +4352,7 @@
           </a:bodyPr>
           <a:lstStyle/>
           <a:p>
+            <a:pPr algn="r"/>
             <a:r>
               <a:rPr lang="en-US" sz="1400" dirty="0" smtClean="0">
                 <a:solidFill>
@@ -4368,7 +4371,7 @@
                   </a:schemeClr>
                 </a:solidFill>
               </a:rPr>
-              <a:t>AddressBookChangedEvent</a:t>
+              <a:t>TaskBookChangedEvent</a:t>
             </a:r>
             <a:r>
               <a:rPr lang="en-US" sz="1400" dirty="0" smtClean="0">
@@ -4910,8 +4913,8 @@
         </p:nvSpPr>
         <p:spPr>
           <a:xfrm>
-            <a:off x="1810094" y="4797674"/>
-            <a:ext cx="2716635" cy="215444"/>
+            <a:off x="1810095" y="4797674"/>
+            <a:ext cx="2380906" cy="215444"/>
           </a:xfrm>
           <a:prstGeom prst="rect">
             <a:avLst/>
@@ -4924,6 +4927,7 @@
           </a:bodyPr>
           <a:lstStyle/>
           <a:p>
+            <a:pPr algn="r"/>
             <a:r>
               <a:rPr lang="en-US" sz="1400" dirty="0" smtClean="0">
                 <a:solidFill>
@@ -4942,7 +4946,7 @@
                   </a:schemeClr>
                 </a:solidFill>
               </a:rPr>
-              <a:t>AddressBookChangedEvent</a:t>
+              <a:t>TaskBookChangedEvent</a:t>
             </a:r>
             <a:r>
               <a:rPr lang="en-US" sz="1400" dirty="0" smtClean="0">
@@ -5293,7 +5297,7 @@
         <p:spPr>
           <a:xfrm>
             <a:off x="5036330" y="5065911"/>
-            <a:ext cx="2659870" cy="215444"/>
+            <a:ext cx="2583670" cy="215444"/>
           </a:xfrm>
           <a:prstGeom prst="rect">
             <a:avLst/>
@@ -5306,6 +5310,7 @@
           </a:bodyPr>
           <a:lstStyle/>
           <a:p>
+            <a:pPr algn="r"/>
             <a:r>
               <a:rPr lang="en-US" sz="1400" dirty="0" err="1" smtClean="0">
                 <a:solidFill>
@@ -5314,7 +5319,7 @@
                   </a:schemeClr>
                 </a:solidFill>
               </a:rPr>
-              <a:t>handleAddresssBookChangedEvent</a:t>
+              <a:t>handleTaskBookChangedEvent</a:t>
             </a:r>
             <a:r>
               <a:rPr lang="en-US" sz="1400" dirty="0" smtClean="0">
@@ -5605,8 +5610,8 @@
         </p:nvSpPr>
         <p:spPr>
           <a:xfrm>
-            <a:off x="1416276" y="5395369"/>
-            <a:ext cx="2659870" cy="215444"/>
+            <a:off x="1416275" y="5395368"/>
+            <a:ext cx="2774725" cy="215444"/>
           </a:xfrm>
           <a:prstGeom prst="rect">
             <a:avLst/>
@@ -5619,13 +5624,14 @@
           </a:bodyPr>
           <a:lstStyle/>
           <a:p>
+            <a:pPr algn="r"/>
             <a:r>
               <a:rPr lang="en-US" sz="1400" dirty="0" err="1" smtClean="0">
                 <a:solidFill>
                   <a:srgbClr val="00B050"/>
                 </a:solidFill>
               </a:rPr>
-              <a:t>handleAddresssBookChangedEvent</a:t>
+              <a:t>handleTaskBookChangedEvent</a:t>
             </a:r>
             <a:r>
               <a:rPr lang="en-US" sz="1400" dirty="0" smtClean="0">

</xml_diff>

<commit_message>
[#6][#13] Update documentation (#23)
* Update README
Travis Link update
Addressbook -> PrioriTask

* Add UserStories to DeveloperGuide

* Update UML diagrams and corresponding images

* Rename image files and update DeveloperGuide
</commit_message>
<xml_diff>
--- a/docs/diagrams/HighLevelSequenceDiagrams.pptx
+++ b/docs/diagrams/HighLevelSequenceDiagrams.pptx
@@ -192,7 +192,7 @@
           <a:p>
             <a:fld id="{F5CC4B3F-88C1-4FFA-B1B6-F41C21DC6924}" type="datetimeFigureOut">
               <a:rPr lang="en-US" smtClean="0"/>
-              <a:t>3/5/2018</a:t>
+              <a:t>3/8/2018</a:t>
             </a:fld>
             <a:endParaRPr lang="en-US"/>
           </a:p>
@@ -641,7 +641,7 @@
           <a:p>
             <a:fld id="{78C97017-6FC3-485B-9764-EAC9E56C1D49}" type="datetimeFigureOut">
               <a:rPr lang="en-US" smtClean="0"/>
-              <a:t>3/5/2018</a:t>
+              <a:t>3/8/2018</a:t>
             </a:fld>
             <a:endParaRPr lang="en-US"/>
           </a:p>
@@ -811,7 +811,7 @@
           <a:p>
             <a:fld id="{78C97017-6FC3-485B-9764-EAC9E56C1D49}" type="datetimeFigureOut">
               <a:rPr lang="en-US" smtClean="0"/>
-              <a:t>3/5/2018</a:t>
+              <a:t>3/8/2018</a:t>
             </a:fld>
             <a:endParaRPr lang="en-US"/>
           </a:p>
@@ -991,7 +991,7 @@
           <a:p>
             <a:fld id="{78C97017-6FC3-485B-9764-EAC9E56C1D49}" type="datetimeFigureOut">
               <a:rPr lang="en-US" smtClean="0"/>
-              <a:t>3/5/2018</a:t>
+              <a:t>3/8/2018</a:t>
             </a:fld>
             <a:endParaRPr lang="en-US"/>
           </a:p>
@@ -1161,7 +1161,7 @@
           <a:p>
             <a:fld id="{78C97017-6FC3-485B-9764-EAC9E56C1D49}" type="datetimeFigureOut">
               <a:rPr lang="en-US" smtClean="0"/>
-              <a:t>3/5/2018</a:t>
+              <a:t>3/8/2018</a:t>
             </a:fld>
             <a:endParaRPr lang="en-US"/>
           </a:p>
@@ -1407,7 +1407,7 @@
           <a:p>
             <a:fld id="{78C97017-6FC3-485B-9764-EAC9E56C1D49}" type="datetimeFigureOut">
               <a:rPr lang="en-US" smtClean="0"/>
-              <a:t>3/5/2018</a:t>
+              <a:t>3/8/2018</a:t>
             </a:fld>
             <a:endParaRPr lang="en-US"/>
           </a:p>
@@ -1695,7 +1695,7 @@
           <a:p>
             <a:fld id="{78C97017-6FC3-485B-9764-EAC9E56C1D49}" type="datetimeFigureOut">
               <a:rPr lang="en-US" smtClean="0"/>
-              <a:t>3/5/2018</a:t>
+              <a:t>3/8/2018</a:t>
             </a:fld>
             <a:endParaRPr lang="en-US"/>
           </a:p>
@@ -2117,7 +2117,7 @@
           <a:p>
             <a:fld id="{78C97017-6FC3-485B-9764-EAC9E56C1D49}" type="datetimeFigureOut">
               <a:rPr lang="en-US" smtClean="0"/>
-              <a:t>3/5/2018</a:t>
+              <a:t>3/8/2018</a:t>
             </a:fld>
             <a:endParaRPr lang="en-US"/>
           </a:p>
@@ -2235,7 +2235,7 @@
           <a:p>
             <a:fld id="{78C97017-6FC3-485B-9764-EAC9E56C1D49}" type="datetimeFigureOut">
               <a:rPr lang="en-US" smtClean="0"/>
-              <a:t>3/5/2018</a:t>
+              <a:t>3/8/2018</a:t>
             </a:fld>
             <a:endParaRPr lang="en-US"/>
           </a:p>
@@ -2330,7 +2330,7 @@
           <a:p>
             <a:fld id="{78C97017-6FC3-485B-9764-EAC9E56C1D49}" type="datetimeFigureOut">
               <a:rPr lang="en-US" smtClean="0"/>
-              <a:t>3/5/2018</a:t>
+              <a:t>3/8/2018</a:t>
             </a:fld>
             <a:endParaRPr lang="en-US"/>
           </a:p>
@@ -2607,7 +2607,7 @@
           <a:p>
             <a:fld id="{78C97017-6FC3-485B-9764-EAC9E56C1D49}" type="datetimeFigureOut">
               <a:rPr lang="en-US" smtClean="0"/>
-              <a:t>3/5/2018</a:t>
+              <a:t>3/8/2018</a:t>
             </a:fld>
             <a:endParaRPr lang="en-US"/>
           </a:p>
@@ -2860,7 +2860,7 @@
           <a:p>
             <a:fld id="{78C97017-6FC3-485B-9764-EAC9E56C1D49}" type="datetimeFigureOut">
               <a:rPr lang="en-US" smtClean="0"/>
-              <a:t>3/5/2018</a:t>
+              <a:t>3/8/2018</a:t>
             </a:fld>
             <a:endParaRPr lang="en-US"/>
           </a:p>
@@ -3073,7 +3073,7 @@
           <a:p>
             <a:fld id="{78C97017-6FC3-485B-9764-EAC9E56C1D49}" type="datetimeFigureOut">
               <a:rPr lang="en-US" smtClean="0"/>
-              <a:t>3/5/2018</a:t>
+              <a:t>3/8/2018</a:t>
             </a:fld>
             <a:endParaRPr lang="en-US"/>
           </a:p>
@@ -4371,7 +4371,7 @@
                   </a:schemeClr>
                 </a:solidFill>
               </a:rPr>
-              <a:t>TaskBookChangedEvent</a:t>
+              <a:t>OrganizerChangedEvent</a:t>
             </a:r>
             <a:r>
               <a:rPr lang="en-US" sz="1400" dirty="0" smtClean="0">
@@ -4946,7 +4946,17 @@
                   </a:schemeClr>
                 </a:solidFill>
               </a:rPr>
-              <a:t>TaskBookChangedEvent</a:t>
+              <a:t>Organizer</a:t>
+            </a:r>
+            <a:r>
+              <a:rPr lang="en-US" sz="1400" dirty="0" err="1" smtClean="0">
+                <a:solidFill>
+                  <a:schemeClr val="accent5">
+                    <a:lumMod val="75000"/>
+                  </a:schemeClr>
+                </a:solidFill>
+              </a:rPr>
+              <a:t>ChangedEvent</a:t>
             </a:r>
             <a:r>
               <a:rPr lang="en-US" sz="1400" dirty="0" smtClean="0">
@@ -5319,7 +5329,7 @@
                   </a:schemeClr>
                 </a:solidFill>
               </a:rPr>
-              <a:t>handleTaskBookChangedEvent</a:t>
+              <a:t>handleOrganizerChangedEvent</a:t>
             </a:r>
             <a:r>
               <a:rPr lang="en-US" sz="1400" dirty="0" smtClean="0">
@@ -5631,7 +5641,7 @@
                   <a:srgbClr val="00B050"/>
                 </a:solidFill>
               </a:rPr>
-              <a:t>handleTaskBookChangedEvent</a:t>
+              <a:t>handleOrganizerChangedEvent</a:t>
             </a:r>
             <a:r>
               <a:rPr lang="en-US" sz="1400" dirty="0" smtClean="0">

</xml_diff>

<commit_message>
Update all diagrams except UI
</commit_message>
<xml_diff>
--- a/docs/diagrams/HighLevelSequenceDiagrams.pptx
+++ b/docs/diagrams/HighLevelSequenceDiagrams.pptx
@@ -192,7 +192,7 @@
           <a:p>
             <a:fld id="{F5CC4B3F-88C1-4FFA-B1B6-F41C21DC6924}" type="datetimeFigureOut">
               <a:rPr lang="en-US" smtClean="0"/>
-              <a:t>10/16/2016</a:t>
+              <a:t>4/14/2018</a:t>
             </a:fld>
             <a:endParaRPr lang="en-US"/>
           </a:p>
@@ -641,7 +641,7 @@
           <a:p>
             <a:fld id="{78C97017-6FC3-485B-9764-EAC9E56C1D49}" type="datetimeFigureOut">
               <a:rPr lang="en-US" smtClean="0"/>
-              <a:t>10/16/2016</a:t>
+              <a:t>4/14/2018</a:t>
             </a:fld>
             <a:endParaRPr lang="en-US"/>
           </a:p>
@@ -811,7 +811,7 @@
           <a:p>
             <a:fld id="{78C97017-6FC3-485B-9764-EAC9E56C1D49}" type="datetimeFigureOut">
               <a:rPr lang="en-US" smtClean="0"/>
-              <a:t>10/16/2016</a:t>
+              <a:t>4/14/2018</a:t>
             </a:fld>
             <a:endParaRPr lang="en-US"/>
           </a:p>
@@ -991,7 +991,7 @@
           <a:p>
             <a:fld id="{78C97017-6FC3-485B-9764-EAC9E56C1D49}" type="datetimeFigureOut">
               <a:rPr lang="en-US" smtClean="0"/>
-              <a:t>10/16/2016</a:t>
+              <a:t>4/14/2018</a:t>
             </a:fld>
             <a:endParaRPr lang="en-US"/>
           </a:p>
@@ -1161,7 +1161,7 @@
           <a:p>
             <a:fld id="{78C97017-6FC3-485B-9764-EAC9E56C1D49}" type="datetimeFigureOut">
               <a:rPr lang="en-US" smtClean="0"/>
-              <a:t>10/16/2016</a:t>
+              <a:t>4/14/2018</a:t>
             </a:fld>
             <a:endParaRPr lang="en-US"/>
           </a:p>
@@ -1407,7 +1407,7 @@
           <a:p>
             <a:fld id="{78C97017-6FC3-485B-9764-EAC9E56C1D49}" type="datetimeFigureOut">
               <a:rPr lang="en-US" smtClean="0"/>
-              <a:t>10/16/2016</a:t>
+              <a:t>4/14/2018</a:t>
             </a:fld>
             <a:endParaRPr lang="en-US"/>
           </a:p>
@@ -1695,7 +1695,7 @@
           <a:p>
             <a:fld id="{78C97017-6FC3-485B-9764-EAC9E56C1D49}" type="datetimeFigureOut">
               <a:rPr lang="en-US" smtClean="0"/>
-              <a:t>10/16/2016</a:t>
+              <a:t>4/14/2018</a:t>
             </a:fld>
             <a:endParaRPr lang="en-US"/>
           </a:p>
@@ -2117,7 +2117,7 @@
           <a:p>
             <a:fld id="{78C97017-6FC3-485B-9764-EAC9E56C1D49}" type="datetimeFigureOut">
               <a:rPr lang="en-US" smtClean="0"/>
-              <a:t>10/16/2016</a:t>
+              <a:t>4/14/2018</a:t>
             </a:fld>
             <a:endParaRPr lang="en-US"/>
           </a:p>
@@ -2235,7 +2235,7 @@
           <a:p>
             <a:fld id="{78C97017-6FC3-485B-9764-EAC9E56C1D49}" type="datetimeFigureOut">
               <a:rPr lang="en-US" smtClean="0"/>
-              <a:t>10/16/2016</a:t>
+              <a:t>4/14/2018</a:t>
             </a:fld>
             <a:endParaRPr lang="en-US"/>
           </a:p>
@@ -2330,7 +2330,7 @@
           <a:p>
             <a:fld id="{78C97017-6FC3-485B-9764-EAC9E56C1D49}" type="datetimeFigureOut">
               <a:rPr lang="en-US" smtClean="0"/>
-              <a:t>10/16/2016</a:t>
+              <a:t>4/14/2018</a:t>
             </a:fld>
             <a:endParaRPr lang="en-US"/>
           </a:p>
@@ -2607,7 +2607,7 @@
           <a:p>
             <a:fld id="{78C97017-6FC3-485B-9764-EAC9E56C1D49}" type="datetimeFigureOut">
               <a:rPr lang="en-US" smtClean="0"/>
-              <a:t>10/16/2016</a:t>
+              <a:t>4/14/2018</a:t>
             </a:fld>
             <a:endParaRPr lang="en-US"/>
           </a:p>
@@ -2860,7 +2860,7 @@
           <a:p>
             <a:fld id="{78C97017-6FC3-485B-9764-EAC9E56C1D49}" type="datetimeFigureOut">
               <a:rPr lang="en-US" smtClean="0"/>
-              <a:t>10/16/2016</a:t>
+              <a:t>4/14/2018</a:t>
             </a:fld>
             <a:endParaRPr lang="en-US"/>
           </a:p>
@@ -3073,7 +3073,7 @@
           <a:p>
             <a:fld id="{78C97017-6FC3-485B-9764-EAC9E56C1D49}" type="datetimeFigureOut">
               <a:rPr lang="en-US" smtClean="0"/>
-              <a:t>10/16/2016</a:t>
+              <a:t>4/14/2018</a:t>
             </a:fld>
             <a:endParaRPr lang="en-US"/>
           </a:p>
@@ -4368,7 +4368,7 @@
                   </a:schemeClr>
                 </a:solidFill>
               </a:rPr>
-              <a:t>AddressBookChangedEvent</a:t>
+              <a:t>ImdbChangedEvent</a:t>
             </a:r>
             <a:r>
               <a:rPr lang="en-US" sz="1400" dirty="0" smtClean="0">
@@ -4910,8 +4910,8 @@
         </p:nvSpPr>
         <p:spPr>
           <a:xfrm>
-            <a:off x="1810094" y="4797674"/>
-            <a:ext cx="2716635" cy="215444"/>
+            <a:off x="2514600" y="4797674"/>
+            <a:ext cx="1889925" cy="215444"/>
           </a:xfrm>
           <a:prstGeom prst="rect">
             <a:avLst/>
@@ -4942,7 +4942,7 @@
                   </a:schemeClr>
                 </a:solidFill>
               </a:rPr>
-              <a:t>AddressBookChangedEvent</a:t>
+              <a:t>ImdbChangedEvent</a:t>
             </a:r>
             <a:r>
               <a:rPr lang="en-US" sz="1400" dirty="0" smtClean="0">
@@ -5314,7 +5314,7 @@
                   </a:schemeClr>
                 </a:solidFill>
               </a:rPr>
-              <a:t>handleAddresssBookChangedEvent</a:t>
+              <a:t>handleImdbChangedEvent</a:t>
             </a:r>
             <a:r>
               <a:rPr lang="en-US" sz="1400" dirty="0" smtClean="0">
@@ -5625,7 +5625,7 @@
                   <a:srgbClr val="00B050"/>
                 </a:solidFill>
               </a:rPr>
-              <a:t>handleAddresssBookChangedEvent</a:t>
+              <a:t>handleImdbChangedEvent</a:t>
             </a:r>
             <a:r>
               <a:rPr lang="en-US" sz="1400" dirty="0" smtClean="0">

</xml_diff>

<commit_message>
Update diagrams and DG for autocomplete
</commit_message>
<xml_diff>
--- a/docs/diagrams/HighLevelSequenceDiagrams.pptx
+++ b/docs/diagrams/HighLevelSequenceDiagrams.pptx
@@ -5,10 +5,11 @@
     <p:sldMasterId id="2147483648" r:id="rId1"/>
   </p:sldMasterIdLst>
   <p:notesMasterIdLst>
-    <p:notesMasterId r:id="rId3"/>
+    <p:notesMasterId r:id="rId4"/>
   </p:notesMasterIdLst>
   <p:sldIdLst>
     <p:sldId id="266" r:id="rId2"/>
+    <p:sldId id="267" r:id="rId3"/>
   </p:sldIdLst>
   <p:sldSz cx="9144000" cy="6858000" type="screen4x3"/>
   <p:notesSz cx="6858000" cy="9144000"/>
@@ -107,6 +108,22 @@
       </a:defRPr>
     </a:lvl9pPr>
   </p:defaultTextStyle>
+  <p:extLst>
+    <p:ext uri="{EFAFB233-063F-42B5-8137-9DF3F51BA10A}">
+      <p15:sldGuideLst xmlns:p15="http://schemas.microsoft.com/office/powerpoint/2012/main">
+        <p15:guide id="1" orient="horz" pos="1488">
+          <p15:clr>
+            <a:srgbClr val="A4A3A4"/>
+          </p15:clr>
+        </p15:guide>
+        <p15:guide id="2" pos="2880">
+          <p15:clr>
+            <a:srgbClr val="A4A3A4"/>
+          </p15:clr>
+        </p15:guide>
+      </p15:sldGuideLst>
+    </p:ext>
+  </p:extLst>
 </p:presentation>
 </file>
 
@@ -192,7 +209,7 @@
           <a:p>
             <a:fld id="{F5CC4B3F-88C1-4FFA-B1B6-F41C21DC6924}" type="datetimeFigureOut">
               <a:rPr lang="en-US" smtClean="0"/>
-              <a:t>10/16/2016</a:t>
+              <a:t>4/14/2018</a:t>
             </a:fld>
             <a:endParaRPr lang="en-US"/>
           </a:p>
@@ -256,38 +273,37 @@
           <a:p>
             <a:pPr lvl="0"/>
             <a:r>
-              <a:rPr lang="en-US" smtClean="0"/>
+              <a:rPr lang="en-US"/>
               <a:t>Click to edit Master text styles</a:t>
             </a:r>
           </a:p>
           <a:p>
             <a:pPr lvl="1"/>
             <a:r>
-              <a:rPr lang="en-US" smtClean="0"/>
+              <a:rPr lang="en-US"/>
               <a:t>Second level</a:t>
             </a:r>
           </a:p>
           <a:p>
             <a:pPr lvl="2"/>
             <a:r>
-              <a:rPr lang="en-US" smtClean="0"/>
+              <a:rPr lang="en-US"/>
               <a:t>Third level</a:t>
             </a:r>
           </a:p>
           <a:p>
             <a:pPr lvl="3"/>
             <a:r>
-              <a:rPr lang="en-US" smtClean="0"/>
+              <a:rPr lang="en-US"/>
               <a:t>Fourth level</a:t>
             </a:r>
           </a:p>
           <a:p>
             <a:pPr lvl="4"/>
             <a:r>
-              <a:rPr lang="en-US" smtClean="0"/>
+              <a:rPr lang="en-US"/>
               <a:t>Fifth level</a:t>
             </a:r>
-            <a:endParaRPr lang="en-US"/>
           </a:p>
         </p:txBody>
       </p:sp>
@@ -460,6 +476,90 @@
 </p:notesMaster>
 </file>
 
+<file path=ppt/notesSlides/notesSlide1.xml><?xml version="1.0" encoding="utf-8"?>
+<p:notes xmlns:a="http://schemas.openxmlformats.org/drawingml/2006/main" xmlns:r="http://schemas.openxmlformats.org/officeDocument/2006/relationships" xmlns:p="http://schemas.openxmlformats.org/presentationml/2006/main">
+  <p:cSld>
+    <p:spTree>
+      <p:nvGrpSpPr>
+        <p:cNvPr id="1" name=""/>
+        <p:cNvGrpSpPr/>
+        <p:nvPr/>
+      </p:nvGrpSpPr>
+      <p:grpSpPr>
+        <a:xfrm>
+          <a:off x="0" y="0"/>
+          <a:ext cx="0" cy="0"/>
+          <a:chOff x="0" y="0"/>
+          <a:chExt cx="0" cy="0"/>
+        </a:xfrm>
+      </p:grpSpPr>
+      <p:sp>
+        <p:nvSpPr>
+          <p:cNvPr id="2" name="Slide Image Placeholder 1"/>
+          <p:cNvSpPr>
+            <a:spLocks noGrp="1" noRot="1" noChangeAspect="1"/>
+          </p:cNvSpPr>
+          <p:nvPr>
+            <p:ph type="sldImg"/>
+          </p:nvPr>
+        </p:nvSpPr>
+        <p:spPr/>
+      </p:sp>
+      <p:sp>
+        <p:nvSpPr>
+          <p:cNvPr id="3" name="Notes Placeholder 2"/>
+          <p:cNvSpPr>
+            <a:spLocks noGrp="1"/>
+          </p:cNvSpPr>
+          <p:nvPr>
+            <p:ph type="body" idx="1"/>
+          </p:nvPr>
+        </p:nvSpPr>
+        <p:spPr/>
+        <p:txBody>
+          <a:bodyPr/>
+          <a:lstStyle/>
+          <a:p>
+            <a:endParaRPr lang="en-SG" dirty="0"/>
+          </a:p>
+        </p:txBody>
+      </p:sp>
+      <p:sp>
+        <p:nvSpPr>
+          <p:cNvPr id="4" name="Slide Number Placeholder 3"/>
+          <p:cNvSpPr>
+            <a:spLocks noGrp="1"/>
+          </p:cNvSpPr>
+          <p:nvPr>
+            <p:ph type="sldNum" sz="quarter" idx="10"/>
+          </p:nvPr>
+        </p:nvSpPr>
+        <p:spPr/>
+        <p:txBody>
+          <a:bodyPr/>
+          <a:lstStyle/>
+          <a:p>
+            <a:fld id="{5A7AB025-77E3-4BD1-A2FD-B3183DBA47A3}" type="slidenum">
+              <a:rPr lang="en-US" smtClean="0"/>
+              <a:t>2</a:t>
+            </a:fld>
+            <a:endParaRPr lang="en-US"/>
+          </a:p>
+        </p:txBody>
+      </p:sp>
+    </p:spTree>
+    <p:extLst>
+      <p:ext uri="{BB962C8B-B14F-4D97-AF65-F5344CB8AC3E}">
+        <p14:creationId xmlns:p14="http://schemas.microsoft.com/office/powerpoint/2010/main" val="791975182"/>
+      </p:ext>
+    </p:extLst>
+  </p:cSld>
+  <p:clrMapOvr>
+    <a:masterClrMapping/>
+  </p:clrMapOvr>
+</p:notes>
+</file>
+
 <file path=ppt/slideLayouts/slideLayout1.xml><?xml version="1.0" encoding="utf-8"?>
 <p:sldLayout xmlns:a="http://schemas.openxmlformats.org/drawingml/2006/main" xmlns:r="http://schemas.openxmlformats.org/officeDocument/2006/relationships" xmlns:p="http://schemas.openxmlformats.org/presentationml/2006/main" type="title" preserve="1">
   <p:cSld name="Title Slide">
@@ -498,10 +598,9 @@
           <a:lstStyle/>
           <a:p>
             <a:r>
-              <a:rPr lang="en-US" smtClean="0"/>
+              <a:rPr lang="en-US"/>
               <a:t>Click to edit Master title style</a:t>
             </a:r>
-            <a:endParaRPr lang="en-US"/>
           </a:p>
         </p:txBody>
       </p:sp>
@@ -617,10 +716,9 @@
           </a:lstStyle>
           <a:p>
             <a:r>
-              <a:rPr lang="en-US" smtClean="0"/>
+              <a:rPr lang="en-US"/>
               <a:t>Click to edit Master subtitle style</a:t>
             </a:r>
-            <a:endParaRPr lang="en-US"/>
           </a:p>
         </p:txBody>
       </p:sp>
@@ -641,7 +739,7 @@
           <a:p>
             <a:fld id="{78C97017-6FC3-485B-9764-EAC9E56C1D49}" type="datetimeFigureOut">
               <a:rPr lang="en-US" smtClean="0"/>
-              <a:t>10/16/2016</a:t>
+              <a:t>4/14/2018</a:t>
             </a:fld>
             <a:endParaRPr lang="en-US"/>
           </a:p>
@@ -735,10 +833,9 @@
           <a:lstStyle/>
           <a:p>
             <a:r>
-              <a:rPr lang="en-US" smtClean="0"/>
+              <a:rPr lang="en-US"/>
               <a:t>Click to edit Master title style</a:t>
             </a:r>
-            <a:endParaRPr lang="en-US"/>
           </a:p>
         </p:txBody>
       </p:sp>
@@ -759,38 +856,37 @@
           <a:p>
             <a:pPr lvl="0"/>
             <a:r>
-              <a:rPr lang="en-US" smtClean="0"/>
+              <a:rPr lang="en-US"/>
               <a:t>Click to edit Master text styles</a:t>
             </a:r>
           </a:p>
           <a:p>
             <a:pPr lvl="1"/>
             <a:r>
-              <a:rPr lang="en-US" smtClean="0"/>
+              <a:rPr lang="en-US"/>
               <a:t>Second level</a:t>
             </a:r>
           </a:p>
           <a:p>
             <a:pPr lvl="2"/>
             <a:r>
-              <a:rPr lang="en-US" smtClean="0"/>
+              <a:rPr lang="en-US"/>
               <a:t>Third level</a:t>
             </a:r>
           </a:p>
           <a:p>
             <a:pPr lvl="3"/>
             <a:r>
-              <a:rPr lang="en-US" smtClean="0"/>
+              <a:rPr lang="en-US"/>
               <a:t>Fourth level</a:t>
             </a:r>
           </a:p>
           <a:p>
             <a:pPr lvl="4"/>
             <a:r>
-              <a:rPr lang="en-US" smtClean="0"/>
+              <a:rPr lang="en-US"/>
               <a:t>Fifth level</a:t>
             </a:r>
-            <a:endParaRPr lang="en-US"/>
           </a:p>
         </p:txBody>
       </p:sp>
@@ -811,7 +907,7 @@
           <a:p>
             <a:fld id="{78C97017-6FC3-485B-9764-EAC9E56C1D49}" type="datetimeFigureOut">
               <a:rPr lang="en-US" smtClean="0"/>
-              <a:t>10/16/2016</a:t>
+              <a:t>4/14/2018</a:t>
             </a:fld>
             <a:endParaRPr lang="en-US"/>
           </a:p>
@@ -910,10 +1006,9 @@
           <a:lstStyle/>
           <a:p>
             <a:r>
-              <a:rPr lang="en-US" smtClean="0"/>
+              <a:rPr lang="en-US"/>
               <a:t>Click to edit Master title style</a:t>
             </a:r>
-            <a:endParaRPr lang="en-US"/>
           </a:p>
         </p:txBody>
       </p:sp>
@@ -939,38 +1034,37 @@
           <a:p>
             <a:pPr lvl="0"/>
             <a:r>
-              <a:rPr lang="en-US" smtClean="0"/>
+              <a:rPr lang="en-US"/>
               <a:t>Click to edit Master text styles</a:t>
             </a:r>
           </a:p>
           <a:p>
             <a:pPr lvl="1"/>
             <a:r>
-              <a:rPr lang="en-US" smtClean="0"/>
+              <a:rPr lang="en-US"/>
               <a:t>Second level</a:t>
             </a:r>
           </a:p>
           <a:p>
             <a:pPr lvl="2"/>
             <a:r>
-              <a:rPr lang="en-US" smtClean="0"/>
+              <a:rPr lang="en-US"/>
               <a:t>Third level</a:t>
             </a:r>
           </a:p>
           <a:p>
             <a:pPr lvl="3"/>
             <a:r>
-              <a:rPr lang="en-US" smtClean="0"/>
+              <a:rPr lang="en-US"/>
               <a:t>Fourth level</a:t>
             </a:r>
           </a:p>
           <a:p>
             <a:pPr lvl="4"/>
             <a:r>
-              <a:rPr lang="en-US" smtClean="0"/>
+              <a:rPr lang="en-US"/>
               <a:t>Fifth level</a:t>
             </a:r>
-            <a:endParaRPr lang="en-US"/>
           </a:p>
         </p:txBody>
       </p:sp>
@@ -991,7 +1085,7 @@
           <a:p>
             <a:fld id="{78C97017-6FC3-485B-9764-EAC9E56C1D49}" type="datetimeFigureOut">
               <a:rPr lang="en-US" smtClean="0"/>
-              <a:t>10/16/2016</a:t>
+              <a:t>4/14/2018</a:t>
             </a:fld>
             <a:endParaRPr lang="en-US"/>
           </a:p>
@@ -1085,10 +1179,9 @@
           <a:lstStyle/>
           <a:p>
             <a:r>
-              <a:rPr lang="en-US" smtClean="0"/>
+              <a:rPr lang="en-US"/>
               <a:t>Click to edit Master title style</a:t>
             </a:r>
-            <a:endParaRPr lang="en-US"/>
           </a:p>
         </p:txBody>
       </p:sp>
@@ -1109,38 +1202,37 @@
           <a:p>
             <a:pPr lvl="0"/>
             <a:r>
-              <a:rPr lang="en-US" smtClean="0"/>
+              <a:rPr lang="en-US"/>
               <a:t>Click to edit Master text styles</a:t>
             </a:r>
           </a:p>
           <a:p>
             <a:pPr lvl="1"/>
             <a:r>
-              <a:rPr lang="en-US" smtClean="0"/>
+              <a:rPr lang="en-US"/>
               <a:t>Second level</a:t>
             </a:r>
           </a:p>
           <a:p>
             <a:pPr lvl="2"/>
             <a:r>
-              <a:rPr lang="en-US" smtClean="0"/>
+              <a:rPr lang="en-US"/>
               <a:t>Third level</a:t>
             </a:r>
           </a:p>
           <a:p>
             <a:pPr lvl="3"/>
             <a:r>
-              <a:rPr lang="en-US" smtClean="0"/>
+              <a:rPr lang="en-US"/>
               <a:t>Fourth level</a:t>
             </a:r>
           </a:p>
           <a:p>
             <a:pPr lvl="4"/>
             <a:r>
-              <a:rPr lang="en-US" smtClean="0"/>
+              <a:rPr lang="en-US"/>
               <a:t>Fifth level</a:t>
             </a:r>
-            <a:endParaRPr lang="en-US"/>
           </a:p>
         </p:txBody>
       </p:sp>
@@ -1161,7 +1253,7 @@
           <a:p>
             <a:fld id="{78C97017-6FC3-485B-9764-EAC9E56C1D49}" type="datetimeFigureOut">
               <a:rPr lang="en-US" smtClean="0"/>
-              <a:t>10/16/2016</a:t>
+              <a:t>4/14/2018</a:t>
             </a:fld>
             <a:endParaRPr lang="en-US"/>
           </a:p>
@@ -1264,10 +1356,9 @@
           </a:lstStyle>
           <a:p>
             <a:r>
-              <a:rPr lang="en-US" smtClean="0"/>
+              <a:rPr lang="en-US"/>
               <a:t>Click to edit Master title style</a:t>
             </a:r>
-            <a:endParaRPr lang="en-US"/>
           </a:p>
         </p:txBody>
       </p:sp>
@@ -1384,7 +1475,7 @@
           <a:p>
             <a:pPr lvl="0"/>
             <a:r>
-              <a:rPr lang="en-US" smtClean="0"/>
+              <a:rPr lang="en-US"/>
               <a:t>Click to edit Master text styles</a:t>
             </a:r>
           </a:p>
@@ -1407,7 +1498,7 @@
           <a:p>
             <a:fld id="{78C97017-6FC3-485B-9764-EAC9E56C1D49}" type="datetimeFigureOut">
               <a:rPr lang="en-US" smtClean="0"/>
-              <a:t>10/16/2016</a:t>
+              <a:t>4/14/2018</a:t>
             </a:fld>
             <a:endParaRPr lang="en-US"/>
           </a:p>
@@ -1501,10 +1592,9 @@
           <a:lstStyle/>
           <a:p>
             <a:r>
-              <a:rPr lang="en-US" smtClean="0"/>
+              <a:rPr lang="en-US"/>
               <a:t>Click to edit Master title style</a:t>
             </a:r>
-            <a:endParaRPr lang="en-US"/>
           </a:p>
         </p:txBody>
       </p:sp>
@@ -1558,38 +1648,37 @@
           <a:p>
             <a:pPr lvl="0"/>
             <a:r>
-              <a:rPr lang="en-US" smtClean="0"/>
+              <a:rPr lang="en-US"/>
               <a:t>Click to edit Master text styles</a:t>
             </a:r>
           </a:p>
           <a:p>
             <a:pPr lvl="1"/>
             <a:r>
-              <a:rPr lang="en-US" smtClean="0"/>
+              <a:rPr lang="en-US"/>
               <a:t>Second level</a:t>
             </a:r>
           </a:p>
           <a:p>
             <a:pPr lvl="2"/>
             <a:r>
-              <a:rPr lang="en-US" smtClean="0"/>
+              <a:rPr lang="en-US"/>
               <a:t>Third level</a:t>
             </a:r>
           </a:p>
           <a:p>
             <a:pPr lvl="3"/>
             <a:r>
-              <a:rPr lang="en-US" smtClean="0"/>
+              <a:rPr lang="en-US"/>
               <a:t>Fourth level</a:t>
             </a:r>
           </a:p>
           <a:p>
             <a:pPr lvl="4"/>
             <a:r>
-              <a:rPr lang="en-US" smtClean="0"/>
+              <a:rPr lang="en-US"/>
               <a:t>Fifth level</a:t>
             </a:r>
-            <a:endParaRPr lang="en-US"/>
           </a:p>
         </p:txBody>
       </p:sp>
@@ -1643,38 +1732,37 @@
           <a:p>
             <a:pPr lvl="0"/>
             <a:r>
-              <a:rPr lang="en-US" smtClean="0"/>
+              <a:rPr lang="en-US"/>
               <a:t>Click to edit Master text styles</a:t>
             </a:r>
           </a:p>
           <a:p>
             <a:pPr lvl="1"/>
             <a:r>
-              <a:rPr lang="en-US" smtClean="0"/>
+              <a:rPr lang="en-US"/>
               <a:t>Second level</a:t>
             </a:r>
           </a:p>
           <a:p>
             <a:pPr lvl="2"/>
             <a:r>
-              <a:rPr lang="en-US" smtClean="0"/>
+              <a:rPr lang="en-US"/>
               <a:t>Third level</a:t>
             </a:r>
           </a:p>
           <a:p>
             <a:pPr lvl="3"/>
             <a:r>
-              <a:rPr lang="en-US" smtClean="0"/>
+              <a:rPr lang="en-US"/>
               <a:t>Fourth level</a:t>
             </a:r>
           </a:p>
           <a:p>
             <a:pPr lvl="4"/>
             <a:r>
-              <a:rPr lang="en-US" smtClean="0"/>
+              <a:rPr lang="en-US"/>
               <a:t>Fifth level</a:t>
             </a:r>
-            <a:endParaRPr lang="en-US"/>
           </a:p>
         </p:txBody>
       </p:sp>
@@ -1695,7 +1783,7 @@
           <a:p>
             <a:fld id="{78C97017-6FC3-485B-9764-EAC9E56C1D49}" type="datetimeFigureOut">
               <a:rPr lang="en-US" smtClean="0"/>
-              <a:t>10/16/2016</a:t>
+              <a:t>4/14/2018</a:t>
             </a:fld>
             <a:endParaRPr lang="en-US"/>
           </a:p>
@@ -1793,10 +1881,9 @@
           </a:lstStyle>
           <a:p>
             <a:r>
-              <a:rPr lang="en-US" smtClean="0"/>
+              <a:rPr lang="en-US"/>
               <a:t>Click to edit Master title style</a:t>
             </a:r>
-            <a:endParaRPr lang="en-US"/>
           </a:p>
         </p:txBody>
       </p:sp>
@@ -1859,7 +1946,7 @@
           <a:p>
             <a:pPr lvl="0"/>
             <a:r>
-              <a:rPr lang="en-US" smtClean="0"/>
+              <a:rPr lang="en-US"/>
               <a:t>Click to edit Master text styles</a:t>
             </a:r>
           </a:p>
@@ -1915,38 +2002,37 @@
           <a:p>
             <a:pPr lvl="0"/>
             <a:r>
-              <a:rPr lang="en-US" smtClean="0"/>
+              <a:rPr lang="en-US"/>
               <a:t>Click to edit Master text styles</a:t>
             </a:r>
           </a:p>
           <a:p>
             <a:pPr lvl="1"/>
             <a:r>
-              <a:rPr lang="en-US" smtClean="0"/>
+              <a:rPr lang="en-US"/>
               <a:t>Second level</a:t>
             </a:r>
           </a:p>
           <a:p>
             <a:pPr lvl="2"/>
             <a:r>
-              <a:rPr lang="en-US" smtClean="0"/>
+              <a:rPr lang="en-US"/>
               <a:t>Third level</a:t>
             </a:r>
           </a:p>
           <a:p>
             <a:pPr lvl="3"/>
             <a:r>
-              <a:rPr lang="en-US" smtClean="0"/>
+              <a:rPr lang="en-US"/>
               <a:t>Fourth level</a:t>
             </a:r>
           </a:p>
           <a:p>
             <a:pPr lvl="4"/>
             <a:r>
-              <a:rPr lang="en-US" smtClean="0"/>
+              <a:rPr lang="en-US"/>
               <a:t>Fifth level</a:t>
             </a:r>
-            <a:endParaRPr lang="en-US"/>
           </a:p>
         </p:txBody>
       </p:sp>
@@ -2009,7 +2095,7 @@
           <a:p>
             <a:pPr lvl="0"/>
             <a:r>
-              <a:rPr lang="en-US" smtClean="0"/>
+              <a:rPr lang="en-US"/>
               <a:t>Click to edit Master text styles</a:t>
             </a:r>
           </a:p>
@@ -2065,38 +2151,37 @@
           <a:p>
             <a:pPr lvl="0"/>
             <a:r>
-              <a:rPr lang="en-US" smtClean="0"/>
+              <a:rPr lang="en-US"/>
               <a:t>Click to edit Master text styles</a:t>
             </a:r>
           </a:p>
           <a:p>
             <a:pPr lvl="1"/>
             <a:r>
-              <a:rPr lang="en-US" smtClean="0"/>
+              <a:rPr lang="en-US"/>
               <a:t>Second level</a:t>
             </a:r>
           </a:p>
           <a:p>
             <a:pPr lvl="2"/>
             <a:r>
-              <a:rPr lang="en-US" smtClean="0"/>
+              <a:rPr lang="en-US"/>
               <a:t>Third level</a:t>
             </a:r>
           </a:p>
           <a:p>
             <a:pPr lvl="3"/>
             <a:r>
-              <a:rPr lang="en-US" smtClean="0"/>
+              <a:rPr lang="en-US"/>
               <a:t>Fourth level</a:t>
             </a:r>
           </a:p>
           <a:p>
             <a:pPr lvl="4"/>
             <a:r>
-              <a:rPr lang="en-US" smtClean="0"/>
+              <a:rPr lang="en-US"/>
               <a:t>Fifth level</a:t>
             </a:r>
-            <a:endParaRPr lang="en-US"/>
           </a:p>
         </p:txBody>
       </p:sp>
@@ -2117,7 +2202,7 @@
           <a:p>
             <a:fld id="{78C97017-6FC3-485B-9764-EAC9E56C1D49}" type="datetimeFigureOut">
               <a:rPr lang="en-US" smtClean="0"/>
-              <a:t>10/16/2016</a:t>
+              <a:t>4/14/2018</a:t>
             </a:fld>
             <a:endParaRPr lang="en-US"/>
           </a:p>
@@ -2211,10 +2296,9 @@
           <a:lstStyle/>
           <a:p>
             <a:r>
-              <a:rPr lang="en-US" smtClean="0"/>
+              <a:rPr lang="en-US"/>
               <a:t>Click to edit Master title style</a:t>
             </a:r>
-            <a:endParaRPr lang="en-US"/>
           </a:p>
         </p:txBody>
       </p:sp>
@@ -2235,7 +2319,7 @@
           <a:p>
             <a:fld id="{78C97017-6FC3-485B-9764-EAC9E56C1D49}" type="datetimeFigureOut">
               <a:rPr lang="en-US" smtClean="0"/>
-              <a:t>10/16/2016</a:t>
+              <a:t>4/14/2018</a:t>
             </a:fld>
             <a:endParaRPr lang="en-US"/>
           </a:p>
@@ -2330,7 +2414,7 @@
           <a:p>
             <a:fld id="{78C97017-6FC3-485B-9764-EAC9E56C1D49}" type="datetimeFigureOut">
               <a:rPr lang="en-US" smtClean="0"/>
-              <a:t>10/16/2016</a:t>
+              <a:t>4/14/2018</a:t>
             </a:fld>
             <a:endParaRPr lang="en-US"/>
           </a:p>
@@ -2433,10 +2517,9 @@
           </a:lstStyle>
           <a:p>
             <a:r>
-              <a:rPr lang="en-US" smtClean="0"/>
+              <a:rPr lang="en-US"/>
               <a:t>Click to edit Master title style</a:t>
             </a:r>
-            <a:endParaRPr lang="en-US"/>
           </a:p>
         </p:txBody>
       </p:sp>
@@ -2490,38 +2573,37 @@
           <a:p>
             <a:pPr lvl="0"/>
             <a:r>
-              <a:rPr lang="en-US" smtClean="0"/>
+              <a:rPr lang="en-US"/>
               <a:t>Click to edit Master text styles</a:t>
             </a:r>
           </a:p>
           <a:p>
             <a:pPr lvl="1"/>
             <a:r>
-              <a:rPr lang="en-US" smtClean="0"/>
+              <a:rPr lang="en-US"/>
               <a:t>Second level</a:t>
             </a:r>
           </a:p>
           <a:p>
             <a:pPr lvl="2"/>
             <a:r>
-              <a:rPr lang="en-US" smtClean="0"/>
+              <a:rPr lang="en-US"/>
               <a:t>Third level</a:t>
             </a:r>
           </a:p>
           <a:p>
             <a:pPr lvl="3"/>
             <a:r>
-              <a:rPr lang="en-US" smtClean="0"/>
+              <a:rPr lang="en-US"/>
               <a:t>Fourth level</a:t>
             </a:r>
           </a:p>
           <a:p>
             <a:pPr lvl="4"/>
             <a:r>
-              <a:rPr lang="en-US" smtClean="0"/>
+              <a:rPr lang="en-US"/>
               <a:t>Fifth level</a:t>
             </a:r>
-            <a:endParaRPr lang="en-US"/>
           </a:p>
         </p:txBody>
       </p:sp>
@@ -2584,7 +2666,7 @@
           <a:p>
             <a:pPr lvl="0"/>
             <a:r>
-              <a:rPr lang="en-US" smtClean="0"/>
+              <a:rPr lang="en-US"/>
               <a:t>Click to edit Master text styles</a:t>
             </a:r>
           </a:p>
@@ -2607,7 +2689,7 @@
           <a:p>
             <a:fld id="{78C97017-6FC3-485B-9764-EAC9E56C1D49}" type="datetimeFigureOut">
               <a:rPr lang="en-US" smtClean="0"/>
-              <a:t>10/16/2016</a:t>
+              <a:t>4/14/2018</a:t>
             </a:fld>
             <a:endParaRPr lang="en-US"/>
           </a:p>
@@ -2710,10 +2792,9 @@
           </a:lstStyle>
           <a:p>
             <a:r>
-              <a:rPr lang="en-US" smtClean="0"/>
+              <a:rPr lang="en-US"/>
               <a:t>Click to edit Master title style</a:t>
             </a:r>
-            <a:endParaRPr lang="en-US"/>
           </a:p>
         </p:txBody>
       </p:sp>
@@ -2837,7 +2918,7 @@
           <a:p>
             <a:pPr lvl="0"/>
             <a:r>
-              <a:rPr lang="en-US" smtClean="0"/>
+              <a:rPr lang="en-US"/>
               <a:t>Click to edit Master text styles</a:t>
             </a:r>
           </a:p>
@@ -2860,7 +2941,7 @@
           <a:p>
             <a:fld id="{78C97017-6FC3-485B-9764-EAC9E56C1D49}" type="datetimeFigureOut">
               <a:rPr lang="en-US" smtClean="0"/>
-              <a:t>10/16/2016</a:t>
+              <a:t>4/14/2018</a:t>
             </a:fld>
             <a:endParaRPr lang="en-US"/>
           </a:p>
@@ -2969,10 +3050,9 @@
           <a:lstStyle/>
           <a:p>
             <a:r>
-              <a:rPr lang="en-US" smtClean="0"/>
+              <a:rPr lang="en-US"/>
               <a:t>Click to edit Master title style</a:t>
             </a:r>
-            <a:endParaRPr lang="en-US"/>
           </a:p>
         </p:txBody>
       </p:sp>
@@ -3003,38 +3083,37 @@
           <a:p>
             <a:pPr lvl="0"/>
             <a:r>
-              <a:rPr lang="en-US" smtClean="0"/>
+              <a:rPr lang="en-US"/>
               <a:t>Click to edit Master text styles</a:t>
             </a:r>
           </a:p>
           <a:p>
             <a:pPr lvl="1"/>
             <a:r>
-              <a:rPr lang="en-US" smtClean="0"/>
+              <a:rPr lang="en-US"/>
               <a:t>Second level</a:t>
             </a:r>
           </a:p>
           <a:p>
             <a:pPr lvl="2"/>
             <a:r>
-              <a:rPr lang="en-US" smtClean="0"/>
+              <a:rPr lang="en-US"/>
               <a:t>Third level</a:t>
             </a:r>
           </a:p>
           <a:p>
             <a:pPr lvl="3"/>
             <a:r>
-              <a:rPr lang="en-US" smtClean="0"/>
+              <a:rPr lang="en-US"/>
               <a:t>Fourth level</a:t>
             </a:r>
           </a:p>
           <a:p>
             <a:pPr lvl="4"/>
             <a:r>
-              <a:rPr lang="en-US" smtClean="0"/>
+              <a:rPr lang="en-US"/>
               <a:t>Fifth level</a:t>
             </a:r>
-            <a:endParaRPr lang="en-US"/>
           </a:p>
         </p:txBody>
       </p:sp>
@@ -3073,7 +3152,7 @@
           <a:p>
             <a:fld id="{78C97017-6FC3-485B-9764-EAC9E56C1D49}" type="datetimeFigureOut">
               <a:rPr lang="en-US" smtClean="0"/>
-              <a:t>10/16/2016</a:t>
+              <a:t>4/14/2018</a:t>
             </a:fld>
             <a:endParaRPr lang="en-US"/>
           </a:p>
@@ -3492,7 +3571,7 @@
           <a:p>
             <a:pPr algn="ctr"/>
             <a:r>
-              <a:rPr lang="en-US" sz="1600" dirty="0" smtClean="0">
+              <a:rPr lang="en-US" sz="1600" dirty="0">
                 <a:solidFill>
                   <a:schemeClr val="bg1"/>
                 </a:solidFill>
@@ -3856,7 +3935,7 @@
           <a:p>
             <a:pPr algn="ctr"/>
             <a:r>
-              <a:rPr lang="en-US" sz="1600" dirty="0" smtClean="0">
+              <a:rPr lang="en-US" sz="1600" dirty="0">
                 <a:solidFill>
                   <a:schemeClr val="bg1"/>
                 </a:solidFill>
@@ -4003,7 +4082,7 @@
           <a:p>
             <a:pPr algn="ctr"/>
             <a:r>
-              <a:rPr lang="en-US" sz="1600" dirty="0" smtClean="0">
+              <a:rPr lang="en-US" sz="1600" dirty="0">
                 <a:solidFill>
                   <a:schemeClr val="bg1"/>
                 </a:solidFill>
@@ -4165,10 +4244,9 @@
           <a:lstStyle/>
           <a:p>
             <a:r>
-              <a:rPr lang="en-US" sz="1400" dirty="0" smtClean="0"/>
+              <a:rPr lang="en-US" sz="1400" dirty="0"/>
               <a:t>delete 1</a:t>
             </a:r>
-            <a:endParaRPr lang="en-US" sz="1400" dirty="0"/>
           </a:p>
         </p:txBody>
       </p:sp>
@@ -4231,18 +4309,13 @@
           <a:lstStyle/>
           <a:p>
             <a:r>
-              <a:rPr lang="en-US" sz="1400" dirty="0" smtClean="0">
+              <a:rPr lang="en-US" sz="1400" dirty="0">
                 <a:solidFill>
                   <a:srgbClr val="0070C0"/>
                 </a:solidFill>
               </a:rPr>
               <a:t>execute(“delete 1”)</a:t>
             </a:r>
-            <a:endParaRPr lang="en-US" sz="1400" dirty="0">
-              <a:solidFill>
-                <a:srgbClr val="0070C0"/>
-              </a:solidFill>
-            </a:endParaRPr>
           </a:p>
         </p:txBody>
       </p:sp>
@@ -4305,7 +4378,7 @@
           <a:lstStyle/>
           <a:p>
             <a:r>
-              <a:rPr lang="en-US" sz="1400" dirty="0" err="1" smtClean="0">
+              <a:rPr lang="en-US" sz="1400" dirty="0" err="1">
                 <a:solidFill>
                   <a:srgbClr val="7030A0"/>
                 </a:solidFill>
@@ -4313,18 +4386,13 @@
               <a:t>deletePerson</a:t>
             </a:r>
             <a:r>
-              <a:rPr lang="en-US" sz="1400" dirty="0" smtClean="0">
+              <a:rPr lang="en-US" sz="1400" dirty="0">
                 <a:solidFill>
                   <a:srgbClr val="7030A0"/>
                 </a:solidFill>
               </a:rPr>
               <a:t>(p)</a:t>
             </a:r>
-            <a:endParaRPr lang="en-US" sz="1400" dirty="0">
-              <a:solidFill>
-                <a:srgbClr val="7030A0"/>
-              </a:solidFill>
-            </a:endParaRPr>
           </a:p>
         </p:txBody>
       </p:sp>
@@ -4351,7 +4419,7 @@
           <a:lstStyle/>
           <a:p>
             <a:r>
-              <a:rPr lang="en-US" sz="1400" dirty="0" smtClean="0">
+              <a:rPr lang="en-US" sz="1400" dirty="0">
                 <a:solidFill>
                   <a:schemeClr val="accent5">
                     <a:lumMod val="75000"/>
@@ -4361,7 +4429,7 @@
               <a:t>post(</a:t>
             </a:r>
             <a:r>
-              <a:rPr lang="en-US" sz="1400" dirty="0" err="1" smtClean="0">
+              <a:rPr lang="en-US" sz="1400" dirty="0" err="1">
                 <a:solidFill>
                   <a:schemeClr val="accent5">
                     <a:lumMod val="75000"/>
@@ -4371,7 +4439,7 @@
               <a:t>AddressBookChangedEvent</a:t>
             </a:r>
             <a:r>
-              <a:rPr lang="en-US" sz="1400" dirty="0" smtClean="0">
+              <a:rPr lang="en-US" sz="1400" dirty="0">
                 <a:solidFill>
                   <a:schemeClr val="accent5">
                     <a:lumMod val="75000"/>
@@ -4380,13 +4448,6 @@
               </a:rPr>
               <a:t>)</a:t>
             </a:r>
-            <a:endParaRPr lang="en-US" sz="1400" dirty="0">
-              <a:solidFill>
-                <a:schemeClr val="accent5">
-                  <a:lumMod val="75000"/>
-                </a:schemeClr>
-              </a:solidFill>
-            </a:endParaRPr>
           </a:p>
         </p:txBody>
       </p:sp>
@@ -4552,7 +4613,7 @@
           <a:p>
             <a:pPr algn="ctr"/>
             <a:r>
-              <a:rPr lang="en-US" sz="1600" dirty="0" smtClean="0">
+              <a:rPr lang="en-US" sz="1600" dirty="0">
                 <a:solidFill>
                   <a:schemeClr val="bg1"/>
                 </a:solidFill>
@@ -4560,7 +4621,7 @@
               <a:t>:</a:t>
             </a:r>
             <a:r>
-              <a:rPr lang="en-US" sz="1600" dirty="0" err="1" smtClean="0">
+              <a:rPr lang="en-US" sz="1600" dirty="0" err="1">
                 <a:solidFill>
                   <a:schemeClr val="bg1"/>
                 </a:solidFill>
@@ -4793,7 +4854,7 @@
           <a:p>
             <a:pPr algn="ctr"/>
             <a:r>
-              <a:rPr lang="en-US" sz="1600" dirty="0" smtClean="0">
+              <a:rPr lang="en-US" sz="1600" dirty="0">
                 <a:solidFill>
                   <a:schemeClr val="bg1"/>
                 </a:solidFill>
@@ -4925,7 +4986,7 @@
           <a:lstStyle/>
           <a:p>
             <a:r>
-              <a:rPr lang="en-US" sz="1400" dirty="0" smtClean="0">
+              <a:rPr lang="en-US" sz="1400" dirty="0">
                 <a:solidFill>
                   <a:schemeClr val="accent5">
                     <a:lumMod val="75000"/>
@@ -4935,7 +4996,7 @@
               <a:t>post(</a:t>
             </a:r>
             <a:r>
-              <a:rPr lang="en-US" sz="1400" dirty="0" err="1" smtClean="0">
+              <a:rPr lang="en-US" sz="1400" dirty="0" err="1">
                 <a:solidFill>
                   <a:schemeClr val="accent5">
                     <a:lumMod val="75000"/>
@@ -4945,7 +5006,7 @@
               <a:t>AddressBookChangedEvent</a:t>
             </a:r>
             <a:r>
-              <a:rPr lang="en-US" sz="1400" dirty="0" smtClean="0">
+              <a:rPr lang="en-US" sz="1400" dirty="0">
                 <a:solidFill>
                   <a:schemeClr val="accent5">
                     <a:lumMod val="75000"/>
@@ -4954,13 +5015,6 @@
               </a:rPr>
               <a:t>)</a:t>
             </a:r>
-            <a:endParaRPr lang="en-US" sz="1400" dirty="0">
-              <a:solidFill>
-                <a:schemeClr val="accent5">
-                  <a:lumMod val="75000"/>
-                </a:schemeClr>
-              </a:solidFill>
-            </a:endParaRPr>
           </a:p>
         </p:txBody>
       </p:sp>
@@ -5052,7 +5106,7 @@
           <a:p>
             <a:pPr algn="ctr"/>
             <a:r>
-              <a:rPr lang="en-US" sz="1600" dirty="0" smtClean="0">
+              <a:rPr lang="en-US" sz="1600" dirty="0">
                 <a:solidFill>
                   <a:schemeClr val="bg1"/>
                 </a:solidFill>
@@ -5060,7 +5114,7 @@
               <a:t>:</a:t>
             </a:r>
             <a:r>
-              <a:rPr lang="en-US" sz="1600" dirty="0" err="1" smtClean="0">
+              <a:rPr lang="en-US" sz="1600" dirty="0" err="1">
                 <a:solidFill>
                   <a:schemeClr val="bg1"/>
                 </a:solidFill>
@@ -5307,7 +5361,7 @@
           <a:lstStyle/>
           <a:p>
             <a:r>
-              <a:rPr lang="en-US" sz="1400" dirty="0" err="1" smtClean="0">
+              <a:rPr lang="en-US" sz="1400" dirty="0" err="1">
                 <a:solidFill>
                   <a:schemeClr val="accent6">
                     <a:lumMod val="75000"/>
@@ -5317,7 +5371,7 @@
               <a:t>handleAddresssBookChangedEvent</a:t>
             </a:r>
             <a:r>
-              <a:rPr lang="en-US" sz="1400" dirty="0" smtClean="0">
+              <a:rPr lang="en-US" sz="1400" dirty="0">
                 <a:solidFill>
                   <a:schemeClr val="accent6">
                     <a:lumMod val="75000"/>
@@ -5326,13 +5380,6 @@
               </a:rPr>
               <a:t>()</a:t>
             </a:r>
-            <a:endParaRPr lang="en-US" sz="1400" dirty="0">
-              <a:solidFill>
-                <a:schemeClr val="accent6">
-                  <a:lumMod val="75000"/>
-                </a:schemeClr>
-              </a:solidFill>
-            </a:endParaRPr>
           </a:p>
         </p:txBody>
       </p:sp>
@@ -5417,7 +5464,7 @@
           <a:p>
             <a:pPr algn="ctr"/>
             <a:r>
-              <a:rPr lang="en-US" sz="1600" dirty="0" smtClean="0">
+              <a:rPr lang="en-US" sz="1600" dirty="0">
                 <a:solidFill>
                   <a:schemeClr val="bg1"/>
                 </a:solidFill>
@@ -5620,7 +5667,7 @@
           <a:lstStyle/>
           <a:p>
             <a:r>
-              <a:rPr lang="en-US" sz="1400" dirty="0" err="1" smtClean="0">
+              <a:rPr lang="en-US" sz="1400" dirty="0" err="1">
                 <a:solidFill>
                   <a:srgbClr val="00B050"/>
                 </a:solidFill>
@@ -5628,18 +5675,13 @@
               <a:t>handleAddresssBookChangedEvent</a:t>
             </a:r>
             <a:r>
-              <a:rPr lang="en-US" sz="1400" dirty="0" smtClean="0">
+              <a:rPr lang="en-US" sz="1400" dirty="0">
                 <a:solidFill>
                   <a:srgbClr val="00B050"/>
                 </a:solidFill>
               </a:rPr>
               <a:t>()</a:t>
             </a:r>
-            <a:endParaRPr lang="en-US" sz="1400" dirty="0">
-              <a:solidFill>
-                <a:srgbClr val="00B050"/>
-              </a:solidFill>
-            </a:endParaRPr>
           </a:p>
         </p:txBody>
       </p:sp>
@@ -5826,18 +5868,13 @@
           <a:p>
             <a:pPr algn="r"/>
             <a:r>
-              <a:rPr lang="en-US" sz="1400" dirty="0" smtClean="0">
+              <a:rPr lang="en-US" sz="1400" dirty="0">
                 <a:solidFill>
                   <a:srgbClr val="00B050"/>
                 </a:solidFill>
               </a:rPr>
               <a:t>Update status bar</a:t>
             </a:r>
-            <a:endParaRPr lang="en-US" sz="1400" dirty="0">
-              <a:solidFill>
-                <a:srgbClr val="00B050"/>
-              </a:solidFill>
-            </a:endParaRPr>
           </a:p>
         </p:txBody>
       </p:sp>
@@ -6027,7 +6064,7 @@
           <a:lstStyle/>
           <a:p>
             <a:r>
-              <a:rPr lang="en-US" sz="1400" dirty="0" smtClean="0">
+              <a:rPr lang="en-US" sz="1400" dirty="0">
                 <a:solidFill>
                   <a:schemeClr val="accent6">
                     <a:lumMod val="75000"/>
@@ -6037,7 +6074,7 @@
               <a:t>Save </a:t>
             </a:r>
             <a:br>
-              <a:rPr lang="en-US" sz="1400" dirty="0" smtClean="0">
+              <a:rPr lang="en-US" sz="1400" dirty="0">
                 <a:solidFill>
                   <a:schemeClr val="accent6">
                     <a:lumMod val="75000"/>
@@ -6046,7 +6083,7 @@
               </a:rPr>
             </a:br>
             <a:r>
-              <a:rPr lang="en-US" sz="1400" dirty="0" smtClean="0">
+              <a:rPr lang="en-US" sz="1400" dirty="0">
                 <a:solidFill>
                   <a:schemeClr val="accent6">
                     <a:lumMod val="75000"/>
@@ -6055,13 +6092,6 @@
               </a:rPr>
               <a:t>to file</a:t>
             </a:r>
-            <a:endParaRPr lang="en-US" sz="1400" dirty="0">
-              <a:solidFill>
-                <a:schemeClr val="accent6">
-                  <a:lumMod val="75000"/>
-                </a:schemeClr>
-              </a:solidFill>
-            </a:endParaRPr>
           </a:p>
         </p:txBody>
       </p:sp>
@@ -6069,6 +6099,2503 @@
     <p:extLst>
       <p:ext uri="{BB962C8B-B14F-4D97-AF65-F5344CB8AC3E}">
         <p14:creationId xmlns:p14="http://schemas.microsoft.com/office/powerpoint/2010/main" val="4023378879"/>
+      </p:ext>
+    </p:extLst>
+  </p:cSld>
+  <p:clrMapOvr>
+    <a:masterClrMapping/>
+  </p:clrMapOvr>
+</p:sld>
+</file>
+
+<file path=ppt/slides/slide2.xml><?xml version="1.0" encoding="utf-8"?>
+<p:sld xmlns:a="http://schemas.openxmlformats.org/drawingml/2006/main" xmlns:r="http://schemas.openxmlformats.org/officeDocument/2006/relationships" xmlns:p="http://schemas.openxmlformats.org/presentationml/2006/main">
+  <p:cSld>
+    <p:spTree>
+      <p:nvGrpSpPr>
+        <p:cNvPr id="1" name=""/>
+        <p:cNvGrpSpPr/>
+        <p:nvPr/>
+      </p:nvGrpSpPr>
+      <p:grpSpPr>
+        <a:xfrm>
+          <a:off x="0" y="0"/>
+          <a:ext cx="0" cy="0"/>
+          <a:chOff x="0" y="0"/>
+          <a:chExt cx="0" cy="0"/>
+        </a:xfrm>
+      </p:grpSpPr>
+      <p:cxnSp>
+        <p:nvCxnSpPr>
+          <p:cNvPr id="134" name="Straight Arrow Connector 133">
+            <a:extLst>
+              <a:ext uri="{FF2B5EF4-FFF2-40B4-BE49-F238E27FC236}">
+                <a16:creationId xmlns:a16="http://schemas.microsoft.com/office/drawing/2014/main" id="{4441F1A7-EE24-4A2B-9447-34DCF53F0C0E}"/>
+              </a:ext>
+            </a:extLst>
+          </p:cNvPr>
+          <p:cNvCxnSpPr>
+            <a:cxnSpLocks/>
+          </p:cNvCxnSpPr>
+          <p:nvPr/>
+        </p:nvCxnSpPr>
+        <p:spPr>
+          <a:xfrm flipH="1">
+            <a:off x="2590800" y="1435664"/>
+            <a:ext cx="2746495" cy="11007"/>
+          </a:xfrm>
+          <a:prstGeom prst="straightConnector1">
+            <a:avLst/>
+          </a:prstGeom>
+          <a:ln w="19050">
+            <a:solidFill>
+              <a:srgbClr val="7030A0"/>
+            </a:solidFill>
+            <a:headEnd type="arrow" w="med" len="med"/>
+            <a:tailEnd type="none" w="med" len="med"/>
+          </a:ln>
+        </p:spPr>
+        <p:style>
+          <a:lnRef idx="1">
+            <a:schemeClr val="dk1"/>
+          </a:lnRef>
+          <a:fillRef idx="0">
+            <a:schemeClr val="dk1"/>
+          </a:fillRef>
+          <a:effectRef idx="0">
+            <a:schemeClr val="dk1"/>
+          </a:effectRef>
+          <a:fontRef idx="minor">
+            <a:schemeClr val="tx1"/>
+          </a:fontRef>
+        </p:style>
+      </p:cxnSp>
+      <p:cxnSp>
+        <p:nvCxnSpPr>
+          <p:cNvPr id="3" name="Straight Connector 2">
+            <a:extLst>
+              <a:ext uri="{FF2B5EF4-FFF2-40B4-BE49-F238E27FC236}">
+                <a16:creationId xmlns:a16="http://schemas.microsoft.com/office/drawing/2014/main" id="{8CFA84A1-365A-416A-834C-2413D2178B20}"/>
+              </a:ext>
+            </a:extLst>
+          </p:cNvPr>
+          <p:cNvCxnSpPr>
+            <a:cxnSpLocks/>
+          </p:cNvCxnSpPr>
+          <p:nvPr/>
+        </p:nvCxnSpPr>
+        <p:spPr>
+          <a:xfrm>
+            <a:off x="8292383" y="762000"/>
+            <a:ext cx="0" cy="3693529"/>
+          </a:xfrm>
+          <a:prstGeom prst="line">
+            <a:avLst/>
+          </a:prstGeom>
+          <a:ln w="19050">
+            <a:solidFill>
+              <a:schemeClr val="accent6">
+                <a:lumMod val="75000"/>
+              </a:schemeClr>
+            </a:solidFill>
+            <a:prstDash val="sysDash"/>
+          </a:ln>
+          <a:effectLst/>
+        </p:spPr>
+        <p:style>
+          <a:lnRef idx="1">
+            <a:schemeClr val="accent1"/>
+          </a:lnRef>
+          <a:fillRef idx="2">
+            <a:schemeClr val="accent1"/>
+          </a:fillRef>
+          <a:effectRef idx="1">
+            <a:schemeClr val="accent1"/>
+          </a:effectRef>
+          <a:fontRef idx="minor">
+            <a:schemeClr val="dk1"/>
+          </a:fontRef>
+        </p:style>
+      </p:cxnSp>
+      <p:sp>
+        <p:nvSpPr>
+          <p:cNvPr id="131" name="Freeform 11">
+            <a:extLst>
+              <a:ext uri="{FF2B5EF4-FFF2-40B4-BE49-F238E27FC236}">
+                <a16:creationId xmlns:a16="http://schemas.microsoft.com/office/drawing/2014/main" id="{D7886B4E-394E-4402-BBFD-C8D544F8F18A}"/>
+              </a:ext>
+            </a:extLst>
+          </p:cNvPr>
+          <p:cNvSpPr/>
+          <p:nvPr/>
+        </p:nvSpPr>
+        <p:spPr>
+          <a:xfrm rot="20735788" flipV="1">
+            <a:off x="5441505" y="2954028"/>
+            <a:ext cx="177196" cy="152737"/>
+          </a:xfrm>
+          <a:custGeom>
+            <a:avLst/>
+            <a:gdLst>
+              <a:gd name="connsiteX0" fmla="*/ 0 w 226400"/>
+              <a:gd name="connsiteY0" fmla="*/ 32920 h 171466"/>
+              <a:gd name="connsiteX1" fmla="*/ 157018 w 226400"/>
+              <a:gd name="connsiteY1" fmla="*/ 5211 h 171466"/>
+              <a:gd name="connsiteX2" fmla="*/ 221673 w 226400"/>
+              <a:gd name="connsiteY2" fmla="*/ 125284 h 171466"/>
+              <a:gd name="connsiteX3" fmla="*/ 36945 w 226400"/>
+              <a:gd name="connsiteY3" fmla="*/ 171466 h 171466"/>
+            </a:gdLst>
+            <a:ahLst/>
+            <a:cxnLst>
+              <a:cxn ang="0">
+                <a:pos x="connsiteX0" y="connsiteY0"/>
+              </a:cxn>
+              <a:cxn ang="0">
+                <a:pos x="connsiteX1" y="connsiteY1"/>
+              </a:cxn>
+              <a:cxn ang="0">
+                <a:pos x="connsiteX2" y="connsiteY2"/>
+              </a:cxn>
+              <a:cxn ang="0">
+                <a:pos x="connsiteX3" y="connsiteY3"/>
+              </a:cxn>
+            </a:cxnLst>
+            <a:rect l="l" t="t" r="r" b="b"/>
+            <a:pathLst>
+              <a:path w="226400" h="171466">
+                <a:moveTo>
+                  <a:pt x="0" y="32920"/>
+                </a:moveTo>
+                <a:cubicBezTo>
+                  <a:pt x="60036" y="11368"/>
+                  <a:pt x="120073" y="-10183"/>
+                  <a:pt x="157018" y="5211"/>
+                </a:cubicBezTo>
+                <a:cubicBezTo>
+                  <a:pt x="193963" y="20605"/>
+                  <a:pt x="241685" y="97575"/>
+                  <a:pt x="221673" y="125284"/>
+                </a:cubicBezTo>
+                <a:cubicBezTo>
+                  <a:pt x="201661" y="152993"/>
+                  <a:pt x="119303" y="162229"/>
+                  <a:pt x="36945" y="171466"/>
+                </a:cubicBezTo>
+              </a:path>
+            </a:pathLst>
+          </a:custGeom>
+          <a:ln w="19050">
+            <a:solidFill>
+              <a:srgbClr val="E21E8E"/>
+            </a:solidFill>
+            <a:headEnd type="arrow" w="med" len="med"/>
+            <a:tailEnd type="none" w="med" len="med"/>
+          </a:ln>
+        </p:spPr>
+        <p:style>
+          <a:lnRef idx="1">
+            <a:schemeClr val="accent1"/>
+          </a:lnRef>
+          <a:fillRef idx="0">
+            <a:schemeClr val="accent1"/>
+          </a:fillRef>
+          <a:effectRef idx="0">
+            <a:schemeClr val="accent1"/>
+          </a:effectRef>
+          <a:fontRef idx="minor">
+            <a:schemeClr val="tx1"/>
+          </a:fontRef>
+        </p:style>
+        <p:txBody>
+          <a:bodyPr rtlCol="0" anchor="ctr"/>
+          <a:lstStyle/>
+          <a:p>
+            <a:pPr algn="ctr"/>
+            <a:endParaRPr lang="en-SG"/>
+          </a:p>
+        </p:txBody>
+      </p:sp>
+      <p:sp>
+        <p:nvSpPr>
+          <p:cNvPr id="109" name="Rectangle 108">
+            <a:extLst>
+              <a:ext uri="{FF2B5EF4-FFF2-40B4-BE49-F238E27FC236}">
+                <a16:creationId xmlns:a16="http://schemas.microsoft.com/office/drawing/2014/main" id="{748F6DA9-25B1-478A-84D4-9739978789C9}"/>
+              </a:ext>
+            </a:extLst>
+          </p:cNvPr>
+          <p:cNvSpPr/>
+          <p:nvPr/>
+        </p:nvSpPr>
+        <p:spPr>
+          <a:xfrm>
+            <a:off x="5329133" y="2286000"/>
+            <a:ext cx="139084" cy="808744"/>
+          </a:xfrm>
+          <a:prstGeom prst="rect">
+            <a:avLst/>
+          </a:prstGeom>
+          <a:solidFill>
+            <a:srgbClr val="C00000"/>
+          </a:solidFill>
+          <a:ln>
+            <a:solidFill>
+              <a:srgbClr val="C00000"/>
+            </a:solidFill>
+          </a:ln>
+          <a:effectLst/>
+        </p:spPr>
+        <p:style>
+          <a:lnRef idx="1">
+            <a:schemeClr val="accent3"/>
+          </a:lnRef>
+          <a:fillRef idx="2">
+            <a:schemeClr val="accent3"/>
+          </a:fillRef>
+          <a:effectRef idx="1">
+            <a:schemeClr val="accent3"/>
+          </a:effectRef>
+          <a:fontRef idx="minor">
+            <a:schemeClr val="dk1"/>
+          </a:fontRef>
+        </p:style>
+        <p:txBody>
+          <a:bodyPr rtlCol="0" anchor="ctr"/>
+          <a:lstStyle/>
+          <a:p>
+            <a:pPr algn="ctr"/>
+            <a:endParaRPr lang="en-SG" sz="1400">
+              <a:solidFill>
+                <a:schemeClr val="dk1"/>
+              </a:solidFill>
+            </a:endParaRPr>
+          </a:p>
+        </p:txBody>
+      </p:sp>
+      <p:sp>
+        <p:nvSpPr>
+          <p:cNvPr id="108" name="Freeform 11">
+            <a:extLst>
+              <a:ext uri="{FF2B5EF4-FFF2-40B4-BE49-F238E27FC236}">
+                <a16:creationId xmlns:a16="http://schemas.microsoft.com/office/drawing/2014/main" id="{1F91498B-DA66-42EE-92FA-693940018E77}"/>
+              </a:ext>
+            </a:extLst>
+          </p:cNvPr>
+          <p:cNvSpPr/>
+          <p:nvPr/>
+        </p:nvSpPr>
+        <p:spPr>
+          <a:xfrm rot="2600998" flipH="1" flipV="1">
+            <a:off x="2342878" y="1526027"/>
+            <a:ext cx="363701" cy="588247"/>
+          </a:xfrm>
+          <a:custGeom>
+            <a:avLst/>
+            <a:gdLst>
+              <a:gd name="connsiteX0" fmla="*/ 0 w 226400"/>
+              <a:gd name="connsiteY0" fmla="*/ 32920 h 171466"/>
+              <a:gd name="connsiteX1" fmla="*/ 157018 w 226400"/>
+              <a:gd name="connsiteY1" fmla="*/ 5211 h 171466"/>
+              <a:gd name="connsiteX2" fmla="*/ 221673 w 226400"/>
+              <a:gd name="connsiteY2" fmla="*/ 125284 h 171466"/>
+              <a:gd name="connsiteX3" fmla="*/ 36945 w 226400"/>
+              <a:gd name="connsiteY3" fmla="*/ 171466 h 171466"/>
+            </a:gdLst>
+            <a:ahLst/>
+            <a:cxnLst>
+              <a:cxn ang="0">
+                <a:pos x="connsiteX0" y="connsiteY0"/>
+              </a:cxn>
+              <a:cxn ang="0">
+                <a:pos x="connsiteX1" y="connsiteY1"/>
+              </a:cxn>
+              <a:cxn ang="0">
+                <a:pos x="connsiteX2" y="connsiteY2"/>
+              </a:cxn>
+              <a:cxn ang="0">
+                <a:pos x="connsiteX3" y="connsiteY3"/>
+              </a:cxn>
+            </a:cxnLst>
+            <a:rect l="l" t="t" r="r" b="b"/>
+            <a:pathLst>
+              <a:path w="226400" h="171466">
+                <a:moveTo>
+                  <a:pt x="0" y="32920"/>
+                </a:moveTo>
+                <a:cubicBezTo>
+                  <a:pt x="60036" y="11368"/>
+                  <a:pt x="120073" y="-10183"/>
+                  <a:pt x="157018" y="5211"/>
+                </a:cubicBezTo>
+                <a:cubicBezTo>
+                  <a:pt x="193963" y="20605"/>
+                  <a:pt x="241685" y="97575"/>
+                  <a:pt x="221673" y="125284"/>
+                </a:cubicBezTo>
+                <a:cubicBezTo>
+                  <a:pt x="201661" y="152993"/>
+                  <a:pt x="119303" y="162229"/>
+                  <a:pt x="36945" y="171466"/>
+                </a:cubicBezTo>
+              </a:path>
+            </a:pathLst>
+          </a:custGeom>
+          <a:ln w="19050">
+            <a:solidFill>
+              <a:srgbClr val="7030A0"/>
+            </a:solidFill>
+            <a:headEnd type="arrow" w="med" len="med"/>
+            <a:tailEnd type="none" w="med" len="med"/>
+          </a:ln>
+        </p:spPr>
+        <p:style>
+          <a:lnRef idx="1">
+            <a:schemeClr val="accent1"/>
+          </a:lnRef>
+          <a:fillRef idx="0">
+            <a:schemeClr val="accent1"/>
+          </a:fillRef>
+          <a:effectRef idx="0">
+            <a:schemeClr val="accent1"/>
+          </a:effectRef>
+          <a:fontRef idx="minor">
+            <a:schemeClr val="tx1"/>
+          </a:fontRef>
+        </p:style>
+        <p:txBody>
+          <a:bodyPr rtlCol="0" anchor="ctr"/>
+          <a:lstStyle/>
+          <a:p>
+            <a:pPr algn="ctr"/>
+            <a:endParaRPr lang="en-SG"/>
+          </a:p>
+        </p:txBody>
+      </p:sp>
+      <p:sp>
+        <p:nvSpPr>
+          <p:cNvPr id="2" name="Rectangle 62">
+            <a:extLst>
+              <a:ext uri="{FF2B5EF4-FFF2-40B4-BE49-F238E27FC236}">
+                <a16:creationId xmlns:a16="http://schemas.microsoft.com/office/drawing/2014/main" id="{06C0E808-0C4E-43FE-AD77-ECE68C51DAF3}"/>
+              </a:ext>
+            </a:extLst>
+          </p:cNvPr>
+          <p:cNvSpPr/>
+          <p:nvPr/>
+        </p:nvSpPr>
+        <p:spPr>
+          <a:xfrm>
+            <a:off x="7669365" y="392286"/>
+            <a:ext cx="1093635" cy="346760"/>
+          </a:xfrm>
+          <a:prstGeom prst="rect">
+            <a:avLst/>
+          </a:prstGeom>
+          <a:solidFill>
+            <a:schemeClr val="accent6">
+              <a:lumMod val="75000"/>
+            </a:schemeClr>
+          </a:solidFill>
+          <a:ln w="19050">
+            <a:solidFill>
+              <a:schemeClr val="accent6">
+                <a:lumMod val="75000"/>
+              </a:schemeClr>
+            </a:solidFill>
+          </a:ln>
+          <a:effectLst/>
+        </p:spPr>
+        <p:style>
+          <a:lnRef idx="1">
+            <a:schemeClr val="accent2"/>
+          </a:lnRef>
+          <a:fillRef idx="2">
+            <a:schemeClr val="accent2"/>
+          </a:fillRef>
+          <a:effectRef idx="1">
+            <a:schemeClr val="accent2"/>
+          </a:effectRef>
+          <a:fontRef idx="minor">
+            <a:schemeClr val="dk1"/>
+          </a:fontRef>
+        </p:style>
+        <p:txBody>
+          <a:bodyPr rtlCol="0" anchor="ctr"/>
+          <a:lstStyle/>
+          <a:p>
+            <a:pPr algn="ctr"/>
+            <a:r>
+              <a:rPr lang="en-US" sz="1600" dirty="0" err="1">
+                <a:solidFill>
+                  <a:schemeClr val="bg1"/>
+                </a:solidFill>
+              </a:rPr>
+              <a:t>logic:Logic</a:t>
+            </a:r>
+            <a:endParaRPr lang="en-SG" sz="1600" dirty="0">
+              <a:solidFill>
+                <a:schemeClr val="bg1"/>
+              </a:solidFill>
+            </a:endParaRPr>
+          </a:p>
+        </p:txBody>
+      </p:sp>
+      <p:sp>
+        <p:nvSpPr>
+          <p:cNvPr id="4" name="TextBox 3">
+            <a:extLst>
+              <a:ext uri="{FF2B5EF4-FFF2-40B4-BE49-F238E27FC236}">
+                <a16:creationId xmlns:a16="http://schemas.microsoft.com/office/drawing/2014/main" id="{8B14E6A0-D8E5-44C5-A9AB-7095A3657B96}"/>
+              </a:ext>
+            </a:extLst>
+          </p:cNvPr>
+          <p:cNvSpPr txBox="1"/>
+          <p:nvPr/>
+        </p:nvSpPr>
+        <p:spPr>
+          <a:xfrm>
+            <a:off x="2858867" y="2034416"/>
+            <a:ext cx="2367239" cy="184666"/>
+          </a:xfrm>
+          <a:prstGeom prst="rect">
+            <a:avLst/>
+          </a:prstGeom>
+          <a:noFill/>
+        </p:spPr>
+        <p:txBody>
+          <a:bodyPr wrap="square" lIns="0" tIns="0" rIns="0" bIns="0" rtlCol="0">
+            <a:spAutoFit/>
+          </a:bodyPr>
+          <a:lstStyle/>
+          <a:p>
+            <a:r>
+              <a:rPr lang="en-US" sz="1200" dirty="0" err="1">
+                <a:solidFill>
+                  <a:srgbClr val="C00000"/>
+                </a:solidFill>
+              </a:rPr>
+              <a:t>a.getSuggestions</a:t>
+            </a:r>
+            <a:r>
+              <a:rPr lang="en-US" sz="1200" dirty="0">
+                <a:solidFill>
+                  <a:srgbClr val="C00000"/>
+                </a:solidFill>
+              </a:rPr>
+              <a:t>(</a:t>
+            </a:r>
+            <a:r>
+              <a:rPr lang="en-US" sz="1200" dirty="0" err="1">
+                <a:solidFill>
+                  <a:srgbClr val="C00000"/>
+                </a:solidFill>
+              </a:rPr>
+              <a:t>CommandTextField</a:t>
+            </a:r>
+            <a:r>
+              <a:rPr lang="en-US" sz="1200" dirty="0">
+                <a:solidFill>
+                  <a:srgbClr val="C00000"/>
+                </a:solidFill>
+              </a:rPr>
+              <a:t>)</a:t>
+            </a:r>
+          </a:p>
+        </p:txBody>
+      </p:sp>
+      <p:sp>
+        <p:nvSpPr>
+          <p:cNvPr id="5" name="Rectangle 62">
+            <a:extLst>
+              <a:ext uri="{FF2B5EF4-FFF2-40B4-BE49-F238E27FC236}">
+                <a16:creationId xmlns:a16="http://schemas.microsoft.com/office/drawing/2014/main" id="{818CD32E-8CD3-48F7-9BA3-38F4B69E4C45}"/>
+              </a:ext>
+            </a:extLst>
+          </p:cNvPr>
+          <p:cNvSpPr/>
+          <p:nvPr/>
+        </p:nvSpPr>
+        <p:spPr>
+          <a:xfrm>
+            <a:off x="4571999" y="685800"/>
+            <a:ext cx="1600200" cy="381436"/>
+          </a:xfrm>
+          <a:prstGeom prst="rect">
+            <a:avLst/>
+          </a:prstGeom>
+          <a:solidFill>
+            <a:srgbClr val="C00000"/>
+          </a:solidFill>
+          <a:ln w="19050">
+            <a:solidFill>
+              <a:srgbClr val="C00000"/>
+            </a:solidFill>
+          </a:ln>
+          <a:effectLst/>
+        </p:spPr>
+        <p:style>
+          <a:lnRef idx="1">
+            <a:schemeClr val="accent2"/>
+          </a:lnRef>
+          <a:fillRef idx="2">
+            <a:schemeClr val="accent2"/>
+          </a:fillRef>
+          <a:effectRef idx="1">
+            <a:schemeClr val="accent2"/>
+          </a:effectRef>
+          <a:fontRef idx="minor">
+            <a:schemeClr val="dk1"/>
+          </a:fontRef>
+        </p:style>
+        <p:txBody>
+          <a:bodyPr rtlCol="0" anchor="ctr"/>
+          <a:lstStyle/>
+          <a:p>
+            <a:pPr algn="ctr"/>
+            <a:r>
+              <a:rPr lang="en-US" sz="1600" dirty="0">
+                <a:solidFill>
+                  <a:schemeClr val="bg1"/>
+                </a:solidFill>
+              </a:rPr>
+              <a:t>a:Autocomplete</a:t>
+            </a:r>
+            <a:endParaRPr lang="en-SG" sz="1600" dirty="0">
+              <a:solidFill>
+                <a:schemeClr val="bg1"/>
+              </a:solidFill>
+            </a:endParaRPr>
+          </a:p>
+        </p:txBody>
+      </p:sp>
+      <p:cxnSp>
+        <p:nvCxnSpPr>
+          <p:cNvPr id="6" name="Straight Connector 5">
+            <a:extLst>
+              <a:ext uri="{FF2B5EF4-FFF2-40B4-BE49-F238E27FC236}">
+                <a16:creationId xmlns:a16="http://schemas.microsoft.com/office/drawing/2014/main" id="{2C7F0616-6B74-41C0-8BF0-7940D2EBB0E5}"/>
+              </a:ext>
+            </a:extLst>
+          </p:cNvPr>
+          <p:cNvCxnSpPr>
+            <a:cxnSpLocks/>
+          </p:cNvCxnSpPr>
+          <p:nvPr/>
+        </p:nvCxnSpPr>
+        <p:spPr>
+          <a:xfrm>
+            <a:off x="5396209" y="990375"/>
+            <a:ext cx="0" cy="3357754"/>
+          </a:xfrm>
+          <a:prstGeom prst="line">
+            <a:avLst/>
+          </a:prstGeom>
+          <a:ln w="19050">
+            <a:solidFill>
+              <a:srgbClr val="C00000"/>
+            </a:solidFill>
+            <a:prstDash val="sysDash"/>
+          </a:ln>
+          <a:effectLst/>
+        </p:spPr>
+        <p:style>
+          <a:lnRef idx="1">
+            <a:schemeClr val="accent1"/>
+          </a:lnRef>
+          <a:fillRef idx="2">
+            <a:schemeClr val="accent1"/>
+          </a:fillRef>
+          <a:effectRef idx="1">
+            <a:schemeClr val="accent1"/>
+          </a:effectRef>
+          <a:fontRef idx="minor">
+            <a:schemeClr val="dk1"/>
+          </a:fontRef>
+        </p:style>
+      </p:cxnSp>
+      <p:sp>
+        <p:nvSpPr>
+          <p:cNvPr id="12" name="Rectangle 62">
+            <a:extLst>
+              <a:ext uri="{FF2B5EF4-FFF2-40B4-BE49-F238E27FC236}">
+                <a16:creationId xmlns:a16="http://schemas.microsoft.com/office/drawing/2014/main" id="{C39A8141-6BD0-4B08-A3C9-679986268F5B}"/>
+              </a:ext>
+            </a:extLst>
+          </p:cNvPr>
+          <p:cNvSpPr/>
+          <p:nvPr/>
+        </p:nvSpPr>
+        <p:spPr>
+          <a:xfrm>
+            <a:off x="1777820" y="418193"/>
+            <a:ext cx="1488164" cy="346760"/>
+          </a:xfrm>
+          <a:prstGeom prst="rect">
+            <a:avLst/>
+          </a:prstGeom>
+          <a:solidFill>
+            <a:srgbClr val="7030A0"/>
+          </a:solidFill>
+          <a:ln w="19050">
+            <a:solidFill>
+              <a:srgbClr val="7030A0"/>
+            </a:solidFill>
+          </a:ln>
+          <a:effectLst/>
+        </p:spPr>
+        <p:style>
+          <a:lnRef idx="1">
+            <a:schemeClr val="accent2"/>
+          </a:lnRef>
+          <a:fillRef idx="2">
+            <a:schemeClr val="accent2"/>
+          </a:fillRef>
+          <a:effectRef idx="1">
+            <a:schemeClr val="accent2"/>
+          </a:effectRef>
+          <a:fontRef idx="minor">
+            <a:schemeClr val="dk1"/>
+          </a:fontRef>
+        </p:style>
+        <p:txBody>
+          <a:bodyPr rtlCol="0" anchor="ctr"/>
+          <a:lstStyle/>
+          <a:p>
+            <a:pPr algn="ctr"/>
+            <a:r>
+              <a:rPr lang="en-US" sz="1600" dirty="0">
+                <a:solidFill>
+                  <a:schemeClr val="bg1"/>
+                </a:solidFill>
+              </a:rPr>
+              <a:t>:</a:t>
+            </a:r>
+            <a:r>
+              <a:rPr lang="en-US" sz="1600" dirty="0" err="1">
+                <a:solidFill>
+                  <a:schemeClr val="bg1"/>
+                </a:solidFill>
+              </a:rPr>
+              <a:t>CommandBox</a:t>
+            </a:r>
+            <a:endParaRPr lang="en-SG" sz="1600" dirty="0">
+              <a:solidFill>
+                <a:schemeClr val="bg1"/>
+              </a:solidFill>
+            </a:endParaRPr>
+          </a:p>
+        </p:txBody>
+      </p:sp>
+      <p:cxnSp>
+        <p:nvCxnSpPr>
+          <p:cNvPr id="13" name="Straight Connector 12">
+            <a:extLst>
+              <a:ext uri="{FF2B5EF4-FFF2-40B4-BE49-F238E27FC236}">
+                <a16:creationId xmlns:a16="http://schemas.microsoft.com/office/drawing/2014/main" id="{A77381E5-DFFC-4299-A289-A728E2FBAA80}"/>
+              </a:ext>
+            </a:extLst>
+          </p:cNvPr>
+          <p:cNvCxnSpPr>
+            <a:cxnSpLocks/>
+          </p:cNvCxnSpPr>
+          <p:nvPr/>
+        </p:nvCxnSpPr>
+        <p:spPr>
+          <a:xfrm>
+            <a:off x="2589071" y="1114564"/>
+            <a:ext cx="0" cy="3357754"/>
+          </a:xfrm>
+          <a:prstGeom prst="line">
+            <a:avLst/>
+          </a:prstGeom>
+          <a:ln w="19050">
+            <a:solidFill>
+              <a:srgbClr val="7030A0"/>
+            </a:solidFill>
+            <a:prstDash val="sysDash"/>
+          </a:ln>
+          <a:effectLst/>
+        </p:spPr>
+        <p:style>
+          <a:lnRef idx="1">
+            <a:schemeClr val="accent1"/>
+          </a:lnRef>
+          <a:fillRef idx="2">
+            <a:schemeClr val="accent1"/>
+          </a:fillRef>
+          <a:effectRef idx="1">
+            <a:schemeClr val="accent1"/>
+          </a:effectRef>
+          <a:fontRef idx="minor">
+            <a:schemeClr val="dk1"/>
+          </a:fontRef>
+        </p:style>
+      </p:cxnSp>
+      <p:sp>
+        <p:nvSpPr>
+          <p:cNvPr id="17" name="TextBox 16">
+            <a:extLst>
+              <a:ext uri="{FF2B5EF4-FFF2-40B4-BE49-F238E27FC236}">
+                <a16:creationId xmlns:a16="http://schemas.microsoft.com/office/drawing/2014/main" id="{00EBF440-4782-4FDF-B6D4-A52B2BD1C1ED}"/>
+              </a:ext>
+            </a:extLst>
+          </p:cNvPr>
+          <p:cNvSpPr txBox="1"/>
+          <p:nvPr/>
+        </p:nvSpPr>
+        <p:spPr>
+          <a:xfrm>
+            <a:off x="421991" y="1508090"/>
+            <a:ext cx="1787548" cy="184666"/>
+          </a:xfrm>
+          <a:prstGeom prst="rect">
+            <a:avLst/>
+          </a:prstGeom>
+          <a:noFill/>
+        </p:spPr>
+        <p:txBody>
+          <a:bodyPr wrap="square" lIns="0" tIns="0" rIns="0" bIns="0" rtlCol="0">
+            <a:spAutoFit/>
+          </a:bodyPr>
+          <a:lstStyle/>
+          <a:p>
+            <a:pPr algn="r"/>
+            <a:r>
+              <a:rPr lang="en-US" sz="1200" dirty="0" err="1">
+                <a:solidFill>
+                  <a:srgbClr val="7030A0"/>
+                </a:solidFill>
+              </a:rPr>
+              <a:t>triggerAutocomplete</a:t>
+            </a:r>
+            <a:r>
+              <a:rPr lang="en-US" sz="1200" dirty="0">
+                <a:solidFill>
+                  <a:srgbClr val="7030A0"/>
+                </a:solidFill>
+              </a:rPr>
+              <a:t>()</a:t>
+            </a:r>
+          </a:p>
+        </p:txBody>
+      </p:sp>
+      <p:sp>
+        <p:nvSpPr>
+          <p:cNvPr id="43" name="Rectangle 42">
+            <a:extLst>
+              <a:ext uri="{FF2B5EF4-FFF2-40B4-BE49-F238E27FC236}">
+                <a16:creationId xmlns:a16="http://schemas.microsoft.com/office/drawing/2014/main" id="{87B919C5-97F1-4F2F-9C7D-AD04A466CED0}"/>
+              </a:ext>
+            </a:extLst>
+          </p:cNvPr>
+          <p:cNvSpPr/>
+          <p:nvPr/>
+        </p:nvSpPr>
+        <p:spPr>
+          <a:xfrm>
+            <a:off x="2514600" y="2057400"/>
+            <a:ext cx="142006" cy="2097673"/>
+          </a:xfrm>
+          <a:prstGeom prst="rect">
+            <a:avLst/>
+          </a:prstGeom>
+          <a:solidFill>
+            <a:srgbClr val="7030A0"/>
+          </a:solidFill>
+          <a:ln>
+            <a:solidFill>
+              <a:srgbClr val="7030A0"/>
+            </a:solidFill>
+          </a:ln>
+          <a:effectLst/>
+        </p:spPr>
+        <p:style>
+          <a:lnRef idx="1">
+            <a:schemeClr val="accent3"/>
+          </a:lnRef>
+          <a:fillRef idx="2">
+            <a:schemeClr val="accent3"/>
+          </a:fillRef>
+          <a:effectRef idx="1">
+            <a:schemeClr val="accent3"/>
+          </a:effectRef>
+          <a:fontRef idx="minor">
+            <a:schemeClr val="dk1"/>
+          </a:fontRef>
+        </p:style>
+        <p:txBody>
+          <a:bodyPr rtlCol="0" anchor="ctr"/>
+          <a:lstStyle/>
+          <a:p>
+            <a:pPr algn="ctr"/>
+            <a:endParaRPr lang="en-SG" sz="1400">
+              <a:solidFill>
+                <a:schemeClr val="dk1"/>
+              </a:solidFill>
+            </a:endParaRPr>
+          </a:p>
+        </p:txBody>
+      </p:sp>
+      <p:sp>
+        <p:nvSpPr>
+          <p:cNvPr id="50" name="Rectangle 49">
+            <a:extLst>
+              <a:ext uri="{FF2B5EF4-FFF2-40B4-BE49-F238E27FC236}">
+                <a16:creationId xmlns:a16="http://schemas.microsoft.com/office/drawing/2014/main" id="{2EE3608C-83B2-4A71-AEA0-7C65CBF88B32}"/>
+              </a:ext>
+            </a:extLst>
+          </p:cNvPr>
+          <p:cNvSpPr/>
+          <p:nvPr/>
+        </p:nvSpPr>
+        <p:spPr>
+          <a:xfrm>
+            <a:off x="2415944" y="3596549"/>
+            <a:ext cx="142007" cy="365851"/>
+          </a:xfrm>
+          <a:prstGeom prst="rect">
+            <a:avLst/>
+          </a:prstGeom>
+          <a:solidFill>
+            <a:srgbClr val="9933FF"/>
+          </a:solidFill>
+          <a:ln>
+            <a:solidFill>
+              <a:schemeClr val="bg1"/>
+            </a:solidFill>
+          </a:ln>
+          <a:effectLst/>
+        </p:spPr>
+        <p:style>
+          <a:lnRef idx="1">
+            <a:schemeClr val="accent3"/>
+          </a:lnRef>
+          <a:fillRef idx="2">
+            <a:schemeClr val="accent3"/>
+          </a:fillRef>
+          <a:effectRef idx="1">
+            <a:schemeClr val="accent3"/>
+          </a:effectRef>
+          <a:fontRef idx="minor">
+            <a:schemeClr val="dk1"/>
+          </a:fontRef>
+        </p:style>
+        <p:txBody>
+          <a:bodyPr rtlCol="0" anchor="ctr"/>
+          <a:lstStyle/>
+          <a:p>
+            <a:pPr algn="ctr"/>
+            <a:endParaRPr lang="en-SG" sz="1400">
+              <a:solidFill>
+                <a:schemeClr val="dk1"/>
+              </a:solidFill>
+            </a:endParaRPr>
+          </a:p>
+        </p:txBody>
+      </p:sp>
+      <p:cxnSp>
+        <p:nvCxnSpPr>
+          <p:cNvPr id="59" name="Straight Arrow Connector 58">
+            <a:extLst>
+              <a:ext uri="{FF2B5EF4-FFF2-40B4-BE49-F238E27FC236}">
+                <a16:creationId xmlns:a16="http://schemas.microsoft.com/office/drawing/2014/main" id="{0063FB59-E746-4DD7-B4B2-B016DE95A157}"/>
+              </a:ext>
+            </a:extLst>
+          </p:cNvPr>
+          <p:cNvCxnSpPr>
+            <a:cxnSpLocks/>
+          </p:cNvCxnSpPr>
+          <p:nvPr/>
+        </p:nvCxnSpPr>
+        <p:spPr>
+          <a:xfrm flipH="1" flipV="1">
+            <a:off x="2561315" y="2277245"/>
+            <a:ext cx="2765352" cy="16742"/>
+          </a:xfrm>
+          <a:prstGeom prst="straightConnector1">
+            <a:avLst/>
+          </a:prstGeom>
+          <a:ln w="19050">
+            <a:solidFill>
+              <a:srgbClr val="7030A0"/>
+            </a:solidFill>
+            <a:headEnd type="arrow" w="med" len="med"/>
+            <a:tailEnd type="none" w="med" len="med"/>
+          </a:ln>
+        </p:spPr>
+        <p:style>
+          <a:lnRef idx="1">
+            <a:schemeClr val="dk1"/>
+          </a:lnRef>
+          <a:fillRef idx="0">
+            <a:schemeClr val="dk1"/>
+          </a:fillRef>
+          <a:effectRef idx="0">
+            <a:schemeClr val="dk1"/>
+          </a:effectRef>
+          <a:fontRef idx="minor">
+            <a:schemeClr val="tx1"/>
+          </a:fontRef>
+        </p:style>
+      </p:cxnSp>
+      <p:sp>
+        <p:nvSpPr>
+          <p:cNvPr id="75" name="Rectangle 74">
+            <a:extLst>
+              <a:ext uri="{FF2B5EF4-FFF2-40B4-BE49-F238E27FC236}">
+                <a16:creationId xmlns:a16="http://schemas.microsoft.com/office/drawing/2014/main" id="{5C658DB3-E9B0-466E-A360-170BBD2244F8}"/>
+              </a:ext>
+            </a:extLst>
+          </p:cNvPr>
+          <p:cNvSpPr/>
+          <p:nvPr/>
+        </p:nvSpPr>
+        <p:spPr>
+          <a:xfrm>
+            <a:off x="5314168" y="1059871"/>
+            <a:ext cx="139084" cy="145459"/>
+          </a:xfrm>
+          <a:prstGeom prst="rect">
+            <a:avLst/>
+          </a:prstGeom>
+          <a:solidFill>
+            <a:schemeClr val="bg1"/>
+          </a:solidFill>
+          <a:ln w="19050">
+            <a:solidFill>
+              <a:srgbClr val="C00000"/>
+            </a:solidFill>
+          </a:ln>
+          <a:effectLst/>
+        </p:spPr>
+        <p:style>
+          <a:lnRef idx="1">
+            <a:schemeClr val="accent3"/>
+          </a:lnRef>
+          <a:fillRef idx="2">
+            <a:schemeClr val="accent3"/>
+          </a:fillRef>
+          <a:effectRef idx="1">
+            <a:schemeClr val="accent3"/>
+          </a:effectRef>
+          <a:fontRef idx="minor">
+            <a:schemeClr val="dk1"/>
+          </a:fontRef>
+        </p:style>
+        <p:txBody>
+          <a:bodyPr rtlCol="0" anchor="ctr"/>
+          <a:lstStyle/>
+          <a:p>
+            <a:pPr algn="ctr"/>
+            <a:endParaRPr lang="en-SG" sz="1400">
+              <a:solidFill>
+                <a:schemeClr val="dk1"/>
+              </a:solidFill>
+            </a:endParaRPr>
+          </a:p>
+        </p:txBody>
+      </p:sp>
+      <p:sp>
+        <p:nvSpPr>
+          <p:cNvPr id="78" name="TextBox 77">
+            <a:extLst>
+              <a:ext uri="{FF2B5EF4-FFF2-40B4-BE49-F238E27FC236}">
+                <a16:creationId xmlns:a16="http://schemas.microsoft.com/office/drawing/2014/main" id="{9FE33986-5E9E-483C-A8FE-52A58A38E6DE}"/>
+              </a:ext>
+            </a:extLst>
+          </p:cNvPr>
+          <p:cNvSpPr txBox="1"/>
+          <p:nvPr/>
+        </p:nvSpPr>
+        <p:spPr>
+          <a:xfrm>
+            <a:off x="304800" y="3354267"/>
+            <a:ext cx="1914818" cy="184666"/>
+          </a:xfrm>
+          <a:prstGeom prst="rect">
+            <a:avLst/>
+          </a:prstGeom>
+          <a:noFill/>
+        </p:spPr>
+        <p:txBody>
+          <a:bodyPr wrap="square" lIns="0" tIns="0" rIns="0" bIns="0" rtlCol="0">
+            <a:spAutoFit/>
+          </a:bodyPr>
+          <a:lstStyle/>
+          <a:p>
+            <a:pPr algn="r"/>
+            <a:r>
+              <a:rPr lang="en-US" sz="1200" dirty="0" err="1">
+                <a:solidFill>
+                  <a:srgbClr val="7030A0"/>
+                </a:solidFill>
+              </a:rPr>
+              <a:t>setContextMenu</a:t>
+            </a:r>
+            <a:r>
+              <a:rPr lang="en-US" sz="1200" dirty="0">
+                <a:solidFill>
+                  <a:srgbClr val="7030A0"/>
+                </a:solidFill>
+              </a:rPr>
+              <a:t>(suggestions)</a:t>
+            </a:r>
+          </a:p>
+        </p:txBody>
+      </p:sp>
+      <p:cxnSp>
+        <p:nvCxnSpPr>
+          <p:cNvPr id="91" name="Straight Arrow Connector 90">
+            <a:extLst>
+              <a:ext uri="{FF2B5EF4-FFF2-40B4-BE49-F238E27FC236}">
+                <a16:creationId xmlns:a16="http://schemas.microsoft.com/office/drawing/2014/main" id="{71DAFC45-00CC-4A99-95BA-EFD41994D637}"/>
+              </a:ext>
+            </a:extLst>
+          </p:cNvPr>
+          <p:cNvCxnSpPr>
+            <a:cxnSpLocks/>
+          </p:cNvCxnSpPr>
+          <p:nvPr/>
+        </p:nvCxnSpPr>
+        <p:spPr>
+          <a:xfrm flipH="1">
+            <a:off x="381000" y="591573"/>
+            <a:ext cx="1396822" cy="0"/>
+          </a:xfrm>
+          <a:prstGeom prst="straightConnector1">
+            <a:avLst/>
+          </a:prstGeom>
+          <a:ln w="19050">
+            <a:solidFill>
+              <a:schemeClr val="tx1"/>
+            </a:solidFill>
+            <a:headEnd type="arrow" w="med" len="med"/>
+            <a:tailEnd type="none" w="med" len="med"/>
+          </a:ln>
+        </p:spPr>
+        <p:style>
+          <a:lnRef idx="1">
+            <a:schemeClr val="dk1"/>
+          </a:lnRef>
+          <a:fillRef idx="0">
+            <a:schemeClr val="dk1"/>
+          </a:fillRef>
+          <a:effectRef idx="0">
+            <a:schemeClr val="dk1"/>
+          </a:effectRef>
+          <a:fontRef idx="minor">
+            <a:schemeClr val="tx1"/>
+          </a:fontRef>
+        </p:style>
+      </p:cxnSp>
+      <p:sp>
+        <p:nvSpPr>
+          <p:cNvPr id="92" name="TextBox 91">
+            <a:extLst>
+              <a:ext uri="{FF2B5EF4-FFF2-40B4-BE49-F238E27FC236}">
+                <a16:creationId xmlns:a16="http://schemas.microsoft.com/office/drawing/2014/main" id="{84C756CB-9551-494F-B140-C2CFCF403886}"/>
+              </a:ext>
+            </a:extLst>
+          </p:cNvPr>
+          <p:cNvSpPr txBox="1"/>
+          <p:nvPr/>
+        </p:nvSpPr>
+        <p:spPr>
+          <a:xfrm>
+            <a:off x="-162217" y="381000"/>
+            <a:ext cx="1787548" cy="184666"/>
+          </a:xfrm>
+          <a:prstGeom prst="rect">
+            <a:avLst/>
+          </a:prstGeom>
+          <a:noFill/>
+        </p:spPr>
+        <p:txBody>
+          <a:bodyPr wrap="square" lIns="0" tIns="0" rIns="0" bIns="0" rtlCol="0">
+            <a:spAutoFit/>
+          </a:bodyPr>
+          <a:lstStyle/>
+          <a:p>
+            <a:pPr algn="r"/>
+            <a:r>
+              <a:rPr lang="en-US" sz="1200" dirty="0" err="1"/>
+              <a:t>CommandBox</a:t>
+            </a:r>
+            <a:r>
+              <a:rPr lang="en-US" sz="1200" dirty="0"/>
+              <a:t>(logic)</a:t>
+            </a:r>
+          </a:p>
+        </p:txBody>
+      </p:sp>
+      <p:sp>
+        <p:nvSpPr>
+          <p:cNvPr id="93" name="Rectangle 92">
+            <a:extLst>
+              <a:ext uri="{FF2B5EF4-FFF2-40B4-BE49-F238E27FC236}">
+                <a16:creationId xmlns:a16="http://schemas.microsoft.com/office/drawing/2014/main" id="{8C88B72E-C90A-4A49-9358-0ACE86015EE8}"/>
+              </a:ext>
+            </a:extLst>
+          </p:cNvPr>
+          <p:cNvSpPr/>
+          <p:nvPr/>
+        </p:nvSpPr>
+        <p:spPr>
+          <a:xfrm>
+            <a:off x="2493318" y="762000"/>
+            <a:ext cx="194122" cy="977125"/>
+          </a:xfrm>
+          <a:prstGeom prst="rect">
+            <a:avLst/>
+          </a:prstGeom>
+          <a:solidFill>
+            <a:schemeClr val="bg1"/>
+          </a:solidFill>
+          <a:ln w="19050">
+            <a:solidFill>
+              <a:srgbClr val="7030A0"/>
+            </a:solidFill>
+          </a:ln>
+          <a:effectLst/>
+        </p:spPr>
+        <p:style>
+          <a:lnRef idx="1">
+            <a:schemeClr val="accent3"/>
+          </a:lnRef>
+          <a:fillRef idx="2">
+            <a:schemeClr val="accent3"/>
+          </a:fillRef>
+          <a:effectRef idx="1">
+            <a:schemeClr val="accent3"/>
+          </a:effectRef>
+          <a:fontRef idx="minor">
+            <a:schemeClr val="dk1"/>
+          </a:fontRef>
+        </p:style>
+        <p:txBody>
+          <a:bodyPr rtlCol="0" anchor="ctr"/>
+          <a:lstStyle/>
+          <a:p>
+            <a:pPr algn="ctr"/>
+            <a:endParaRPr lang="en-SG" sz="1400">
+              <a:solidFill>
+                <a:schemeClr val="dk1"/>
+              </a:solidFill>
+            </a:endParaRPr>
+          </a:p>
+        </p:txBody>
+      </p:sp>
+      <p:cxnSp>
+        <p:nvCxnSpPr>
+          <p:cNvPr id="99" name="Straight Arrow Connector 98">
+            <a:extLst>
+              <a:ext uri="{FF2B5EF4-FFF2-40B4-BE49-F238E27FC236}">
+                <a16:creationId xmlns:a16="http://schemas.microsoft.com/office/drawing/2014/main" id="{460C5283-5379-4897-9D36-EA76E70B904C}"/>
+              </a:ext>
+            </a:extLst>
+          </p:cNvPr>
+          <p:cNvCxnSpPr>
+            <a:cxnSpLocks/>
+          </p:cNvCxnSpPr>
+          <p:nvPr/>
+        </p:nvCxnSpPr>
+        <p:spPr>
+          <a:xfrm flipH="1">
+            <a:off x="2696106" y="893745"/>
+            <a:ext cx="1875894" cy="11007"/>
+          </a:xfrm>
+          <a:prstGeom prst="straightConnector1">
+            <a:avLst/>
+          </a:prstGeom>
+          <a:ln w="19050">
+            <a:solidFill>
+              <a:srgbClr val="7030A0"/>
+            </a:solidFill>
+            <a:headEnd type="arrow" w="med" len="med"/>
+            <a:tailEnd type="none" w="med" len="med"/>
+          </a:ln>
+        </p:spPr>
+        <p:style>
+          <a:lnRef idx="1">
+            <a:schemeClr val="dk1"/>
+          </a:lnRef>
+          <a:fillRef idx="0">
+            <a:schemeClr val="dk1"/>
+          </a:fillRef>
+          <a:effectRef idx="0">
+            <a:schemeClr val="dk1"/>
+          </a:effectRef>
+          <a:fontRef idx="minor">
+            <a:schemeClr val="tx1"/>
+          </a:fontRef>
+        </p:style>
+      </p:cxnSp>
+      <p:sp>
+        <p:nvSpPr>
+          <p:cNvPr id="104" name="TextBox 103">
+            <a:extLst>
+              <a:ext uri="{FF2B5EF4-FFF2-40B4-BE49-F238E27FC236}">
+                <a16:creationId xmlns:a16="http://schemas.microsoft.com/office/drawing/2014/main" id="{A577360F-6427-49FD-9846-1726C5E15E91}"/>
+              </a:ext>
+            </a:extLst>
+          </p:cNvPr>
+          <p:cNvSpPr txBox="1"/>
+          <p:nvPr/>
+        </p:nvSpPr>
+        <p:spPr>
+          <a:xfrm>
+            <a:off x="3446182" y="481756"/>
+            <a:ext cx="945619" cy="369332"/>
+          </a:xfrm>
+          <a:prstGeom prst="rect">
+            <a:avLst/>
+          </a:prstGeom>
+          <a:noFill/>
+        </p:spPr>
+        <p:txBody>
+          <a:bodyPr wrap="square" lIns="0" tIns="0" rIns="0" bIns="0" rtlCol="0">
+            <a:spAutoFit/>
+          </a:bodyPr>
+          <a:lstStyle/>
+          <a:p>
+            <a:r>
+              <a:rPr lang="en-US" sz="1200" dirty="0">
+                <a:solidFill>
+                  <a:srgbClr val="C00000"/>
+                </a:solidFill>
+              </a:rPr>
+              <a:t>Autocomplete</a:t>
+            </a:r>
+            <a:br>
+              <a:rPr lang="en-US" sz="1200" dirty="0">
+                <a:solidFill>
+                  <a:srgbClr val="C00000"/>
+                </a:solidFill>
+              </a:rPr>
+            </a:br>
+            <a:r>
+              <a:rPr lang="en-US" sz="1200" dirty="0">
+                <a:solidFill>
+                  <a:srgbClr val="C00000"/>
+                </a:solidFill>
+              </a:rPr>
+              <a:t>.</a:t>
+            </a:r>
+            <a:r>
+              <a:rPr lang="en-US" sz="1200" dirty="0" err="1">
+                <a:solidFill>
+                  <a:srgbClr val="C00000"/>
+                </a:solidFill>
+              </a:rPr>
+              <a:t>getInstance</a:t>
+            </a:r>
+            <a:r>
+              <a:rPr lang="en-US" sz="1200" dirty="0">
+                <a:solidFill>
+                  <a:srgbClr val="C00000"/>
+                </a:solidFill>
+              </a:rPr>
+              <a:t>()</a:t>
+            </a:r>
+          </a:p>
+        </p:txBody>
+      </p:sp>
+      <p:sp>
+        <p:nvSpPr>
+          <p:cNvPr id="49" name="Freeform 11">
+            <a:extLst>
+              <a:ext uri="{FF2B5EF4-FFF2-40B4-BE49-F238E27FC236}">
+                <a16:creationId xmlns:a16="http://schemas.microsoft.com/office/drawing/2014/main" id="{940947C8-AFB6-41B3-945D-8EE50BC7AA4A}"/>
+              </a:ext>
+            </a:extLst>
+          </p:cNvPr>
+          <p:cNvSpPr/>
+          <p:nvPr/>
+        </p:nvSpPr>
+        <p:spPr>
+          <a:xfrm rot="2600998" flipH="1" flipV="1">
+            <a:off x="2294936" y="3405231"/>
+            <a:ext cx="241690" cy="184532"/>
+          </a:xfrm>
+          <a:custGeom>
+            <a:avLst/>
+            <a:gdLst>
+              <a:gd name="connsiteX0" fmla="*/ 0 w 226400"/>
+              <a:gd name="connsiteY0" fmla="*/ 32920 h 171466"/>
+              <a:gd name="connsiteX1" fmla="*/ 157018 w 226400"/>
+              <a:gd name="connsiteY1" fmla="*/ 5211 h 171466"/>
+              <a:gd name="connsiteX2" fmla="*/ 221673 w 226400"/>
+              <a:gd name="connsiteY2" fmla="*/ 125284 h 171466"/>
+              <a:gd name="connsiteX3" fmla="*/ 36945 w 226400"/>
+              <a:gd name="connsiteY3" fmla="*/ 171466 h 171466"/>
+            </a:gdLst>
+            <a:ahLst/>
+            <a:cxnLst>
+              <a:cxn ang="0">
+                <a:pos x="connsiteX0" y="connsiteY0"/>
+              </a:cxn>
+              <a:cxn ang="0">
+                <a:pos x="connsiteX1" y="connsiteY1"/>
+              </a:cxn>
+              <a:cxn ang="0">
+                <a:pos x="connsiteX2" y="connsiteY2"/>
+              </a:cxn>
+              <a:cxn ang="0">
+                <a:pos x="connsiteX3" y="connsiteY3"/>
+              </a:cxn>
+            </a:cxnLst>
+            <a:rect l="l" t="t" r="r" b="b"/>
+            <a:pathLst>
+              <a:path w="226400" h="171466">
+                <a:moveTo>
+                  <a:pt x="0" y="32920"/>
+                </a:moveTo>
+                <a:cubicBezTo>
+                  <a:pt x="60036" y="11368"/>
+                  <a:pt x="120073" y="-10183"/>
+                  <a:pt x="157018" y="5211"/>
+                </a:cubicBezTo>
+                <a:cubicBezTo>
+                  <a:pt x="193963" y="20605"/>
+                  <a:pt x="241685" y="97575"/>
+                  <a:pt x="221673" y="125284"/>
+                </a:cubicBezTo>
+                <a:cubicBezTo>
+                  <a:pt x="201661" y="152993"/>
+                  <a:pt x="119303" y="162229"/>
+                  <a:pt x="36945" y="171466"/>
+                </a:cubicBezTo>
+              </a:path>
+            </a:pathLst>
+          </a:custGeom>
+          <a:ln w="19050">
+            <a:solidFill>
+              <a:srgbClr val="7030A0"/>
+            </a:solidFill>
+            <a:headEnd type="arrow" w="med" len="med"/>
+            <a:tailEnd type="none" w="med" len="med"/>
+          </a:ln>
+        </p:spPr>
+        <p:style>
+          <a:lnRef idx="1">
+            <a:schemeClr val="accent1"/>
+          </a:lnRef>
+          <a:fillRef idx="0">
+            <a:schemeClr val="accent1"/>
+          </a:fillRef>
+          <a:effectRef idx="0">
+            <a:schemeClr val="accent1"/>
+          </a:effectRef>
+          <a:fontRef idx="minor">
+            <a:schemeClr val="tx1"/>
+          </a:fontRef>
+        </p:style>
+        <p:txBody>
+          <a:bodyPr rtlCol="0" anchor="ctr"/>
+          <a:lstStyle/>
+          <a:p>
+            <a:pPr algn="ctr"/>
+            <a:endParaRPr lang="en-SG"/>
+          </a:p>
+        </p:txBody>
+      </p:sp>
+      <p:sp>
+        <p:nvSpPr>
+          <p:cNvPr id="114" name="Rectangle 113">
+            <a:extLst>
+              <a:ext uri="{FF2B5EF4-FFF2-40B4-BE49-F238E27FC236}">
+                <a16:creationId xmlns:a16="http://schemas.microsoft.com/office/drawing/2014/main" id="{B8C45E34-F9A9-45E8-B62C-9F76E11AAD94}"/>
+              </a:ext>
+            </a:extLst>
+          </p:cNvPr>
+          <p:cNvSpPr/>
+          <p:nvPr/>
+        </p:nvSpPr>
+        <p:spPr>
+          <a:xfrm>
+            <a:off x="2701634" y="1453257"/>
+            <a:ext cx="194122" cy="342475"/>
+          </a:xfrm>
+          <a:prstGeom prst="rect">
+            <a:avLst/>
+          </a:prstGeom>
+          <a:solidFill>
+            <a:schemeClr val="bg1"/>
+          </a:solidFill>
+          <a:ln w="19050">
+            <a:noFill/>
+          </a:ln>
+          <a:effectLst/>
+        </p:spPr>
+        <p:style>
+          <a:lnRef idx="1">
+            <a:schemeClr val="accent3"/>
+          </a:lnRef>
+          <a:fillRef idx="2">
+            <a:schemeClr val="accent3"/>
+          </a:fillRef>
+          <a:effectRef idx="1">
+            <a:schemeClr val="accent3"/>
+          </a:effectRef>
+          <a:fontRef idx="minor">
+            <a:schemeClr val="dk1"/>
+          </a:fontRef>
+        </p:style>
+        <p:txBody>
+          <a:bodyPr rtlCol="0" anchor="ctr"/>
+          <a:lstStyle/>
+          <a:p>
+            <a:pPr algn="ctr"/>
+            <a:endParaRPr lang="en-SG" sz="1400">
+              <a:solidFill>
+                <a:schemeClr val="dk1"/>
+              </a:solidFill>
+            </a:endParaRPr>
+          </a:p>
+        </p:txBody>
+      </p:sp>
+      <p:cxnSp>
+        <p:nvCxnSpPr>
+          <p:cNvPr id="122" name="Straight Arrow Connector 121">
+            <a:extLst>
+              <a:ext uri="{FF2B5EF4-FFF2-40B4-BE49-F238E27FC236}">
+                <a16:creationId xmlns:a16="http://schemas.microsoft.com/office/drawing/2014/main" id="{A852515E-7ED8-4646-B8D5-6D3ABEEBE602}"/>
+              </a:ext>
+            </a:extLst>
+          </p:cNvPr>
+          <p:cNvCxnSpPr/>
+          <p:nvPr/>
+        </p:nvCxnSpPr>
+        <p:spPr>
+          <a:xfrm flipH="1">
+            <a:off x="2656606" y="3094744"/>
+            <a:ext cx="2796646" cy="0"/>
+          </a:xfrm>
+          <a:prstGeom prst="straightConnector1">
+            <a:avLst/>
+          </a:prstGeom>
+          <a:ln w="19050">
+            <a:solidFill>
+              <a:srgbClr val="C00000"/>
+            </a:solidFill>
+            <a:prstDash val="sysDash"/>
+            <a:headEnd type="none" w="med" len="med"/>
+            <a:tailEnd type="arrow" w="med" len="med"/>
+          </a:ln>
+        </p:spPr>
+        <p:style>
+          <a:lnRef idx="1">
+            <a:schemeClr val="accent1"/>
+          </a:lnRef>
+          <a:fillRef idx="0">
+            <a:schemeClr val="accent1"/>
+          </a:fillRef>
+          <a:effectRef idx="0">
+            <a:schemeClr val="accent1"/>
+          </a:effectRef>
+          <a:fontRef idx="minor">
+            <a:schemeClr val="tx1"/>
+          </a:fontRef>
+        </p:style>
+      </p:cxnSp>
+      <p:cxnSp>
+        <p:nvCxnSpPr>
+          <p:cNvPr id="123" name="Straight Arrow Connector 122">
+            <a:extLst>
+              <a:ext uri="{FF2B5EF4-FFF2-40B4-BE49-F238E27FC236}">
+                <a16:creationId xmlns:a16="http://schemas.microsoft.com/office/drawing/2014/main" id="{00351639-F872-403B-A501-7BC4B70E0922}"/>
+              </a:ext>
+            </a:extLst>
+          </p:cNvPr>
+          <p:cNvCxnSpPr>
+            <a:cxnSpLocks/>
+          </p:cNvCxnSpPr>
+          <p:nvPr/>
+        </p:nvCxnSpPr>
+        <p:spPr>
+          <a:xfrm flipH="1">
+            <a:off x="5486400" y="2579793"/>
+            <a:ext cx="2746495" cy="11007"/>
+          </a:xfrm>
+          <a:prstGeom prst="straightConnector1">
+            <a:avLst/>
+          </a:prstGeom>
+          <a:ln w="19050">
+            <a:solidFill>
+              <a:srgbClr val="E21E8E"/>
+            </a:solidFill>
+            <a:headEnd type="arrow" w="med" len="med"/>
+            <a:tailEnd type="none" w="med" len="med"/>
+          </a:ln>
+        </p:spPr>
+        <p:style>
+          <a:lnRef idx="1">
+            <a:schemeClr val="dk1"/>
+          </a:lnRef>
+          <a:fillRef idx="0">
+            <a:schemeClr val="dk1"/>
+          </a:fillRef>
+          <a:effectRef idx="0">
+            <a:schemeClr val="dk1"/>
+          </a:effectRef>
+          <a:fontRef idx="minor">
+            <a:schemeClr val="tx1"/>
+          </a:fontRef>
+        </p:style>
+      </p:cxnSp>
+      <p:sp>
+        <p:nvSpPr>
+          <p:cNvPr id="124" name="Rectangle 123">
+            <a:extLst>
+              <a:ext uri="{FF2B5EF4-FFF2-40B4-BE49-F238E27FC236}">
+                <a16:creationId xmlns:a16="http://schemas.microsoft.com/office/drawing/2014/main" id="{6E18E015-FBFE-430D-95A4-F43B7617465A}"/>
+              </a:ext>
+            </a:extLst>
+          </p:cNvPr>
+          <p:cNvSpPr/>
+          <p:nvPr/>
+        </p:nvSpPr>
+        <p:spPr>
+          <a:xfrm>
+            <a:off x="5410089" y="2484852"/>
+            <a:ext cx="142007" cy="486948"/>
+          </a:xfrm>
+          <a:prstGeom prst="rect">
+            <a:avLst/>
+          </a:prstGeom>
+          <a:solidFill>
+            <a:srgbClr val="E21E8E"/>
+          </a:solidFill>
+          <a:ln>
+            <a:solidFill>
+              <a:schemeClr val="bg1"/>
+            </a:solidFill>
+          </a:ln>
+          <a:effectLst/>
+        </p:spPr>
+        <p:style>
+          <a:lnRef idx="1">
+            <a:schemeClr val="accent3"/>
+          </a:lnRef>
+          <a:fillRef idx="2">
+            <a:schemeClr val="accent3"/>
+          </a:fillRef>
+          <a:effectRef idx="1">
+            <a:schemeClr val="accent3"/>
+          </a:effectRef>
+          <a:fontRef idx="minor">
+            <a:schemeClr val="dk1"/>
+          </a:fontRef>
+        </p:style>
+        <p:txBody>
+          <a:bodyPr rtlCol="0" anchor="ctr"/>
+          <a:lstStyle/>
+          <a:p>
+            <a:pPr algn="ctr"/>
+            <a:endParaRPr lang="en-SG" sz="1400">
+              <a:solidFill>
+                <a:schemeClr val="dk1"/>
+              </a:solidFill>
+            </a:endParaRPr>
+          </a:p>
+        </p:txBody>
+      </p:sp>
+      <p:sp>
+        <p:nvSpPr>
+          <p:cNvPr id="125" name="Freeform 11">
+            <a:extLst>
+              <a:ext uri="{FF2B5EF4-FFF2-40B4-BE49-F238E27FC236}">
+                <a16:creationId xmlns:a16="http://schemas.microsoft.com/office/drawing/2014/main" id="{0D8492B6-5A59-43DE-93C2-03A7838152CE}"/>
+              </a:ext>
+            </a:extLst>
+          </p:cNvPr>
+          <p:cNvSpPr/>
+          <p:nvPr/>
+        </p:nvSpPr>
+        <p:spPr>
+          <a:xfrm rot="19395815" flipV="1">
+            <a:off x="5450216" y="2303249"/>
+            <a:ext cx="222479" cy="166049"/>
+          </a:xfrm>
+          <a:custGeom>
+            <a:avLst/>
+            <a:gdLst>
+              <a:gd name="connsiteX0" fmla="*/ 0 w 226400"/>
+              <a:gd name="connsiteY0" fmla="*/ 32920 h 171466"/>
+              <a:gd name="connsiteX1" fmla="*/ 157018 w 226400"/>
+              <a:gd name="connsiteY1" fmla="*/ 5211 h 171466"/>
+              <a:gd name="connsiteX2" fmla="*/ 221673 w 226400"/>
+              <a:gd name="connsiteY2" fmla="*/ 125284 h 171466"/>
+              <a:gd name="connsiteX3" fmla="*/ 36945 w 226400"/>
+              <a:gd name="connsiteY3" fmla="*/ 171466 h 171466"/>
+            </a:gdLst>
+            <a:ahLst/>
+            <a:cxnLst>
+              <a:cxn ang="0">
+                <a:pos x="connsiteX0" y="connsiteY0"/>
+              </a:cxn>
+              <a:cxn ang="0">
+                <a:pos x="connsiteX1" y="connsiteY1"/>
+              </a:cxn>
+              <a:cxn ang="0">
+                <a:pos x="connsiteX2" y="connsiteY2"/>
+              </a:cxn>
+              <a:cxn ang="0">
+                <a:pos x="connsiteX3" y="connsiteY3"/>
+              </a:cxn>
+            </a:cxnLst>
+            <a:rect l="l" t="t" r="r" b="b"/>
+            <a:pathLst>
+              <a:path w="226400" h="171466">
+                <a:moveTo>
+                  <a:pt x="0" y="32920"/>
+                </a:moveTo>
+                <a:cubicBezTo>
+                  <a:pt x="60036" y="11368"/>
+                  <a:pt x="120073" y="-10183"/>
+                  <a:pt x="157018" y="5211"/>
+                </a:cubicBezTo>
+                <a:cubicBezTo>
+                  <a:pt x="193963" y="20605"/>
+                  <a:pt x="241685" y="97575"/>
+                  <a:pt x="221673" y="125284"/>
+                </a:cubicBezTo>
+                <a:cubicBezTo>
+                  <a:pt x="201661" y="152993"/>
+                  <a:pt x="119303" y="162229"/>
+                  <a:pt x="36945" y="171466"/>
+                </a:cubicBezTo>
+              </a:path>
+            </a:pathLst>
+          </a:custGeom>
+          <a:ln w="19050">
+            <a:solidFill>
+              <a:srgbClr val="C00000"/>
+            </a:solidFill>
+            <a:headEnd type="arrow" w="med" len="med"/>
+            <a:tailEnd type="none" w="med" len="med"/>
+          </a:ln>
+        </p:spPr>
+        <p:style>
+          <a:lnRef idx="1">
+            <a:schemeClr val="accent1"/>
+          </a:lnRef>
+          <a:fillRef idx="0">
+            <a:schemeClr val="accent1"/>
+          </a:fillRef>
+          <a:effectRef idx="0">
+            <a:schemeClr val="accent1"/>
+          </a:effectRef>
+          <a:fontRef idx="minor">
+            <a:schemeClr val="tx1"/>
+          </a:fontRef>
+        </p:style>
+        <p:txBody>
+          <a:bodyPr rtlCol="0" anchor="ctr"/>
+          <a:lstStyle/>
+          <a:p>
+            <a:pPr algn="ctr"/>
+            <a:endParaRPr lang="en-SG"/>
+          </a:p>
+        </p:txBody>
+      </p:sp>
+      <p:sp>
+        <p:nvSpPr>
+          <p:cNvPr id="126" name="TextBox 125">
+            <a:extLst>
+              <a:ext uri="{FF2B5EF4-FFF2-40B4-BE49-F238E27FC236}">
+                <a16:creationId xmlns:a16="http://schemas.microsoft.com/office/drawing/2014/main" id="{05257C62-D3A1-403E-BC24-AC21DB5CBBED}"/>
+              </a:ext>
+            </a:extLst>
+          </p:cNvPr>
+          <p:cNvSpPr txBox="1"/>
+          <p:nvPr/>
+        </p:nvSpPr>
+        <p:spPr>
+          <a:xfrm>
+            <a:off x="5503967" y="2045414"/>
+            <a:ext cx="2129450" cy="184666"/>
+          </a:xfrm>
+          <a:prstGeom prst="rect">
+            <a:avLst/>
+          </a:prstGeom>
+          <a:noFill/>
+        </p:spPr>
+        <p:txBody>
+          <a:bodyPr wrap="square" lIns="0" tIns="0" rIns="0" bIns="0" rtlCol="0">
+            <a:spAutoFit/>
+          </a:bodyPr>
+          <a:lstStyle/>
+          <a:p>
+            <a:r>
+              <a:rPr lang="en-US" sz="1200" dirty="0" err="1">
+                <a:solidFill>
+                  <a:srgbClr val="C00000"/>
+                </a:solidFill>
+              </a:rPr>
+              <a:t>getCommandWordsSuggestions</a:t>
+            </a:r>
+            <a:r>
+              <a:rPr lang="en-US" sz="1200" dirty="0">
+                <a:solidFill>
+                  <a:srgbClr val="C00000"/>
+                </a:solidFill>
+              </a:rPr>
+              <a:t>()</a:t>
+            </a:r>
+          </a:p>
+        </p:txBody>
+      </p:sp>
+      <p:sp>
+        <p:nvSpPr>
+          <p:cNvPr id="127" name="TextBox 126">
+            <a:extLst>
+              <a:ext uri="{FF2B5EF4-FFF2-40B4-BE49-F238E27FC236}">
+                <a16:creationId xmlns:a16="http://schemas.microsoft.com/office/drawing/2014/main" id="{1C548AC2-3033-40ED-A945-5413ED01AC07}"/>
+              </a:ext>
+            </a:extLst>
+          </p:cNvPr>
+          <p:cNvSpPr txBox="1"/>
+          <p:nvPr/>
+        </p:nvSpPr>
+        <p:spPr>
+          <a:xfrm>
+            <a:off x="6014766" y="2364904"/>
+            <a:ext cx="2129450" cy="184666"/>
+          </a:xfrm>
+          <a:prstGeom prst="rect">
+            <a:avLst/>
+          </a:prstGeom>
+          <a:noFill/>
+        </p:spPr>
+        <p:txBody>
+          <a:bodyPr wrap="square" lIns="0" tIns="0" rIns="0" bIns="0" rtlCol="0">
+            <a:spAutoFit/>
+          </a:bodyPr>
+          <a:lstStyle/>
+          <a:p>
+            <a:r>
+              <a:rPr lang="en-US" sz="1200" dirty="0" err="1">
+                <a:solidFill>
+                  <a:schemeClr val="accent6"/>
+                </a:solidFill>
+              </a:rPr>
+              <a:t>logic.getAllCommandWords</a:t>
+            </a:r>
+            <a:r>
+              <a:rPr lang="en-US" sz="1200" dirty="0">
+                <a:solidFill>
+                  <a:schemeClr val="accent6"/>
+                </a:solidFill>
+              </a:rPr>
+              <a:t>()</a:t>
+            </a:r>
+          </a:p>
+        </p:txBody>
+      </p:sp>
+      <p:sp>
+        <p:nvSpPr>
+          <p:cNvPr id="128" name="Rectangle 127">
+            <a:extLst>
+              <a:ext uri="{FF2B5EF4-FFF2-40B4-BE49-F238E27FC236}">
+                <a16:creationId xmlns:a16="http://schemas.microsoft.com/office/drawing/2014/main" id="{DAE6C15F-9145-4B3F-9803-BD9226403A78}"/>
+              </a:ext>
+            </a:extLst>
+          </p:cNvPr>
+          <p:cNvSpPr/>
+          <p:nvPr/>
+        </p:nvSpPr>
+        <p:spPr>
+          <a:xfrm>
+            <a:off x="8229499" y="2586596"/>
+            <a:ext cx="139084" cy="283459"/>
+          </a:xfrm>
+          <a:prstGeom prst="rect">
+            <a:avLst/>
+          </a:prstGeom>
+          <a:solidFill>
+            <a:schemeClr val="accent6"/>
+          </a:solidFill>
+          <a:ln>
+            <a:solidFill>
+              <a:schemeClr val="accent6"/>
+            </a:solidFill>
+          </a:ln>
+          <a:effectLst/>
+        </p:spPr>
+        <p:style>
+          <a:lnRef idx="1">
+            <a:schemeClr val="accent3"/>
+          </a:lnRef>
+          <a:fillRef idx="2">
+            <a:schemeClr val="accent3"/>
+          </a:fillRef>
+          <a:effectRef idx="1">
+            <a:schemeClr val="accent3"/>
+          </a:effectRef>
+          <a:fontRef idx="minor">
+            <a:schemeClr val="dk1"/>
+          </a:fontRef>
+        </p:style>
+        <p:txBody>
+          <a:bodyPr rtlCol="0" anchor="ctr"/>
+          <a:lstStyle/>
+          <a:p>
+            <a:pPr algn="ctr"/>
+            <a:endParaRPr lang="en-SG" sz="1400">
+              <a:solidFill>
+                <a:schemeClr val="dk1"/>
+              </a:solidFill>
+            </a:endParaRPr>
+          </a:p>
+        </p:txBody>
+      </p:sp>
+      <p:cxnSp>
+        <p:nvCxnSpPr>
+          <p:cNvPr id="130" name="Straight Arrow Connector 129">
+            <a:extLst>
+              <a:ext uri="{FF2B5EF4-FFF2-40B4-BE49-F238E27FC236}">
+                <a16:creationId xmlns:a16="http://schemas.microsoft.com/office/drawing/2014/main" id="{982F18FD-5603-46FB-8C18-49F9C7F78D65}"/>
+              </a:ext>
+            </a:extLst>
+          </p:cNvPr>
+          <p:cNvCxnSpPr/>
+          <p:nvPr/>
+        </p:nvCxnSpPr>
+        <p:spPr>
+          <a:xfrm flipH="1">
+            <a:off x="5530103" y="2854449"/>
+            <a:ext cx="2796646" cy="0"/>
+          </a:xfrm>
+          <a:prstGeom prst="straightConnector1">
+            <a:avLst/>
+          </a:prstGeom>
+          <a:ln w="19050">
+            <a:solidFill>
+              <a:schemeClr val="accent6"/>
+            </a:solidFill>
+            <a:prstDash val="sysDash"/>
+            <a:headEnd type="none" w="med" len="med"/>
+            <a:tailEnd type="arrow" w="med" len="med"/>
+          </a:ln>
+        </p:spPr>
+        <p:style>
+          <a:lnRef idx="1">
+            <a:schemeClr val="accent1"/>
+          </a:lnRef>
+          <a:fillRef idx="0">
+            <a:schemeClr val="accent1"/>
+          </a:fillRef>
+          <a:effectRef idx="0">
+            <a:schemeClr val="accent1"/>
+          </a:effectRef>
+          <a:fontRef idx="minor">
+            <a:schemeClr val="tx1"/>
+          </a:fontRef>
+        </p:style>
+      </p:cxnSp>
+      <p:cxnSp>
+        <p:nvCxnSpPr>
+          <p:cNvPr id="132" name="Straight Arrow Connector 131">
+            <a:extLst>
+              <a:ext uri="{FF2B5EF4-FFF2-40B4-BE49-F238E27FC236}">
+                <a16:creationId xmlns:a16="http://schemas.microsoft.com/office/drawing/2014/main" id="{31FA00FE-D511-4BDB-B352-37222BE23B38}"/>
+              </a:ext>
+            </a:extLst>
+          </p:cNvPr>
+          <p:cNvCxnSpPr>
+            <a:cxnSpLocks/>
+          </p:cNvCxnSpPr>
+          <p:nvPr/>
+        </p:nvCxnSpPr>
+        <p:spPr>
+          <a:xfrm flipH="1">
+            <a:off x="2687440" y="1205330"/>
+            <a:ext cx="2624414" cy="0"/>
+          </a:xfrm>
+          <a:prstGeom prst="straightConnector1">
+            <a:avLst/>
+          </a:prstGeom>
+          <a:ln w="19050">
+            <a:solidFill>
+              <a:srgbClr val="C00000"/>
+            </a:solidFill>
+            <a:prstDash val="sysDash"/>
+            <a:headEnd type="none" w="med" len="med"/>
+            <a:tailEnd type="arrow" w="med" len="med"/>
+          </a:ln>
+        </p:spPr>
+        <p:style>
+          <a:lnRef idx="1">
+            <a:schemeClr val="accent1"/>
+          </a:lnRef>
+          <a:fillRef idx="0">
+            <a:schemeClr val="accent1"/>
+          </a:fillRef>
+          <a:effectRef idx="0">
+            <a:schemeClr val="accent1"/>
+          </a:effectRef>
+          <a:fontRef idx="minor">
+            <a:schemeClr val="tx1"/>
+          </a:fontRef>
+        </p:style>
+      </p:cxnSp>
+      <p:sp>
+        <p:nvSpPr>
+          <p:cNvPr id="133" name="Rectangle 132">
+            <a:extLst>
+              <a:ext uri="{FF2B5EF4-FFF2-40B4-BE49-F238E27FC236}">
+                <a16:creationId xmlns:a16="http://schemas.microsoft.com/office/drawing/2014/main" id="{98F65B9C-F4BC-4975-ACB0-B55B4F684C4A}"/>
+              </a:ext>
+            </a:extLst>
+          </p:cNvPr>
+          <p:cNvSpPr/>
+          <p:nvPr/>
+        </p:nvSpPr>
+        <p:spPr>
+          <a:xfrm>
+            <a:off x="5334000" y="1428980"/>
+            <a:ext cx="139084" cy="607622"/>
+          </a:xfrm>
+          <a:prstGeom prst="rect">
+            <a:avLst/>
+          </a:prstGeom>
+          <a:solidFill>
+            <a:srgbClr val="C00000"/>
+          </a:solidFill>
+          <a:ln>
+            <a:solidFill>
+              <a:srgbClr val="C00000"/>
+            </a:solidFill>
+          </a:ln>
+          <a:effectLst/>
+        </p:spPr>
+        <p:style>
+          <a:lnRef idx="1">
+            <a:schemeClr val="accent3"/>
+          </a:lnRef>
+          <a:fillRef idx="2">
+            <a:schemeClr val="accent3"/>
+          </a:fillRef>
+          <a:effectRef idx="1">
+            <a:schemeClr val="accent3"/>
+          </a:effectRef>
+          <a:fontRef idx="minor">
+            <a:schemeClr val="dk1"/>
+          </a:fontRef>
+        </p:style>
+        <p:txBody>
+          <a:bodyPr rtlCol="0" anchor="ctr"/>
+          <a:lstStyle/>
+          <a:p>
+            <a:pPr algn="ctr"/>
+            <a:endParaRPr lang="en-SG" sz="1400">
+              <a:solidFill>
+                <a:schemeClr val="dk1"/>
+              </a:solidFill>
+            </a:endParaRPr>
+          </a:p>
+        </p:txBody>
+      </p:sp>
+      <p:sp>
+        <p:nvSpPr>
+          <p:cNvPr id="136" name="TextBox 135">
+            <a:extLst>
+              <a:ext uri="{FF2B5EF4-FFF2-40B4-BE49-F238E27FC236}">
+                <a16:creationId xmlns:a16="http://schemas.microsoft.com/office/drawing/2014/main" id="{D6DE31B2-DC92-495A-80CD-FFF7BFBF1171}"/>
+              </a:ext>
+            </a:extLst>
+          </p:cNvPr>
+          <p:cNvSpPr txBox="1"/>
+          <p:nvPr/>
+        </p:nvSpPr>
+        <p:spPr>
+          <a:xfrm>
+            <a:off x="3668276" y="1247789"/>
+            <a:ext cx="863746" cy="183694"/>
+          </a:xfrm>
+          <a:prstGeom prst="rect">
+            <a:avLst/>
+          </a:prstGeom>
+          <a:noFill/>
+        </p:spPr>
+        <p:txBody>
+          <a:bodyPr wrap="square" lIns="0" tIns="0" rIns="0" bIns="0" rtlCol="0">
+            <a:spAutoFit/>
+          </a:bodyPr>
+          <a:lstStyle/>
+          <a:p>
+            <a:r>
+              <a:rPr lang="en-US" sz="1200" dirty="0" err="1">
+                <a:solidFill>
+                  <a:srgbClr val="C00000"/>
+                </a:solidFill>
+              </a:rPr>
+              <a:t>a.init</a:t>
+            </a:r>
+            <a:r>
+              <a:rPr lang="en-US" sz="1200" dirty="0">
+                <a:solidFill>
+                  <a:srgbClr val="C00000"/>
+                </a:solidFill>
+              </a:rPr>
+              <a:t>(logic)</a:t>
+            </a:r>
+          </a:p>
+        </p:txBody>
+      </p:sp>
+      <p:cxnSp>
+        <p:nvCxnSpPr>
+          <p:cNvPr id="137" name="Straight Arrow Connector 136">
+            <a:extLst>
+              <a:ext uri="{FF2B5EF4-FFF2-40B4-BE49-F238E27FC236}">
+                <a16:creationId xmlns:a16="http://schemas.microsoft.com/office/drawing/2014/main" id="{C4BE0E31-2F53-4C85-A4D2-F2CD3501F573}"/>
+              </a:ext>
+            </a:extLst>
+          </p:cNvPr>
+          <p:cNvCxnSpPr>
+            <a:cxnSpLocks/>
+          </p:cNvCxnSpPr>
+          <p:nvPr/>
+        </p:nvCxnSpPr>
+        <p:spPr>
+          <a:xfrm flipH="1">
+            <a:off x="5473249" y="1361719"/>
+            <a:ext cx="2746495" cy="11007"/>
+          </a:xfrm>
+          <a:prstGeom prst="straightConnector1">
+            <a:avLst/>
+          </a:prstGeom>
+          <a:ln w="19050">
+            <a:solidFill>
+              <a:srgbClr val="C00000"/>
+            </a:solidFill>
+            <a:headEnd type="arrow" w="med" len="med"/>
+            <a:tailEnd type="none" w="med" len="med"/>
+          </a:ln>
+        </p:spPr>
+        <p:style>
+          <a:lnRef idx="1">
+            <a:schemeClr val="dk1"/>
+          </a:lnRef>
+          <a:fillRef idx="0">
+            <a:schemeClr val="dk1"/>
+          </a:fillRef>
+          <a:effectRef idx="0">
+            <a:schemeClr val="dk1"/>
+          </a:effectRef>
+          <a:fontRef idx="minor">
+            <a:schemeClr val="tx1"/>
+          </a:fontRef>
+        </p:style>
+      </p:cxnSp>
+      <p:sp>
+        <p:nvSpPr>
+          <p:cNvPr id="138" name="Rectangle 137">
+            <a:extLst>
+              <a:ext uri="{FF2B5EF4-FFF2-40B4-BE49-F238E27FC236}">
+                <a16:creationId xmlns:a16="http://schemas.microsoft.com/office/drawing/2014/main" id="{5FAF0BB8-D1DE-4255-A7EE-B26BB7480164}"/>
+              </a:ext>
+            </a:extLst>
+          </p:cNvPr>
+          <p:cNvSpPr/>
+          <p:nvPr/>
+        </p:nvSpPr>
+        <p:spPr>
+          <a:xfrm>
+            <a:off x="8223649" y="1354492"/>
+            <a:ext cx="139084" cy="145459"/>
+          </a:xfrm>
+          <a:prstGeom prst="rect">
+            <a:avLst/>
+          </a:prstGeom>
+          <a:solidFill>
+            <a:schemeClr val="accent6"/>
+          </a:solidFill>
+          <a:ln>
+            <a:solidFill>
+              <a:schemeClr val="accent6"/>
+            </a:solidFill>
+          </a:ln>
+          <a:effectLst/>
+        </p:spPr>
+        <p:style>
+          <a:lnRef idx="1">
+            <a:schemeClr val="accent3"/>
+          </a:lnRef>
+          <a:fillRef idx="2">
+            <a:schemeClr val="accent3"/>
+          </a:fillRef>
+          <a:effectRef idx="1">
+            <a:schemeClr val="accent3"/>
+          </a:effectRef>
+          <a:fontRef idx="minor">
+            <a:schemeClr val="dk1"/>
+          </a:fontRef>
+        </p:style>
+        <p:txBody>
+          <a:bodyPr rtlCol="0" anchor="ctr"/>
+          <a:lstStyle/>
+          <a:p>
+            <a:pPr algn="ctr"/>
+            <a:endParaRPr lang="en-SG" sz="1400">
+              <a:solidFill>
+                <a:schemeClr val="dk1"/>
+              </a:solidFill>
+            </a:endParaRPr>
+          </a:p>
+        </p:txBody>
+      </p:sp>
+      <p:sp>
+        <p:nvSpPr>
+          <p:cNvPr id="139" name="TextBox 138">
+            <a:extLst>
+              <a:ext uri="{FF2B5EF4-FFF2-40B4-BE49-F238E27FC236}">
+                <a16:creationId xmlns:a16="http://schemas.microsoft.com/office/drawing/2014/main" id="{69FCAD79-AB57-4D3A-A5F1-073BBAEF11AA}"/>
+              </a:ext>
+            </a:extLst>
+          </p:cNvPr>
+          <p:cNvSpPr txBox="1"/>
+          <p:nvPr/>
+        </p:nvSpPr>
+        <p:spPr>
+          <a:xfrm>
+            <a:off x="5635787" y="1170786"/>
+            <a:ext cx="2129450" cy="169277"/>
+          </a:xfrm>
+          <a:prstGeom prst="rect">
+            <a:avLst/>
+          </a:prstGeom>
+          <a:noFill/>
+        </p:spPr>
+        <p:txBody>
+          <a:bodyPr wrap="square" lIns="0" tIns="0" rIns="0" bIns="0" rtlCol="0">
+            <a:spAutoFit/>
+          </a:bodyPr>
+          <a:lstStyle/>
+          <a:p>
+            <a:r>
+              <a:rPr lang="en-US" sz="1100" dirty="0" err="1">
+                <a:solidFill>
+                  <a:srgbClr val="C00000"/>
+                </a:solidFill>
+              </a:rPr>
+              <a:t>logic.setAttributesForPersonObjects</a:t>
+            </a:r>
+            <a:r>
+              <a:rPr lang="en-US" sz="1100" dirty="0">
+                <a:solidFill>
+                  <a:srgbClr val="C00000"/>
+                </a:solidFill>
+              </a:rPr>
+              <a:t>()</a:t>
+            </a:r>
+          </a:p>
+        </p:txBody>
+      </p:sp>
+      <p:cxnSp>
+        <p:nvCxnSpPr>
+          <p:cNvPr id="140" name="Straight Arrow Connector 139">
+            <a:extLst>
+              <a:ext uri="{FF2B5EF4-FFF2-40B4-BE49-F238E27FC236}">
+                <a16:creationId xmlns:a16="http://schemas.microsoft.com/office/drawing/2014/main" id="{2BDC9C5B-78C3-4D75-94D2-7A4B9250C17D}"/>
+              </a:ext>
+            </a:extLst>
+          </p:cNvPr>
+          <p:cNvCxnSpPr>
+            <a:cxnSpLocks/>
+          </p:cNvCxnSpPr>
+          <p:nvPr/>
+        </p:nvCxnSpPr>
+        <p:spPr>
+          <a:xfrm flipH="1">
+            <a:off x="5486400" y="1568960"/>
+            <a:ext cx="2746495" cy="11007"/>
+          </a:xfrm>
+          <a:prstGeom prst="straightConnector1">
+            <a:avLst/>
+          </a:prstGeom>
+          <a:ln w="19050">
+            <a:solidFill>
+              <a:srgbClr val="C00000"/>
+            </a:solidFill>
+            <a:headEnd type="arrow" w="med" len="med"/>
+            <a:tailEnd type="none" w="med" len="med"/>
+          </a:ln>
+        </p:spPr>
+        <p:style>
+          <a:lnRef idx="1">
+            <a:schemeClr val="dk1"/>
+          </a:lnRef>
+          <a:fillRef idx="0">
+            <a:schemeClr val="dk1"/>
+          </a:fillRef>
+          <a:effectRef idx="0">
+            <a:schemeClr val="dk1"/>
+          </a:effectRef>
+          <a:fontRef idx="minor">
+            <a:schemeClr val="tx1"/>
+          </a:fontRef>
+        </p:style>
+      </p:cxnSp>
+      <p:sp>
+        <p:nvSpPr>
+          <p:cNvPr id="141" name="Rectangle 140">
+            <a:extLst>
+              <a:ext uri="{FF2B5EF4-FFF2-40B4-BE49-F238E27FC236}">
+                <a16:creationId xmlns:a16="http://schemas.microsoft.com/office/drawing/2014/main" id="{B3EA599B-72AF-42C2-B184-47CCD88EC410}"/>
+              </a:ext>
+            </a:extLst>
+          </p:cNvPr>
+          <p:cNvSpPr/>
+          <p:nvPr/>
+        </p:nvSpPr>
+        <p:spPr>
+          <a:xfrm>
+            <a:off x="8229499" y="1702540"/>
+            <a:ext cx="139084" cy="145459"/>
+          </a:xfrm>
+          <a:prstGeom prst="rect">
+            <a:avLst/>
+          </a:prstGeom>
+          <a:solidFill>
+            <a:schemeClr val="accent6"/>
+          </a:solidFill>
+          <a:ln>
+            <a:solidFill>
+              <a:schemeClr val="accent6"/>
+            </a:solidFill>
+          </a:ln>
+          <a:effectLst/>
+        </p:spPr>
+        <p:style>
+          <a:lnRef idx="1">
+            <a:schemeClr val="accent3"/>
+          </a:lnRef>
+          <a:fillRef idx="2">
+            <a:schemeClr val="accent3"/>
+          </a:fillRef>
+          <a:effectRef idx="1">
+            <a:schemeClr val="accent3"/>
+          </a:effectRef>
+          <a:fontRef idx="minor">
+            <a:schemeClr val="dk1"/>
+          </a:fontRef>
+        </p:style>
+        <p:txBody>
+          <a:bodyPr rtlCol="0" anchor="ctr"/>
+          <a:lstStyle/>
+          <a:p>
+            <a:pPr algn="ctr"/>
+            <a:endParaRPr lang="en-SG" sz="1400">
+              <a:solidFill>
+                <a:schemeClr val="dk1"/>
+              </a:solidFill>
+            </a:endParaRPr>
+          </a:p>
+        </p:txBody>
+      </p:sp>
+      <p:sp>
+        <p:nvSpPr>
+          <p:cNvPr id="142" name="TextBox 141">
+            <a:extLst>
+              <a:ext uri="{FF2B5EF4-FFF2-40B4-BE49-F238E27FC236}">
+                <a16:creationId xmlns:a16="http://schemas.microsoft.com/office/drawing/2014/main" id="{B7A0CCCA-08C4-4E16-A46B-B1D2DEA90095}"/>
+              </a:ext>
+            </a:extLst>
+          </p:cNvPr>
+          <p:cNvSpPr txBox="1"/>
+          <p:nvPr/>
+        </p:nvSpPr>
+        <p:spPr>
+          <a:xfrm>
+            <a:off x="5629531" y="1394988"/>
+            <a:ext cx="2435673" cy="169277"/>
+          </a:xfrm>
+          <a:prstGeom prst="rect">
+            <a:avLst/>
+          </a:prstGeom>
+          <a:noFill/>
+        </p:spPr>
+        <p:txBody>
+          <a:bodyPr wrap="square" lIns="0" tIns="0" rIns="0" bIns="0" rtlCol="0">
+            <a:spAutoFit/>
+          </a:bodyPr>
+          <a:lstStyle/>
+          <a:p>
+            <a:r>
+              <a:rPr lang="en-US" sz="1100" dirty="0" err="1">
+                <a:solidFill>
+                  <a:srgbClr val="C00000"/>
+                </a:solidFill>
+              </a:rPr>
+              <a:t>logic.setAttributesForPetPatientObjects</a:t>
+            </a:r>
+            <a:r>
+              <a:rPr lang="en-US" sz="1100" dirty="0">
+                <a:solidFill>
+                  <a:srgbClr val="C00000"/>
+                </a:solidFill>
+              </a:rPr>
+              <a:t>()</a:t>
+            </a:r>
+          </a:p>
+        </p:txBody>
+      </p:sp>
+      <p:cxnSp>
+        <p:nvCxnSpPr>
+          <p:cNvPr id="143" name="Straight Arrow Connector 142">
+            <a:extLst>
+              <a:ext uri="{FF2B5EF4-FFF2-40B4-BE49-F238E27FC236}">
+                <a16:creationId xmlns:a16="http://schemas.microsoft.com/office/drawing/2014/main" id="{61EAC486-4660-4731-A943-8C1F5F8EE17B}"/>
+              </a:ext>
+            </a:extLst>
+          </p:cNvPr>
+          <p:cNvCxnSpPr>
+            <a:cxnSpLocks/>
+          </p:cNvCxnSpPr>
+          <p:nvPr/>
+        </p:nvCxnSpPr>
+        <p:spPr>
+          <a:xfrm flipH="1">
+            <a:off x="5480078" y="1778361"/>
+            <a:ext cx="2746495" cy="11007"/>
+          </a:xfrm>
+          <a:prstGeom prst="straightConnector1">
+            <a:avLst/>
+          </a:prstGeom>
+          <a:ln w="19050">
+            <a:solidFill>
+              <a:srgbClr val="C00000"/>
+            </a:solidFill>
+            <a:headEnd type="arrow" w="med" len="med"/>
+            <a:tailEnd type="none" w="med" len="med"/>
+          </a:ln>
+        </p:spPr>
+        <p:style>
+          <a:lnRef idx="1">
+            <a:schemeClr val="dk1"/>
+          </a:lnRef>
+          <a:fillRef idx="0">
+            <a:schemeClr val="dk1"/>
+          </a:fillRef>
+          <a:effectRef idx="0">
+            <a:schemeClr val="dk1"/>
+          </a:effectRef>
+          <a:fontRef idx="minor">
+            <a:schemeClr val="tx1"/>
+          </a:fontRef>
+        </p:style>
+      </p:cxnSp>
+      <p:sp>
+        <p:nvSpPr>
+          <p:cNvPr id="144" name="Rectangle 143">
+            <a:extLst>
+              <a:ext uri="{FF2B5EF4-FFF2-40B4-BE49-F238E27FC236}">
+                <a16:creationId xmlns:a16="http://schemas.microsoft.com/office/drawing/2014/main" id="{A12CF89E-7F51-41CB-A03F-CD1A8B2BCB1C}"/>
+              </a:ext>
+            </a:extLst>
+          </p:cNvPr>
+          <p:cNvSpPr/>
+          <p:nvPr/>
+        </p:nvSpPr>
+        <p:spPr>
+          <a:xfrm>
+            <a:off x="8223177" y="1911941"/>
+            <a:ext cx="139084" cy="145459"/>
+          </a:xfrm>
+          <a:prstGeom prst="rect">
+            <a:avLst/>
+          </a:prstGeom>
+          <a:solidFill>
+            <a:schemeClr val="accent6"/>
+          </a:solidFill>
+          <a:ln>
+            <a:solidFill>
+              <a:schemeClr val="accent6"/>
+            </a:solidFill>
+          </a:ln>
+          <a:effectLst/>
+        </p:spPr>
+        <p:style>
+          <a:lnRef idx="1">
+            <a:schemeClr val="accent3"/>
+          </a:lnRef>
+          <a:fillRef idx="2">
+            <a:schemeClr val="accent3"/>
+          </a:fillRef>
+          <a:effectRef idx="1">
+            <a:schemeClr val="accent3"/>
+          </a:effectRef>
+          <a:fontRef idx="minor">
+            <a:schemeClr val="dk1"/>
+          </a:fontRef>
+        </p:style>
+        <p:txBody>
+          <a:bodyPr rtlCol="0" anchor="ctr"/>
+          <a:lstStyle/>
+          <a:p>
+            <a:pPr algn="ctr"/>
+            <a:endParaRPr lang="en-SG" sz="1400">
+              <a:solidFill>
+                <a:schemeClr val="dk1"/>
+              </a:solidFill>
+            </a:endParaRPr>
+          </a:p>
+        </p:txBody>
+      </p:sp>
+      <p:sp>
+        <p:nvSpPr>
+          <p:cNvPr id="145" name="TextBox 144">
+            <a:extLst>
+              <a:ext uri="{FF2B5EF4-FFF2-40B4-BE49-F238E27FC236}">
+                <a16:creationId xmlns:a16="http://schemas.microsoft.com/office/drawing/2014/main" id="{AB9227F2-4617-47F1-B8E7-959DACA83988}"/>
+              </a:ext>
+            </a:extLst>
+          </p:cNvPr>
+          <p:cNvSpPr txBox="1"/>
+          <p:nvPr/>
+        </p:nvSpPr>
+        <p:spPr>
+          <a:xfrm>
+            <a:off x="5652171" y="1596930"/>
+            <a:ext cx="2435673" cy="169277"/>
+          </a:xfrm>
+          <a:prstGeom prst="rect">
+            <a:avLst/>
+          </a:prstGeom>
+          <a:noFill/>
+        </p:spPr>
+        <p:txBody>
+          <a:bodyPr wrap="square" lIns="0" tIns="0" rIns="0" bIns="0" rtlCol="0">
+            <a:spAutoFit/>
+          </a:bodyPr>
+          <a:lstStyle/>
+          <a:p>
+            <a:r>
+              <a:rPr lang="en-US" sz="1100" dirty="0" err="1">
+                <a:solidFill>
+                  <a:srgbClr val="C00000"/>
+                </a:solidFill>
+              </a:rPr>
+              <a:t>logic.setAttributesForPetPatientObjects</a:t>
+            </a:r>
+            <a:r>
+              <a:rPr lang="en-US" sz="1100" dirty="0">
+                <a:solidFill>
+                  <a:srgbClr val="C00000"/>
+                </a:solidFill>
+              </a:rPr>
+              <a:t>()</a:t>
+            </a:r>
+          </a:p>
+        </p:txBody>
+      </p:sp>
+    </p:spTree>
+    <p:extLst>
+      <p:ext uri="{BB962C8B-B14F-4D97-AF65-F5344CB8AC3E}">
+        <p14:creationId xmlns:p14="http://schemas.microsoft.com/office/powerpoint/2010/main" val="3844937925"/>
       </p:ext>
     </p:extLst>
   </p:cSld>

</xml_diff>

<commit_message>
Update DevGuide and Project Portfolio (#226)
* Added and updated diagrams
* Updated implementation sections for major and minor features
* Updated setting up section by adding pictures
* Updated feature contribution section in appendix
* Revamped project portfolio
</commit_message>
<xml_diff>
--- a/docs/diagrams/HighLevelSequenceDiagrams.pptx
+++ b/docs/diagrams/HighLevelSequenceDiagrams.pptx
@@ -107,6 +107,22 @@
       </a:defRPr>
     </a:lvl9pPr>
   </p:defaultTextStyle>
+  <p:extLst>
+    <p:ext uri="{EFAFB233-063F-42B5-8137-9DF3F51BA10A}">
+      <p15:sldGuideLst xmlns:p15="http://schemas.microsoft.com/office/powerpoint/2012/main">
+        <p15:guide id="1" orient="horz" pos="1488">
+          <p15:clr>
+            <a:srgbClr val="A4A3A4"/>
+          </p15:clr>
+        </p15:guide>
+        <p15:guide id="2" pos="2880">
+          <p15:clr>
+            <a:srgbClr val="A4A3A4"/>
+          </p15:clr>
+        </p15:guide>
+      </p15:sldGuideLst>
+    </p:ext>
+  </p:extLst>
 </p:presentation>
 </file>
 
@@ -192,7 +208,7 @@
           <a:p>
             <a:fld id="{F5CC4B3F-88C1-4FFA-B1B6-F41C21DC6924}" type="datetimeFigureOut">
               <a:rPr lang="en-US" smtClean="0"/>
-              <a:t>10/16/2016</a:t>
+              <a:t>4/14/18</a:t>
             </a:fld>
             <a:endParaRPr lang="en-US"/>
           </a:p>
@@ -641,7 +657,7 @@
           <a:p>
             <a:fld id="{78C97017-6FC3-485B-9764-EAC9E56C1D49}" type="datetimeFigureOut">
               <a:rPr lang="en-US" smtClean="0"/>
-              <a:t>10/16/2016</a:t>
+              <a:t>4/14/18</a:t>
             </a:fld>
             <a:endParaRPr lang="en-US"/>
           </a:p>
@@ -811,7 +827,7 @@
           <a:p>
             <a:fld id="{78C97017-6FC3-485B-9764-EAC9E56C1D49}" type="datetimeFigureOut">
               <a:rPr lang="en-US" smtClean="0"/>
-              <a:t>10/16/2016</a:t>
+              <a:t>4/14/18</a:t>
             </a:fld>
             <a:endParaRPr lang="en-US"/>
           </a:p>
@@ -991,7 +1007,7 @@
           <a:p>
             <a:fld id="{78C97017-6FC3-485B-9764-EAC9E56C1D49}" type="datetimeFigureOut">
               <a:rPr lang="en-US" smtClean="0"/>
-              <a:t>10/16/2016</a:t>
+              <a:t>4/14/18</a:t>
             </a:fld>
             <a:endParaRPr lang="en-US"/>
           </a:p>
@@ -1161,7 +1177,7 @@
           <a:p>
             <a:fld id="{78C97017-6FC3-485B-9764-EAC9E56C1D49}" type="datetimeFigureOut">
               <a:rPr lang="en-US" smtClean="0"/>
-              <a:t>10/16/2016</a:t>
+              <a:t>4/14/18</a:t>
             </a:fld>
             <a:endParaRPr lang="en-US"/>
           </a:p>
@@ -1407,7 +1423,7 @@
           <a:p>
             <a:fld id="{78C97017-6FC3-485B-9764-EAC9E56C1D49}" type="datetimeFigureOut">
               <a:rPr lang="en-US" smtClean="0"/>
-              <a:t>10/16/2016</a:t>
+              <a:t>4/14/18</a:t>
             </a:fld>
             <a:endParaRPr lang="en-US"/>
           </a:p>
@@ -1695,7 +1711,7 @@
           <a:p>
             <a:fld id="{78C97017-6FC3-485B-9764-EAC9E56C1D49}" type="datetimeFigureOut">
               <a:rPr lang="en-US" smtClean="0"/>
-              <a:t>10/16/2016</a:t>
+              <a:t>4/14/18</a:t>
             </a:fld>
             <a:endParaRPr lang="en-US"/>
           </a:p>
@@ -2117,7 +2133,7 @@
           <a:p>
             <a:fld id="{78C97017-6FC3-485B-9764-EAC9E56C1D49}" type="datetimeFigureOut">
               <a:rPr lang="en-US" smtClean="0"/>
-              <a:t>10/16/2016</a:t>
+              <a:t>4/14/18</a:t>
             </a:fld>
             <a:endParaRPr lang="en-US"/>
           </a:p>
@@ -2235,7 +2251,7 @@
           <a:p>
             <a:fld id="{78C97017-6FC3-485B-9764-EAC9E56C1D49}" type="datetimeFigureOut">
               <a:rPr lang="en-US" smtClean="0"/>
-              <a:t>10/16/2016</a:t>
+              <a:t>4/14/18</a:t>
             </a:fld>
             <a:endParaRPr lang="en-US"/>
           </a:p>
@@ -2330,7 +2346,7 @@
           <a:p>
             <a:fld id="{78C97017-6FC3-485B-9764-EAC9E56C1D49}" type="datetimeFigureOut">
               <a:rPr lang="en-US" smtClean="0"/>
-              <a:t>10/16/2016</a:t>
+              <a:t>4/14/18</a:t>
             </a:fld>
             <a:endParaRPr lang="en-US"/>
           </a:p>
@@ -2607,7 +2623,7 @@
           <a:p>
             <a:fld id="{78C97017-6FC3-485B-9764-EAC9E56C1D49}" type="datetimeFigureOut">
               <a:rPr lang="en-US" smtClean="0"/>
-              <a:t>10/16/2016</a:t>
+              <a:t>4/14/18</a:t>
             </a:fld>
             <a:endParaRPr lang="en-US"/>
           </a:p>
@@ -2860,7 +2876,7 @@
           <a:p>
             <a:fld id="{78C97017-6FC3-485B-9764-EAC9E56C1D49}" type="datetimeFigureOut">
               <a:rPr lang="en-US" smtClean="0"/>
-              <a:t>10/16/2016</a:t>
+              <a:t>4/14/18</a:t>
             </a:fld>
             <a:endParaRPr lang="en-US"/>
           </a:p>
@@ -3073,7 +3089,7 @@
           <a:p>
             <a:fld id="{78C97017-6FC3-485B-9764-EAC9E56C1D49}" type="datetimeFigureOut">
               <a:rPr lang="en-US" smtClean="0"/>
-              <a:t>10/16/2016</a:t>
+              <a:t>4/14/18</a:t>
             </a:fld>
             <a:endParaRPr lang="en-US"/>
           </a:p>
@@ -5314,7 +5330,7 @@
                   </a:schemeClr>
                 </a:solidFill>
               </a:rPr>
-              <a:t>handleAddresssBookChangedEvent</a:t>
+              <a:t>handleAddressBookChangedEvent</a:t>
             </a:r>
             <a:r>
               <a:rPr lang="en-US" sz="1400" dirty="0" smtClean="0">

</xml_diff>

<commit_message>
Re: Updates for DevGuide, UserGuide, Diagrams, Images, LeKhangTai.adoc for KhangTai's part
</commit_message>
<xml_diff>
--- a/docs/diagrams/HighLevelSequenceDiagrams.pptx
+++ b/docs/diagrams/HighLevelSequenceDiagrams.pptx
@@ -107,6 +107,22 @@
       </a:defRPr>
     </a:lvl9pPr>
   </p:defaultTextStyle>
+  <p:extLst>
+    <p:ext uri="{EFAFB233-063F-42B5-8137-9DF3F51BA10A}">
+      <p15:sldGuideLst xmlns:p15="http://schemas.microsoft.com/office/powerpoint/2012/main">
+        <p15:guide id="1" orient="horz" pos="1488">
+          <p15:clr>
+            <a:srgbClr val="A4A3A4"/>
+          </p15:clr>
+        </p15:guide>
+        <p15:guide id="2" pos="2880">
+          <p15:clr>
+            <a:srgbClr val="A4A3A4"/>
+          </p15:clr>
+        </p15:guide>
+      </p15:sldGuideLst>
+    </p:ext>
+  </p:extLst>
 </p:presentation>
 </file>
 
@@ -192,7 +208,7 @@
           <a:p>
             <a:fld id="{F5CC4B3F-88C1-4FFA-B1B6-F41C21DC6924}" type="datetimeFigureOut">
               <a:rPr lang="en-US" smtClean="0"/>
-              <a:t>10/16/2016</a:t>
+              <a:t>4/15/2018</a:t>
             </a:fld>
             <a:endParaRPr lang="en-US"/>
           </a:p>
@@ -256,38 +272,37 @@
           <a:p>
             <a:pPr lvl="0"/>
             <a:r>
-              <a:rPr lang="en-US" smtClean="0"/>
+              <a:rPr lang="en-US"/>
               <a:t>Click to edit Master text styles</a:t>
             </a:r>
           </a:p>
           <a:p>
             <a:pPr lvl="1"/>
             <a:r>
-              <a:rPr lang="en-US" smtClean="0"/>
+              <a:rPr lang="en-US"/>
               <a:t>Second level</a:t>
             </a:r>
           </a:p>
           <a:p>
             <a:pPr lvl="2"/>
             <a:r>
-              <a:rPr lang="en-US" smtClean="0"/>
+              <a:rPr lang="en-US"/>
               <a:t>Third level</a:t>
             </a:r>
           </a:p>
           <a:p>
             <a:pPr lvl="3"/>
             <a:r>
-              <a:rPr lang="en-US" smtClean="0"/>
+              <a:rPr lang="en-US"/>
               <a:t>Fourth level</a:t>
             </a:r>
           </a:p>
           <a:p>
             <a:pPr lvl="4"/>
             <a:r>
-              <a:rPr lang="en-US" smtClean="0"/>
+              <a:rPr lang="en-US"/>
               <a:t>Fifth level</a:t>
             </a:r>
-            <a:endParaRPr lang="en-US"/>
           </a:p>
         </p:txBody>
       </p:sp>
@@ -498,10 +513,9 @@
           <a:lstStyle/>
           <a:p>
             <a:r>
-              <a:rPr lang="en-US" smtClean="0"/>
+              <a:rPr lang="en-US"/>
               <a:t>Click to edit Master title style</a:t>
             </a:r>
-            <a:endParaRPr lang="en-US"/>
           </a:p>
         </p:txBody>
       </p:sp>
@@ -617,10 +631,9 @@
           </a:lstStyle>
           <a:p>
             <a:r>
-              <a:rPr lang="en-US" smtClean="0"/>
+              <a:rPr lang="en-US"/>
               <a:t>Click to edit Master subtitle style</a:t>
             </a:r>
-            <a:endParaRPr lang="en-US"/>
           </a:p>
         </p:txBody>
       </p:sp>
@@ -641,7 +654,7 @@
           <a:p>
             <a:fld id="{78C97017-6FC3-485B-9764-EAC9E56C1D49}" type="datetimeFigureOut">
               <a:rPr lang="en-US" smtClean="0"/>
-              <a:t>10/16/2016</a:t>
+              <a:t>4/15/2018</a:t>
             </a:fld>
             <a:endParaRPr lang="en-US"/>
           </a:p>
@@ -735,10 +748,9 @@
           <a:lstStyle/>
           <a:p>
             <a:r>
-              <a:rPr lang="en-US" smtClean="0"/>
+              <a:rPr lang="en-US"/>
               <a:t>Click to edit Master title style</a:t>
             </a:r>
-            <a:endParaRPr lang="en-US"/>
           </a:p>
         </p:txBody>
       </p:sp>
@@ -759,38 +771,37 @@
           <a:p>
             <a:pPr lvl="0"/>
             <a:r>
-              <a:rPr lang="en-US" smtClean="0"/>
+              <a:rPr lang="en-US"/>
               <a:t>Click to edit Master text styles</a:t>
             </a:r>
           </a:p>
           <a:p>
             <a:pPr lvl="1"/>
             <a:r>
-              <a:rPr lang="en-US" smtClean="0"/>
+              <a:rPr lang="en-US"/>
               <a:t>Second level</a:t>
             </a:r>
           </a:p>
           <a:p>
             <a:pPr lvl="2"/>
             <a:r>
-              <a:rPr lang="en-US" smtClean="0"/>
+              <a:rPr lang="en-US"/>
               <a:t>Third level</a:t>
             </a:r>
           </a:p>
           <a:p>
             <a:pPr lvl="3"/>
             <a:r>
-              <a:rPr lang="en-US" smtClean="0"/>
+              <a:rPr lang="en-US"/>
               <a:t>Fourth level</a:t>
             </a:r>
           </a:p>
           <a:p>
             <a:pPr lvl="4"/>
             <a:r>
-              <a:rPr lang="en-US" smtClean="0"/>
+              <a:rPr lang="en-US"/>
               <a:t>Fifth level</a:t>
             </a:r>
-            <a:endParaRPr lang="en-US"/>
           </a:p>
         </p:txBody>
       </p:sp>
@@ -811,7 +822,7 @@
           <a:p>
             <a:fld id="{78C97017-6FC3-485B-9764-EAC9E56C1D49}" type="datetimeFigureOut">
               <a:rPr lang="en-US" smtClean="0"/>
-              <a:t>10/16/2016</a:t>
+              <a:t>4/15/2018</a:t>
             </a:fld>
             <a:endParaRPr lang="en-US"/>
           </a:p>
@@ -910,10 +921,9 @@
           <a:lstStyle/>
           <a:p>
             <a:r>
-              <a:rPr lang="en-US" smtClean="0"/>
+              <a:rPr lang="en-US"/>
               <a:t>Click to edit Master title style</a:t>
             </a:r>
-            <a:endParaRPr lang="en-US"/>
           </a:p>
         </p:txBody>
       </p:sp>
@@ -939,38 +949,37 @@
           <a:p>
             <a:pPr lvl="0"/>
             <a:r>
-              <a:rPr lang="en-US" smtClean="0"/>
+              <a:rPr lang="en-US"/>
               <a:t>Click to edit Master text styles</a:t>
             </a:r>
           </a:p>
           <a:p>
             <a:pPr lvl="1"/>
             <a:r>
-              <a:rPr lang="en-US" smtClean="0"/>
+              <a:rPr lang="en-US"/>
               <a:t>Second level</a:t>
             </a:r>
           </a:p>
           <a:p>
             <a:pPr lvl="2"/>
             <a:r>
-              <a:rPr lang="en-US" smtClean="0"/>
+              <a:rPr lang="en-US"/>
               <a:t>Third level</a:t>
             </a:r>
           </a:p>
           <a:p>
             <a:pPr lvl="3"/>
             <a:r>
-              <a:rPr lang="en-US" smtClean="0"/>
+              <a:rPr lang="en-US"/>
               <a:t>Fourth level</a:t>
             </a:r>
           </a:p>
           <a:p>
             <a:pPr lvl="4"/>
             <a:r>
-              <a:rPr lang="en-US" smtClean="0"/>
+              <a:rPr lang="en-US"/>
               <a:t>Fifth level</a:t>
             </a:r>
-            <a:endParaRPr lang="en-US"/>
           </a:p>
         </p:txBody>
       </p:sp>
@@ -991,7 +1000,7 @@
           <a:p>
             <a:fld id="{78C97017-6FC3-485B-9764-EAC9E56C1D49}" type="datetimeFigureOut">
               <a:rPr lang="en-US" smtClean="0"/>
-              <a:t>10/16/2016</a:t>
+              <a:t>4/15/2018</a:t>
             </a:fld>
             <a:endParaRPr lang="en-US"/>
           </a:p>
@@ -1085,10 +1094,9 @@
           <a:lstStyle/>
           <a:p>
             <a:r>
-              <a:rPr lang="en-US" smtClean="0"/>
+              <a:rPr lang="en-US"/>
               <a:t>Click to edit Master title style</a:t>
             </a:r>
-            <a:endParaRPr lang="en-US"/>
           </a:p>
         </p:txBody>
       </p:sp>
@@ -1109,38 +1117,37 @@
           <a:p>
             <a:pPr lvl="0"/>
             <a:r>
-              <a:rPr lang="en-US" smtClean="0"/>
+              <a:rPr lang="en-US"/>
               <a:t>Click to edit Master text styles</a:t>
             </a:r>
           </a:p>
           <a:p>
             <a:pPr lvl="1"/>
             <a:r>
-              <a:rPr lang="en-US" smtClean="0"/>
+              <a:rPr lang="en-US"/>
               <a:t>Second level</a:t>
             </a:r>
           </a:p>
           <a:p>
             <a:pPr lvl="2"/>
             <a:r>
-              <a:rPr lang="en-US" smtClean="0"/>
+              <a:rPr lang="en-US"/>
               <a:t>Third level</a:t>
             </a:r>
           </a:p>
           <a:p>
             <a:pPr lvl="3"/>
             <a:r>
-              <a:rPr lang="en-US" smtClean="0"/>
+              <a:rPr lang="en-US"/>
               <a:t>Fourth level</a:t>
             </a:r>
           </a:p>
           <a:p>
             <a:pPr lvl="4"/>
             <a:r>
-              <a:rPr lang="en-US" smtClean="0"/>
+              <a:rPr lang="en-US"/>
               <a:t>Fifth level</a:t>
             </a:r>
-            <a:endParaRPr lang="en-US"/>
           </a:p>
         </p:txBody>
       </p:sp>
@@ -1161,7 +1168,7 @@
           <a:p>
             <a:fld id="{78C97017-6FC3-485B-9764-EAC9E56C1D49}" type="datetimeFigureOut">
               <a:rPr lang="en-US" smtClean="0"/>
-              <a:t>10/16/2016</a:t>
+              <a:t>4/15/2018</a:t>
             </a:fld>
             <a:endParaRPr lang="en-US"/>
           </a:p>
@@ -1264,10 +1271,9 @@
           </a:lstStyle>
           <a:p>
             <a:r>
-              <a:rPr lang="en-US" smtClean="0"/>
+              <a:rPr lang="en-US"/>
               <a:t>Click to edit Master title style</a:t>
             </a:r>
-            <a:endParaRPr lang="en-US"/>
           </a:p>
         </p:txBody>
       </p:sp>
@@ -1384,7 +1390,7 @@
           <a:p>
             <a:pPr lvl="0"/>
             <a:r>
-              <a:rPr lang="en-US" smtClean="0"/>
+              <a:rPr lang="en-US"/>
               <a:t>Click to edit Master text styles</a:t>
             </a:r>
           </a:p>
@@ -1407,7 +1413,7 @@
           <a:p>
             <a:fld id="{78C97017-6FC3-485B-9764-EAC9E56C1D49}" type="datetimeFigureOut">
               <a:rPr lang="en-US" smtClean="0"/>
-              <a:t>10/16/2016</a:t>
+              <a:t>4/15/2018</a:t>
             </a:fld>
             <a:endParaRPr lang="en-US"/>
           </a:p>
@@ -1501,10 +1507,9 @@
           <a:lstStyle/>
           <a:p>
             <a:r>
-              <a:rPr lang="en-US" smtClean="0"/>
+              <a:rPr lang="en-US"/>
               <a:t>Click to edit Master title style</a:t>
             </a:r>
-            <a:endParaRPr lang="en-US"/>
           </a:p>
         </p:txBody>
       </p:sp>
@@ -1558,38 +1563,37 @@
           <a:p>
             <a:pPr lvl="0"/>
             <a:r>
-              <a:rPr lang="en-US" smtClean="0"/>
+              <a:rPr lang="en-US"/>
               <a:t>Click to edit Master text styles</a:t>
             </a:r>
           </a:p>
           <a:p>
             <a:pPr lvl="1"/>
             <a:r>
-              <a:rPr lang="en-US" smtClean="0"/>
+              <a:rPr lang="en-US"/>
               <a:t>Second level</a:t>
             </a:r>
           </a:p>
           <a:p>
             <a:pPr lvl="2"/>
             <a:r>
-              <a:rPr lang="en-US" smtClean="0"/>
+              <a:rPr lang="en-US"/>
               <a:t>Third level</a:t>
             </a:r>
           </a:p>
           <a:p>
             <a:pPr lvl="3"/>
             <a:r>
-              <a:rPr lang="en-US" smtClean="0"/>
+              <a:rPr lang="en-US"/>
               <a:t>Fourth level</a:t>
             </a:r>
           </a:p>
           <a:p>
             <a:pPr lvl="4"/>
             <a:r>
-              <a:rPr lang="en-US" smtClean="0"/>
+              <a:rPr lang="en-US"/>
               <a:t>Fifth level</a:t>
             </a:r>
-            <a:endParaRPr lang="en-US"/>
           </a:p>
         </p:txBody>
       </p:sp>
@@ -1643,38 +1647,37 @@
           <a:p>
             <a:pPr lvl="0"/>
             <a:r>
-              <a:rPr lang="en-US" smtClean="0"/>
+              <a:rPr lang="en-US"/>
               <a:t>Click to edit Master text styles</a:t>
             </a:r>
           </a:p>
           <a:p>
             <a:pPr lvl="1"/>
             <a:r>
-              <a:rPr lang="en-US" smtClean="0"/>
+              <a:rPr lang="en-US"/>
               <a:t>Second level</a:t>
             </a:r>
           </a:p>
           <a:p>
             <a:pPr lvl="2"/>
             <a:r>
-              <a:rPr lang="en-US" smtClean="0"/>
+              <a:rPr lang="en-US"/>
               <a:t>Third level</a:t>
             </a:r>
           </a:p>
           <a:p>
             <a:pPr lvl="3"/>
             <a:r>
-              <a:rPr lang="en-US" smtClean="0"/>
+              <a:rPr lang="en-US"/>
               <a:t>Fourth level</a:t>
             </a:r>
           </a:p>
           <a:p>
             <a:pPr lvl="4"/>
             <a:r>
-              <a:rPr lang="en-US" smtClean="0"/>
+              <a:rPr lang="en-US"/>
               <a:t>Fifth level</a:t>
             </a:r>
-            <a:endParaRPr lang="en-US"/>
           </a:p>
         </p:txBody>
       </p:sp>
@@ -1695,7 +1698,7 @@
           <a:p>
             <a:fld id="{78C97017-6FC3-485B-9764-EAC9E56C1D49}" type="datetimeFigureOut">
               <a:rPr lang="en-US" smtClean="0"/>
-              <a:t>10/16/2016</a:t>
+              <a:t>4/15/2018</a:t>
             </a:fld>
             <a:endParaRPr lang="en-US"/>
           </a:p>
@@ -1793,10 +1796,9 @@
           </a:lstStyle>
           <a:p>
             <a:r>
-              <a:rPr lang="en-US" smtClean="0"/>
+              <a:rPr lang="en-US"/>
               <a:t>Click to edit Master title style</a:t>
             </a:r>
-            <a:endParaRPr lang="en-US"/>
           </a:p>
         </p:txBody>
       </p:sp>
@@ -1859,7 +1861,7 @@
           <a:p>
             <a:pPr lvl="0"/>
             <a:r>
-              <a:rPr lang="en-US" smtClean="0"/>
+              <a:rPr lang="en-US"/>
               <a:t>Click to edit Master text styles</a:t>
             </a:r>
           </a:p>
@@ -1915,38 +1917,37 @@
           <a:p>
             <a:pPr lvl="0"/>
             <a:r>
-              <a:rPr lang="en-US" smtClean="0"/>
+              <a:rPr lang="en-US"/>
               <a:t>Click to edit Master text styles</a:t>
             </a:r>
           </a:p>
           <a:p>
             <a:pPr lvl="1"/>
             <a:r>
-              <a:rPr lang="en-US" smtClean="0"/>
+              <a:rPr lang="en-US"/>
               <a:t>Second level</a:t>
             </a:r>
           </a:p>
           <a:p>
             <a:pPr lvl="2"/>
             <a:r>
-              <a:rPr lang="en-US" smtClean="0"/>
+              <a:rPr lang="en-US"/>
               <a:t>Third level</a:t>
             </a:r>
           </a:p>
           <a:p>
             <a:pPr lvl="3"/>
             <a:r>
-              <a:rPr lang="en-US" smtClean="0"/>
+              <a:rPr lang="en-US"/>
               <a:t>Fourth level</a:t>
             </a:r>
           </a:p>
           <a:p>
             <a:pPr lvl="4"/>
             <a:r>
-              <a:rPr lang="en-US" smtClean="0"/>
+              <a:rPr lang="en-US"/>
               <a:t>Fifth level</a:t>
             </a:r>
-            <a:endParaRPr lang="en-US"/>
           </a:p>
         </p:txBody>
       </p:sp>
@@ -2009,7 +2010,7 @@
           <a:p>
             <a:pPr lvl="0"/>
             <a:r>
-              <a:rPr lang="en-US" smtClean="0"/>
+              <a:rPr lang="en-US"/>
               <a:t>Click to edit Master text styles</a:t>
             </a:r>
           </a:p>
@@ -2065,38 +2066,37 @@
           <a:p>
             <a:pPr lvl="0"/>
             <a:r>
-              <a:rPr lang="en-US" smtClean="0"/>
+              <a:rPr lang="en-US"/>
               <a:t>Click to edit Master text styles</a:t>
             </a:r>
           </a:p>
           <a:p>
             <a:pPr lvl="1"/>
             <a:r>
-              <a:rPr lang="en-US" smtClean="0"/>
+              <a:rPr lang="en-US"/>
               <a:t>Second level</a:t>
             </a:r>
           </a:p>
           <a:p>
             <a:pPr lvl="2"/>
             <a:r>
-              <a:rPr lang="en-US" smtClean="0"/>
+              <a:rPr lang="en-US"/>
               <a:t>Third level</a:t>
             </a:r>
           </a:p>
           <a:p>
             <a:pPr lvl="3"/>
             <a:r>
-              <a:rPr lang="en-US" smtClean="0"/>
+              <a:rPr lang="en-US"/>
               <a:t>Fourth level</a:t>
             </a:r>
           </a:p>
           <a:p>
             <a:pPr lvl="4"/>
             <a:r>
-              <a:rPr lang="en-US" smtClean="0"/>
+              <a:rPr lang="en-US"/>
               <a:t>Fifth level</a:t>
             </a:r>
-            <a:endParaRPr lang="en-US"/>
           </a:p>
         </p:txBody>
       </p:sp>
@@ -2117,7 +2117,7 @@
           <a:p>
             <a:fld id="{78C97017-6FC3-485B-9764-EAC9E56C1D49}" type="datetimeFigureOut">
               <a:rPr lang="en-US" smtClean="0"/>
-              <a:t>10/16/2016</a:t>
+              <a:t>4/15/2018</a:t>
             </a:fld>
             <a:endParaRPr lang="en-US"/>
           </a:p>
@@ -2211,10 +2211,9 @@
           <a:lstStyle/>
           <a:p>
             <a:r>
-              <a:rPr lang="en-US" smtClean="0"/>
+              <a:rPr lang="en-US"/>
               <a:t>Click to edit Master title style</a:t>
             </a:r>
-            <a:endParaRPr lang="en-US"/>
           </a:p>
         </p:txBody>
       </p:sp>
@@ -2235,7 +2234,7 @@
           <a:p>
             <a:fld id="{78C97017-6FC3-485B-9764-EAC9E56C1D49}" type="datetimeFigureOut">
               <a:rPr lang="en-US" smtClean="0"/>
-              <a:t>10/16/2016</a:t>
+              <a:t>4/15/2018</a:t>
             </a:fld>
             <a:endParaRPr lang="en-US"/>
           </a:p>
@@ -2330,7 +2329,7 @@
           <a:p>
             <a:fld id="{78C97017-6FC3-485B-9764-EAC9E56C1D49}" type="datetimeFigureOut">
               <a:rPr lang="en-US" smtClean="0"/>
-              <a:t>10/16/2016</a:t>
+              <a:t>4/15/2018</a:t>
             </a:fld>
             <a:endParaRPr lang="en-US"/>
           </a:p>
@@ -2433,10 +2432,9 @@
           </a:lstStyle>
           <a:p>
             <a:r>
-              <a:rPr lang="en-US" smtClean="0"/>
+              <a:rPr lang="en-US"/>
               <a:t>Click to edit Master title style</a:t>
             </a:r>
-            <a:endParaRPr lang="en-US"/>
           </a:p>
         </p:txBody>
       </p:sp>
@@ -2490,38 +2488,37 @@
           <a:p>
             <a:pPr lvl="0"/>
             <a:r>
-              <a:rPr lang="en-US" smtClean="0"/>
+              <a:rPr lang="en-US"/>
               <a:t>Click to edit Master text styles</a:t>
             </a:r>
           </a:p>
           <a:p>
             <a:pPr lvl="1"/>
             <a:r>
-              <a:rPr lang="en-US" smtClean="0"/>
+              <a:rPr lang="en-US"/>
               <a:t>Second level</a:t>
             </a:r>
           </a:p>
           <a:p>
             <a:pPr lvl="2"/>
             <a:r>
-              <a:rPr lang="en-US" smtClean="0"/>
+              <a:rPr lang="en-US"/>
               <a:t>Third level</a:t>
             </a:r>
           </a:p>
           <a:p>
             <a:pPr lvl="3"/>
             <a:r>
-              <a:rPr lang="en-US" smtClean="0"/>
+              <a:rPr lang="en-US"/>
               <a:t>Fourth level</a:t>
             </a:r>
           </a:p>
           <a:p>
             <a:pPr lvl="4"/>
             <a:r>
-              <a:rPr lang="en-US" smtClean="0"/>
+              <a:rPr lang="en-US"/>
               <a:t>Fifth level</a:t>
             </a:r>
-            <a:endParaRPr lang="en-US"/>
           </a:p>
         </p:txBody>
       </p:sp>
@@ -2584,7 +2581,7 @@
           <a:p>
             <a:pPr lvl="0"/>
             <a:r>
-              <a:rPr lang="en-US" smtClean="0"/>
+              <a:rPr lang="en-US"/>
               <a:t>Click to edit Master text styles</a:t>
             </a:r>
           </a:p>
@@ -2607,7 +2604,7 @@
           <a:p>
             <a:fld id="{78C97017-6FC3-485B-9764-EAC9E56C1D49}" type="datetimeFigureOut">
               <a:rPr lang="en-US" smtClean="0"/>
-              <a:t>10/16/2016</a:t>
+              <a:t>4/15/2018</a:t>
             </a:fld>
             <a:endParaRPr lang="en-US"/>
           </a:p>
@@ -2710,10 +2707,9 @@
           </a:lstStyle>
           <a:p>
             <a:r>
-              <a:rPr lang="en-US" smtClean="0"/>
+              <a:rPr lang="en-US"/>
               <a:t>Click to edit Master title style</a:t>
             </a:r>
-            <a:endParaRPr lang="en-US"/>
           </a:p>
         </p:txBody>
       </p:sp>
@@ -2837,7 +2833,7 @@
           <a:p>
             <a:pPr lvl="0"/>
             <a:r>
-              <a:rPr lang="en-US" smtClean="0"/>
+              <a:rPr lang="en-US"/>
               <a:t>Click to edit Master text styles</a:t>
             </a:r>
           </a:p>
@@ -2860,7 +2856,7 @@
           <a:p>
             <a:fld id="{78C97017-6FC3-485B-9764-EAC9E56C1D49}" type="datetimeFigureOut">
               <a:rPr lang="en-US" smtClean="0"/>
-              <a:t>10/16/2016</a:t>
+              <a:t>4/15/2018</a:t>
             </a:fld>
             <a:endParaRPr lang="en-US"/>
           </a:p>
@@ -2969,10 +2965,9 @@
           <a:lstStyle/>
           <a:p>
             <a:r>
-              <a:rPr lang="en-US" smtClean="0"/>
+              <a:rPr lang="en-US"/>
               <a:t>Click to edit Master title style</a:t>
             </a:r>
-            <a:endParaRPr lang="en-US"/>
           </a:p>
         </p:txBody>
       </p:sp>
@@ -3003,38 +2998,37 @@
           <a:p>
             <a:pPr lvl="0"/>
             <a:r>
-              <a:rPr lang="en-US" smtClean="0"/>
+              <a:rPr lang="en-US"/>
               <a:t>Click to edit Master text styles</a:t>
             </a:r>
           </a:p>
           <a:p>
             <a:pPr lvl="1"/>
             <a:r>
-              <a:rPr lang="en-US" smtClean="0"/>
+              <a:rPr lang="en-US"/>
               <a:t>Second level</a:t>
             </a:r>
           </a:p>
           <a:p>
             <a:pPr lvl="2"/>
             <a:r>
-              <a:rPr lang="en-US" smtClean="0"/>
+              <a:rPr lang="en-US"/>
               <a:t>Third level</a:t>
             </a:r>
           </a:p>
           <a:p>
             <a:pPr lvl="3"/>
             <a:r>
-              <a:rPr lang="en-US" smtClean="0"/>
+              <a:rPr lang="en-US"/>
               <a:t>Fourth level</a:t>
             </a:r>
           </a:p>
           <a:p>
             <a:pPr lvl="4"/>
             <a:r>
-              <a:rPr lang="en-US" smtClean="0"/>
+              <a:rPr lang="en-US"/>
               <a:t>Fifth level</a:t>
             </a:r>
-            <a:endParaRPr lang="en-US"/>
           </a:p>
         </p:txBody>
       </p:sp>
@@ -3073,7 +3067,7 @@
           <a:p>
             <a:fld id="{78C97017-6FC3-485B-9764-EAC9E56C1D49}" type="datetimeFigureOut">
               <a:rPr lang="en-US" smtClean="0"/>
-              <a:t>10/16/2016</a:t>
+              <a:t>4/15/2018</a:t>
             </a:fld>
             <a:endParaRPr lang="en-US"/>
           </a:p>
@@ -3492,7 +3486,7 @@
           <a:p>
             <a:pPr algn="ctr"/>
             <a:r>
-              <a:rPr lang="en-US" sz="1600" dirty="0" smtClean="0">
+              <a:rPr lang="en-US" sz="1600" dirty="0">
                 <a:solidFill>
                   <a:schemeClr val="bg1"/>
                 </a:solidFill>
@@ -3856,7 +3850,7 @@
           <a:p>
             <a:pPr algn="ctr"/>
             <a:r>
-              <a:rPr lang="en-US" sz="1600" dirty="0" smtClean="0">
+              <a:rPr lang="en-US" sz="1600" dirty="0">
                 <a:solidFill>
                   <a:schemeClr val="bg1"/>
                 </a:solidFill>
@@ -4003,7 +3997,7 @@
           <a:p>
             <a:pPr algn="ctr"/>
             <a:r>
-              <a:rPr lang="en-US" sz="1600" dirty="0" smtClean="0">
+              <a:rPr lang="en-US" sz="1600" dirty="0">
                 <a:solidFill>
                   <a:schemeClr val="bg1"/>
                 </a:solidFill>
@@ -4165,10 +4159,9 @@
           <a:lstStyle/>
           <a:p>
             <a:r>
-              <a:rPr lang="en-US" sz="1400" dirty="0" smtClean="0"/>
+              <a:rPr lang="en-US" sz="1400" dirty="0"/>
               <a:t>delete 1</a:t>
             </a:r>
-            <a:endParaRPr lang="en-US" sz="1400" dirty="0"/>
           </a:p>
         </p:txBody>
       </p:sp>
@@ -4231,18 +4224,13 @@
           <a:lstStyle/>
           <a:p>
             <a:r>
-              <a:rPr lang="en-US" sz="1400" dirty="0" smtClean="0">
+              <a:rPr lang="en-US" sz="1400" dirty="0">
                 <a:solidFill>
                   <a:srgbClr val="0070C0"/>
                 </a:solidFill>
               </a:rPr>
               <a:t>execute(“delete 1”)</a:t>
             </a:r>
-            <a:endParaRPr lang="en-US" sz="1400" dirty="0">
-              <a:solidFill>
-                <a:srgbClr val="0070C0"/>
-              </a:solidFill>
-            </a:endParaRPr>
           </a:p>
         </p:txBody>
       </p:sp>
@@ -4305,26 +4293,21 @@
           <a:lstStyle/>
           <a:p>
             <a:r>
-              <a:rPr lang="en-US" sz="1400" dirty="0" err="1" smtClean="0">
+              <a:rPr lang="en-US" sz="1400" dirty="0" err="1">
                 <a:solidFill>
                   <a:srgbClr val="7030A0"/>
                 </a:solidFill>
               </a:rPr>
-              <a:t>deletePerson</a:t>
-            </a:r>
-            <a:r>
-              <a:rPr lang="en-US" sz="1400" dirty="0" smtClean="0">
+              <a:t>deleteBook</a:t>
+            </a:r>
+            <a:r>
+              <a:rPr lang="en-US" sz="1400" dirty="0">
                 <a:solidFill>
                   <a:srgbClr val="7030A0"/>
                 </a:solidFill>
               </a:rPr>
               <a:t>(p)</a:t>
             </a:r>
-            <a:endParaRPr lang="en-US" sz="1400" dirty="0">
-              <a:solidFill>
-                <a:srgbClr val="7030A0"/>
-              </a:solidFill>
-            </a:endParaRPr>
           </a:p>
         </p:txBody>
       </p:sp>
@@ -4351,7 +4334,7 @@
           <a:lstStyle/>
           <a:p>
             <a:r>
-              <a:rPr lang="en-US" sz="1400" dirty="0" smtClean="0">
+              <a:rPr lang="en-US" sz="1400" dirty="0">
                 <a:solidFill>
                   <a:schemeClr val="accent5">
                     <a:lumMod val="75000"/>
@@ -4361,17 +4344,17 @@
               <a:t>post(</a:t>
             </a:r>
             <a:r>
-              <a:rPr lang="en-US" sz="1400" dirty="0" err="1" smtClean="0">
+              <a:rPr lang="en-US" sz="1400" dirty="0" err="1">
                 <a:solidFill>
                   <a:schemeClr val="accent5">
                     <a:lumMod val="75000"/>
                   </a:schemeClr>
                 </a:solidFill>
               </a:rPr>
-              <a:t>AddressBookChangedEvent</a:t>
-            </a:r>
-            <a:r>
-              <a:rPr lang="en-US" sz="1400" dirty="0" smtClean="0">
+              <a:t>CatalogueChangedEvent</a:t>
+            </a:r>
+            <a:r>
+              <a:rPr lang="en-US" sz="1400" dirty="0">
                 <a:solidFill>
                   <a:schemeClr val="accent5">
                     <a:lumMod val="75000"/>
@@ -4380,13 +4363,6 @@
               </a:rPr>
               <a:t>)</a:t>
             </a:r>
-            <a:endParaRPr lang="en-US" sz="1400" dirty="0">
-              <a:solidFill>
-                <a:schemeClr val="accent5">
-                  <a:lumMod val="75000"/>
-                </a:schemeClr>
-              </a:solidFill>
-            </a:endParaRPr>
           </a:p>
         </p:txBody>
       </p:sp>
@@ -4552,7 +4528,7 @@
           <a:p>
             <a:pPr algn="ctr"/>
             <a:r>
-              <a:rPr lang="en-US" sz="1600" dirty="0" smtClean="0">
+              <a:rPr lang="en-US" sz="1600" dirty="0">
                 <a:solidFill>
                   <a:schemeClr val="bg1"/>
                 </a:solidFill>
@@ -4560,7 +4536,7 @@
               <a:t>:</a:t>
             </a:r>
             <a:r>
-              <a:rPr lang="en-US" sz="1600" dirty="0" err="1" smtClean="0">
+              <a:rPr lang="en-US" sz="1600" dirty="0" err="1">
                 <a:solidFill>
                   <a:schemeClr val="bg1"/>
                 </a:solidFill>
@@ -4793,7 +4769,7 @@
           <a:p>
             <a:pPr algn="ctr"/>
             <a:r>
-              <a:rPr lang="en-US" sz="1600" dirty="0" smtClean="0">
+              <a:rPr lang="en-US" sz="1600" dirty="0">
                 <a:solidFill>
                   <a:schemeClr val="bg1"/>
                 </a:solidFill>
@@ -4925,7 +4901,7 @@
           <a:lstStyle/>
           <a:p>
             <a:r>
-              <a:rPr lang="en-US" sz="1400" dirty="0" smtClean="0">
+              <a:rPr lang="en-US" sz="1400" dirty="0">
                 <a:solidFill>
                   <a:schemeClr val="accent5">
                     <a:lumMod val="75000"/>
@@ -4935,17 +4911,17 @@
               <a:t>post(</a:t>
             </a:r>
             <a:r>
-              <a:rPr lang="en-US" sz="1400" dirty="0" err="1" smtClean="0">
+              <a:rPr lang="en-US" sz="1400" dirty="0" err="1">
                 <a:solidFill>
                   <a:schemeClr val="accent5">
                     <a:lumMod val="75000"/>
                   </a:schemeClr>
                 </a:solidFill>
               </a:rPr>
-              <a:t>AddressBookChangedEvent</a:t>
-            </a:r>
-            <a:r>
-              <a:rPr lang="en-US" sz="1400" dirty="0" smtClean="0">
+              <a:t>CatalogueChangedEvent</a:t>
+            </a:r>
+            <a:r>
+              <a:rPr lang="en-US" sz="1400" dirty="0">
                 <a:solidFill>
                   <a:schemeClr val="accent5">
                     <a:lumMod val="75000"/>
@@ -4954,13 +4930,6 @@
               </a:rPr>
               <a:t>)</a:t>
             </a:r>
-            <a:endParaRPr lang="en-US" sz="1400" dirty="0">
-              <a:solidFill>
-                <a:schemeClr val="accent5">
-                  <a:lumMod val="75000"/>
-                </a:schemeClr>
-              </a:solidFill>
-            </a:endParaRPr>
           </a:p>
         </p:txBody>
       </p:sp>
@@ -5052,7 +5021,7 @@
           <a:p>
             <a:pPr algn="ctr"/>
             <a:r>
-              <a:rPr lang="en-US" sz="1600" dirty="0" smtClean="0">
+              <a:rPr lang="en-US" sz="1600" dirty="0">
                 <a:solidFill>
                   <a:schemeClr val="bg1"/>
                 </a:solidFill>
@@ -5060,7 +5029,7 @@
               <a:t>:</a:t>
             </a:r>
             <a:r>
-              <a:rPr lang="en-US" sz="1600" dirty="0" err="1" smtClean="0">
+              <a:rPr lang="en-US" sz="1600" dirty="0" err="1">
                 <a:solidFill>
                   <a:schemeClr val="bg1"/>
                 </a:solidFill>
@@ -5307,17 +5276,17 @@
           <a:lstStyle/>
           <a:p>
             <a:r>
-              <a:rPr lang="en-US" sz="1400" dirty="0" err="1" smtClean="0">
+              <a:rPr lang="en-US" sz="1400" dirty="0" err="1">
                 <a:solidFill>
                   <a:schemeClr val="accent6">
                     <a:lumMod val="75000"/>
                   </a:schemeClr>
                 </a:solidFill>
               </a:rPr>
-              <a:t>handleAddresssBookChangedEvent</a:t>
-            </a:r>
-            <a:r>
-              <a:rPr lang="en-US" sz="1400" dirty="0" smtClean="0">
+              <a:t>handleCatalogueChangedEvent</a:t>
+            </a:r>
+            <a:r>
+              <a:rPr lang="en-US" sz="1400" dirty="0">
                 <a:solidFill>
                   <a:schemeClr val="accent6">
                     <a:lumMod val="75000"/>
@@ -5326,13 +5295,6 @@
               </a:rPr>
               <a:t>()</a:t>
             </a:r>
-            <a:endParaRPr lang="en-US" sz="1400" dirty="0">
-              <a:solidFill>
-                <a:schemeClr val="accent6">
-                  <a:lumMod val="75000"/>
-                </a:schemeClr>
-              </a:solidFill>
-            </a:endParaRPr>
           </a:p>
         </p:txBody>
       </p:sp>
@@ -5417,7 +5379,7 @@
           <a:p>
             <a:pPr algn="ctr"/>
             <a:r>
-              <a:rPr lang="en-US" sz="1600" dirty="0" smtClean="0">
+              <a:rPr lang="en-US" sz="1600" dirty="0">
                 <a:solidFill>
                   <a:schemeClr val="bg1"/>
                 </a:solidFill>
@@ -5620,26 +5582,21 @@
           <a:lstStyle/>
           <a:p>
             <a:r>
-              <a:rPr lang="en-US" sz="1400" dirty="0" err="1" smtClean="0">
+              <a:rPr lang="en-US" sz="1400" dirty="0" err="1">
                 <a:solidFill>
                   <a:srgbClr val="00B050"/>
                 </a:solidFill>
               </a:rPr>
-              <a:t>handleAddresssBookChangedEvent</a:t>
-            </a:r>
-            <a:r>
-              <a:rPr lang="en-US" sz="1400" dirty="0" smtClean="0">
+              <a:t>handleCatalogueChangedEvent</a:t>
+            </a:r>
+            <a:r>
+              <a:rPr lang="en-US" sz="1400" dirty="0">
                 <a:solidFill>
                   <a:srgbClr val="00B050"/>
                 </a:solidFill>
               </a:rPr>
               <a:t>()</a:t>
             </a:r>
-            <a:endParaRPr lang="en-US" sz="1400" dirty="0">
-              <a:solidFill>
-                <a:srgbClr val="00B050"/>
-              </a:solidFill>
-            </a:endParaRPr>
           </a:p>
         </p:txBody>
       </p:sp>
@@ -5826,18 +5783,13 @@
           <a:p>
             <a:pPr algn="r"/>
             <a:r>
-              <a:rPr lang="en-US" sz="1400" dirty="0" smtClean="0">
+              <a:rPr lang="en-US" sz="1400" dirty="0">
                 <a:solidFill>
                   <a:srgbClr val="00B050"/>
                 </a:solidFill>
               </a:rPr>
               <a:t>Update status bar</a:t>
             </a:r>
-            <a:endParaRPr lang="en-US" sz="1400" dirty="0">
-              <a:solidFill>
-                <a:srgbClr val="00B050"/>
-              </a:solidFill>
-            </a:endParaRPr>
           </a:p>
         </p:txBody>
       </p:sp>
@@ -6027,7 +5979,7 @@
           <a:lstStyle/>
           <a:p>
             <a:r>
-              <a:rPr lang="en-US" sz="1400" dirty="0" smtClean="0">
+              <a:rPr lang="en-US" sz="1400" dirty="0">
                 <a:solidFill>
                   <a:schemeClr val="accent6">
                     <a:lumMod val="75000"/>
@@ -6037,7 +5989,7 @@
               <a:t>Save </a:t>
             </a:r>
             <a:br>
-              <a:rPr lang="en-US" sz="1400" dirty="0" smtClean="0">
+              <a:rPr lang="en-US" sz="1400" dirty="0">
                 <a:solidFill>
                   <a:schemeClr val="accent6">
                     <a:lumMod val="75000"/>
@@ -6046,7 +5998,7 @@
               </a:rPr>
             </a:br>
             <a:r>
-              <a:rPr lang="en-US" sz="1400" dirty="0" smtClean="0">
+              <a:rPr lang="en-US" sz="1400" dirty="0">
                 <a:solidFill>
                   <a:schemeClr val="accent6">
                     <a:lumMod val="75000"/>
@@ -6055,13 +6007,6 @@
               </a:rPr>
               <a:t>to file</a:t>
             </a:r>
-            <a:endParaRPr lang="en-US" sz="1400" dirty="0">
-              <a:solidFill>
-                <a:schemeClr val="accent6">
-                  <a:lumMod val="75000"/>
-                </a:schemeClr>
-              </a:solidFill>
-            </a:endParaRPr>
           </a:p>
         </p:txBody>
       </p:sp>

</xml_diff>